<commit_message>
Aufgabe 4.1 und 4.2
</commit_message>
<xml_diff>
--- a/Probeklausur.pptx
+++ b/Probeklausur.pptx
@@ -5,10 +5,10 @@
     <p:sldMasterId id="2147483649" r:id="rId4"/>
   </p:sldMasterIdLst>
   <p:notesMasterIdLst>
-    <p:notesMasterId r:id="rId15"/>
+    <p:notesMasterId r:id="rId21"/>
   </p:notesMasterIdLst>
   <p:handoutMasterIdLst>
-    <p:handoutMasterId r:id="rId16"/>
+    <p:handoutMasterId r:id="rId22"/>
   </p:handoutMasterIdLst>
   <p:sldIdLst>
     <p:sldId id="1041" r:id="rId5"/>
@@ -21,6 +21,12 @@
     <p:sldId id="1051" r:id="rId12"/>
     <p:sldId id="1052" r:id="rId13"/>
     <p:sldId id="1053" r:id="rId14"/>
+    <p:sldId id="1054" r:id="rId15"/>
+    <p:sldId id="1055" r:id="rId16"/>
+    <p:sldId id="1056" r:id="rId17"/>
+    <p:sldId id="1057" r:id="rId18"/>
+    <p:sldId id="1058" r:id="rId19"/>
+    <p:sldId id="1059" r:id="rId20"/>
   </p:sldIdLst>
   <p:sldSz cx="12192000" cy="6858000"/>
   <p:notesSz cx="6858000" cy="9144000"/>
@@ -164,6 +170,12 @@
             <p14:sldId id="1051"/>
             <p14:sldId id="1052"/>
             <p14:sldId id="1053"/>
+            <p14:sldId id="1054"/>
+            <p14:sldId id="1055"/>
+            <p14:sldId id="1056"/>
+            <p14:sldId id="1057"/>
+            <p14:sldId id="1058"/>
+            <p14:sldId id="1059"/>
           </p14:sldIdLst>
         </p14:section>
         <p14:section name="Standardabschnitt" id="{43259912-C5ED-4E84-8ACD-EEBCC30AE9A6}">
@@ -210,6 +222,7 @@
 <p1510:revInfo xmlns:a="http://schemas.openxmlformats.org/drawingml/2006/main" xmlns:r="http://schemas.openxmlformats.org/officeDocument/2006/relationships" xmlns:p1510="http://schemas.microsoft.com/office/powerpoint/2015/10/main">
   <p1510:revLst>
     <p1510:client id="{CDEA013C-0C4C-7CC9-3073-C215768A4D35}" v="422" dt="2026-02-08T21:59:01.042"/>
+    <p1510:client id="{CF275D93-1AF9-5CD7-90BA-CB7126BBAC7F}" v="405" dt="2026-02-08T23:32:48.353"/>
     <p1510:client id="{D9D7A87D-DE7C-D9BF-B02E-6FFACE30470C}" v="1" dt="2026-02-08T22:04:55.165"/>
   </p1510:revLst>
 </p1510:revInfo>
@@ -4768,6 +4781,1154 @@
     <p:extLst>
       <p:ext uri="{BB962C8B-B14F-4D97-AF65-F5344CB8AC3E}">
         <p14:creationId xmlns:p14="http://schemas.microsoft.com/office/powerpoint/2010/main" val="263461105"/>
+      </p:ext>
+    </p:extLst>
+  </p:cSld>
+  <p:clrMapOvr>
+    <a:masterClrMapping/>
+  </p:clrMapOvr>
+</p:sld>
+</file>
+
+<file path=ppt/slides/slide11.xml><?xml version="1.0" encoding="utf-8"?>
+<p:sld xmlns:a="http://schemas.openxmlformats.org/drawingml/2006/main" xmlns:r="http://schemas.openxmlformats.org/officeDocument/2006/relationships" xmlns:p="http://schemas.openxmlformats.org/presentationml/2006/main">
+  <p:cSld>
+    <p:spTree>
+      <p:nvGrpSpPr>
+        <p:cNvPr id="1" name="">
+          <a:extLst>
+            <a:ext uri="{FF2B5EF4-FFF2-40B4-BE49-F238E27FC236}">
+              <a16:creationId xmlns:a16="http://schemas.microsoft.com/office/drawing/2014/main" id="{040F9FFB-6560-8F1E-6F4C-64511D3A3568}"/>
+            </a:ext>
+          </a:extLst>
+        </p:cNvPr>
+        <p:cNvGrpSpPr/>
+        <p:nvPr/>
+      </p:nvGrpSpPr>
+      <p:grpSpPr>
+        <a:xfrm>
+          <a:off x="0" y="0"/>
+          <a:ext cx="0" cy="0"/>
+          <a:chOff x="0" y="0"/>
+          <a:chExt cx="0" cy="0"/>
+        </a:xfrm>
+      </p:grpSpPr>
+      <p:sp>
+        <p:nvSpPr>
+          <p:cNvPr id="2" name="Titel 1">
+            <a:extLst>
+              <a:ext uri="{FF2B5EF4-FFF2-40B4-BE49-F238E27FC236}">
+                <a16:creationId xmlns:a16="http://schemas.microsoft.com/office/drawing/2014/main" id="{51F37715-0D59-D06B-AB2C-486BD68DCC6C}"/>
+              </a:ext>
+            </a:extLst>
+          </p:cNvPr>
+          <p:cNvSpPr>
+            <a:spLocks noGrp="1"/>
+          </p:cNvSpPr>
+          <p:nvPr>
+            <p:ph type="title"/>
+          </p:nvPr>
+        </p:nvSpPr>
+        <p:spPr/>
+        <p:txBody>
+          <a:bodyPr/>
+          <a:lstStyle/>
+          <a:p>
+            <a:r>
+              <a:rPr lang="de-DE" dirty="0"/>
+              <a:t>Aufgabe 4.1</a:t>
+            </a:r>
+          </a:p>
+        </p:txBody>
+      </p:sp>
+      <p:sp>
+        <p:nvSpPr>
+          <p:cNvPr id="6" name="Content Placeholder 5">
+            <a:extLst>
+              <a:ext uri="{FF2B5EF4-FFF2-40B4-BE49-F238E27FC236}">
+                <a16:creationId xmlns:a16="http://schemas.microsoft.com/office/drawing/2014/main" id="{2D5A77A4-8F6D-081F-9391-029226F59D56}"/>
+              </a:ext>
+            </a:extLst>
+          </p:cNvPr>
+          <p:cNvSpPr>
+            <a:spLocks noGrp="1"/>
+          </p:cNvSpPr>
+          <p:nvPr>
+            <p:ph idx="1"/>
+          </p:nvPr>
+        </p:nvSpPr>
+        <p:spPr/>
+        <p:txBody>
+          <a:bodyPr/>
+          <a:lstStyle/>
+          <a:p>
+            <a:pPr marL="0" indent="0">
+              <a:buNone/>
+            </a:pPr>
+            <a:r>
+              <a:rPr lang="en-GB" dirty="0">
+                <a:cs typeface="Arial"/>
+              </a:rPr>
+              <a:t>a)</a:t>
+            </a:r>
+          </a:p>
+          <a:p>
+            <a:pPr marL="0" indent="0">
+              <a:buNone/>
+            </a:pPr>
+            <a:endParaRPr lang="en-GB" dirty="0">
+              <a:cs typeface="Arial"/>
+            </a:endParaRPr>
+          </a:p>
+          <a:p>
+            <a:pPr marL="0" indent="0">
+              <a:buNone/>
+            </a:pPr>
+            <a:r>
+              <a:rPr lang="en-GB" dirty="0">
+                <a:cs typeface="Arial"/>
+              </a:rPr>
+              <a:t>b)</a:t>
+            </a:r>
+          </a:p>
+        </p:txBody>
+      </p:sp>
+      <p:pic>
+        <p:nvPicPr>
+          <p:cNvPr id="7" name="Picture 6">
+            <a:extLst>
+              <a:ext uri="{FF2B5EF4-FFF2-40B4-BE49-F238E27FC236}">
+                <a16:creationId xmlns:a16="http://schemas.microsoft.com/office/drawing/2014/main" id="{93AA5F5E-AA0F-BC6B-91AD-E52B0DB9A771}"/>
+              </a:ext>
+            </a:extLst>
+          </p:cNvPr>
+          <p:cNvPicPr>
+            <a:picLocks noChangeAspect="1"/>
+          </p:cNvPicPr>
+          <p:nvPr/>
+        </p:nvPicPr>
+        <p:blipFill>
+          <a:blip r:embed="rId2"/>
+          <a:stretch>
+            <a:fillRect/>
+          </a:stretch>
+        </p:blipFill>
+        <p:spPr>
+          <a:xfrm>
+            <a:off x="1173655" y="1716963"/>
+            <a:ext cx="6779172" cy="481176"/>
+          </a:xfrm>
+          <a:prstGeom prst="rect">
+            <a:avLst/>
+          </a:prstGeom>
+        </p:spPr>
+      </p:pic>
+      <p:pic>
+        <p:nvPicPr>
+          <p:cNvPr id="8" name="Picture 7" descr="A math equations with numbers and symbols&#10;&#10;AI-generated content may be incorrect.">
+            <a:extLst>
+              <a:ext uri="{FF2B5EF4-FFF2-40B4-BE49-F238E27FC236}">
+                <a16:creationId xmlns:a16="http://schemas.microsoft.com/office/drawing/2014/main" id="{B5197F23-D08C-F676-62EA-8F638688223F}"/>
+              </a:ext>
+            </a:extLst>
+          </p:cNvPr>
+          <p:cNvPicPr>
+            <a:picLocks noChangeAspect="1"/>
+          </p:cNvPicPr>
+          <p:nvPr/>
+        </p:nvPicPr>
+        <p:blipFill>
+          <a:blip r:embed="rId3"/>
+          <a:stretch>
+            <a:fillRect/>
+          </a:stretch>
+        </p:blipFill>
+        <p:spPr>
+          <a:xfrm>
+            <a:off x="1176064" y="2387271"/>
+            <a:ext cx="2815458" cy="2626491"/>
+          </a:xfrm>
+          <a:prstGeom prst="rect">
+            <a:avLst/>
+          </a:prstGeom>
+        </p:spPr>
+      </p:pic>
+      <p:pic>
+        <p:nvPicPr>
+          <p:cNvPr id="10" name="Picture 9">
+            <a:extLst>
+              <a:ext uri="{FF2B5EF4-FFF2-40B4-BE49-F238E27FC236}">
+                <a16:creationId xmlns:a16="http://schemas.microsoft.com/office/drawing/2014/main" id="{3F24FBF2-AFBB-CDCD-D989-844E3645298C}"/>
+              </a:ext>
+            </a:extLst>
+          </p:cNvPr>
+          <p:cNvPicPr>
+            <a:picLocks noChangeAspect="1"/>
+          </p:cNvPicPr>
+          <p:nvPr/>
+        </p:nvPicPr>
+        <p:blipFill>
+          <a:blip r:embed="rId4"/>
+          <a:stretch>
+            <a:fillRect/>
+          </a:stretch>
+        </p:blipFill>
+        <p:spPr>
+          <a:xfrm>
+            <a:off x="1166813" y="5102171"/>
+            <a:ext cx="3762375" cy="1190625"/>
+          </a:xfrm>
+          <a:prstGeom prst="rect">
+            <a:avLst/>
+          </a:prstGeom>
+        </p:spPr>
+      </p:pic>
+    </p:spTree>
+    <p:extLst>
+      <p:ext uri="{BB962C8B-B14F-4D97-AF65-F5344CB8AC3E}">
+        <p14:creationId xmlns:p14="http://schemas.microsoft.com/office/powerpoint/2010/main" val="3021401086"/>
+      </p:ext>
+    </p:extLst>
+  </p:cSld>
+  <p:clrMapOvr>
+    <a:masterClrMapping/>
+  </p:clrMapOvr>
+</p:sld>
+</file>
+
+<file path=ppt/slides/slide12.xml><?xml version="1.0" encoding="utf-8"?>
+<p:sld xmlns:a="http://schemas.openxmlformats.org/drawingml/2006/main" xmlns:r="http://schemas.openxmlformats.org/officeDocument/2006/relationships" xmlns:p="http://schemas.openxmlformats.org/presentationml/2006/main">
+  <p:cSld>
+    <p:spTree>
+      <p:nvGrpSpPr>
+        <p:cNvPr id="1" name="">
+          <a:extLst>
+            <a:ext uri="{FF2B5EF4-FFF2-40B4-BE49-F238E27FC236}">
+              <a16:creationId xmlns:a16="http://schemas.microsoft.com/office/drawing/2014/main" id="{A7BAF184-0C6A-2198-40C3-2817AA8E4BC7}"/>
+            </a:ext>
+          </a:extLst>
+        </p:cNvPr>
+        <p:cNvGrpSpPr/>
+        <p:nvPr/>
+      </p:nvGrpSpPr>
+      <p:grpSpPr>
+        <a:xfrm>
+          <a:off x="0" y="0"/>
+          <a:ext cx="0" cy="0"/>
+          <a:chOff x="0" y="0"/>
+          <a:chExt cx="0" cy="0"/>
+        </a:xfrm>
+      </p:grpSpPr>
+      <p:sp>
+        <p:nvSpPr>
+          <p:cNvPr id="2" name="Titel 1">
+            <a:extLst>
+              <a:ext uri="{FF2B5EF4-FFF2-40B4-BE49-F238E27FC236}">
+                <a16:creationId xmlns:a16="http://schemas.microsoft.com/office/drawing/2014/main" id="{3F951CA5-EC8B-CAFB-3356-16D9576EC0A8}"/>
+              </a:ext>
+            </a:extLst>
+          </p:cNvPr>
+          <p:cNvSpPr>
+            <a:spLocks noGrp="1"/>
+          </p:cNvSpPr>
+          <p:nvPr>
+            <p:ph type="title"/>
+          </p:nvPr>
+        </p:nvSpPr>
+        <p:spPr/>
+        <p:txBody>
+          <a:bodyPr/>
+          <a:lstStyle/>
+          <a:p>
+            <a:r>
+              <a:rPr lang="de-DE" dirty="0"/>
+              <a:t>Aufgabe 4.2</a:t>
+            </a:r>
+          </a:p>
+        </p:txBody>
+      </p:sp>
+      <p:sp>
+        <p:nvSpPr>
+          <p:cNvPr id="6" name="Content Placeholder 5">
+            <a:extLst>
+              <a:ext uri="{FF2B5EF4-FFF2-40B4-BE49-F238E27FC236}">
+                <a16:creationId xmlns:a16="http://schemas.microsoft.com/office/drawing/2014/main" id="{BE7E7E94-C46F-0348-AC8E-ADCCF4BACA24}"/>
+              </a:ext>
+            </a:extLst>
+          </p:cNvPr>
+          <p:cNvSpPr>
+            <a:spLocks noGrp="1"/>
+          </p:cNvSpPr>
+          <p:nvPr>
+            <p:ph idx="1"/>
+          </p:nvPr>
+        </p:nvSpPr>
+        <p:spPr/>
+        <p:txBody>
+          <a:bodyPr/>
+          <a:lstStyle/>
+          <a:p>
+            <a:pPr marL="457200" indent="-457200">
+              <a:buAutoNum type="alphaLcParenR"/>
+            </a:pPr>
+            <a:r>
+              <a:rPr lang="en-GB" dirty="0">
+                <a:cs typeface="Arial"/>
+              </a:rPr>
+              <a:t>6 Knoten und 10 </a:t>
+            </a:r>
+            <a:r>
+              <a:rPr lang="en-GB" dirty="0" err="1">
+                <a:cs typeface="Arial"/>
+              </a:rPr>
+              <a:t>Zweige</a:t>
+            </a:r>
+            <a:r>
+              <a:rPr lang="en-GB" dirty="0">
+                <a:cs typeface="Arial"/>
+              </a:rPr>
+              <a:t>: </a:t>
+            </a:r>
+            <a:endParaRPr lang="en-US" dirty="0"/>
+          </a:p>
+          <a:p>
+            <a:pPr marL="0" indent="0">
+              <a:buNone/>
+            </a:pPr>
+            <a:r>
+              <a:rPr lang="en-GB" dirty="0">
+                <a:cs typeface="Arial"/>
+              </a:rPr>
+              <a:t>    m = z - (k-1) = 10 – 5 = 5 </a:t>
+            </a:r>
+            <a:r>
+              <a:rPr lang="en-GB" dirty="0" err="1">
+                <a:cs typeface="Arial"/>
+              </a:rPr>
+              <a:t>unabhängige</a:t>
+            </a:r>
+            <a:r>
+              <a:rPr lang="en-GB" dirty="0">
+                <a:cs typeface="Arial"/>
+              </a:rPr>
+              <a:t> </a:t>
+            </a:r>
+            <a:r>
+              <a:rPr lang="en-GB" dirty="0" err="1">
+                <a:cs typeface="Arial"/>
+              </a:rPr>
+              <a:t>Maschengleichungen</a:t>
+            </a:r>
+            <a:endParaRPr lang="en-GB" dirty="0">
+              <a:cs typeface="Arial"/>
+            </a:endParaRPr>
+          </a:p>
+          <a:p>
+            <a:pPr marL="0" indent="0">
+              <a:buNone/>
+            </a:pPr>
+            <a:endParaRPr lang="en-GB" dirty="0">
+              <a:cs typeface="Arial"/>
+            </a:endParaRPr>
+          </a:p>
+          <a:p>
+            <a:pPr marL="0" indent="0">
+              <a:buNone/>
+            </a:pPr>
+            <a:endParaRPr lang="en-GB" dirty="0">
+              <a:cs typeface="Arial"/>
+            </a:endParaRPr>
+          </a:p>
+        </p:txBody>
+      </p:sp>
+      <p:pic>
+        <p:nvPicPr>
+          <p:cNvPr id="3" name="Picture 2" descr="A diagram of a diagram&#10;&#10;AI-generated content may be incorrect.">
+            <a:extLst>
+              <a:ext uri="{FF2B5EF4-FFF2-40B4-BE49-F238E27FC236}">
+                <a16:creationId xmlns:a16="http://schemas.microsoft.com/office/drawing/2014/main" id="{56576E2D-12A0-6B28-41FB-1D1AE4A72E7C}"/>
+              </a:ext>
+            </a:extLst>
+          </p:cNvPr>
+          <p:cNvPicPr>
+            <a:picLocks noChangeAspect="1"/>
+          </p:cNvPicPr>
+          <p:nvPr/>
+        </p:nvPicPr>
+        <p:blipFill>
+          <a:blip r:embed="rId2"/>
+          <a:stretch>
+            <a:fillRect/>
+          </a:stretch>
+        </p:blipFill>
+        <p:spPr>
+          <a:xfrm>
+            <a:off x="2303517" y="2426313"/>
+            <a:ext cx="7593725" cy="3835926"/>
+          </a:xfrm>
+          <a:prstGeom prst="rect">
+            <a:avLst/>
+          </a:prstGeom>
+        </p:spPr>
+      </p:pic>
+    </p:spTree>
+    <p:extLst>
+      <p:ext uri="{BB962C8B-B14F-4D97-AF65-F5344CB8AC3E}">
+        <p14:creationId xmlns:p14="http://schemas.microsoft.com/office/powerpoint/2010/main" val="2904793170"/>
+      </p:ext>
+    </p:extLst>
+  </p:cSld>
+  <p:clrMapOvr>
+    <a:masterClrMapping/>
+  </p:clrMapOvr>
+</p:sld>
+</file>
+
+<file path=ppt/slides/slide13.xml><?xml version="1.0" encoding="utf-8"?>
+<p:sld xmlns:a="http://schemas.openxmlformats.org/drawingml/2006/main" xmlns:r="http://schemas.openxmlformats.org/officeDocument/2006/relationships" xmlns:p="http://schemas.openxmlformats.org/presentationml/2006/main">
+  <p:cSld>
+    <p:spTree>
+      <p:nvGrpSpPr>
+        <p:cNvPr id="1" name="">
+          <a:extLst>
+            <a:ext uri="{FF2B5EF4-FFF2-40B4-BE49-F238E27FC236}">
+              <a16:creationId xmlns:a16="http://schemas.microsoft.com/office/drawing/2014/main" id="{7B50669D-181B-5457-72E4-733900FCAE6C}"/>
+            </a:ext>
+          </a:extLst>
+        </p:cNvPr>
+        <p:cNvGrpSpPr/>
+        <p:nvPr/>
+      </p:nvGrpSpPr>
+      <p:grpSpPr>
+        <a:xfrm>
+          <a:off x="0" y="0"/>
+          <a:ext cx="0" cy="0"/>
+          <a:chOff x="0" y="0"/>
+          <a:chExt cx="0" cy="0"/>
+        </a:xfrm>
+      </p:grpSpPr>
+      <p:sp>
+        <p:nvSpPr>
+          <p:cNvPr id="2" name="Titel 1">
+            <a:extLst>
+              <a:ext uri="{FF2B5EF4-FFF2-40B4-BE49-F238E27FC236}">
+                <a16:creationId xmlns:a16="http://schemas.microsoft.com/office/drawing/2014/main" id="{B25BE223-7331-D302-EA12-F7786CDBAB97}"/>
+              </a:ext>
+            </a:extLst>
+          </p:cNvPr>
+          <p:cNvSpPr>
+            <a:spLocks noGrp="1"/>
+          </p:cNvSpPr>
+          <p:nvPr>
+            <p:ph type="title"/>
+          </p:nvPr>
+        </p:nvSpPr>
+        <p:spPr/>
+        <p:txBody>
+          <a:bodyPr/>
+          <a:lstStyle/>
+          <a:p>
+            <a:r>
+              <a:rPr lang="de-DE" dirty="0"/>
+              <a:t>Aufgabe 4.2</a:t>
+            </a:r>
+          </a:p>
+        </p:txBody>
+      </p:sp>
+      <p:sp>
+        <p:nvSpPr>
+          <p:cNvPr id="6" name="Content Placeholder 5">
+            <a:extLst>
+              <a:ext uri="{FF2B5EF4-FFF2-40B4-BE49-F238E27FC236}">
+                <a16:creationId xmlns:a16="http://schemas.microsoft.com/office/drawing/2014/main" id="{D298CE90-EC75-4CE4-6BED-5925E90A217A}"/>
+              </a:ext>
+            </a:extLst>
+          </p:cNvPr>
+          <p:cNvSpPr>
+            <a:spLocks noGrp="1"/>
+          </p:cNvSpPr>
+          <p:nvPr>
+            <p:ph idx="1"/>
+          </p:nvPr>
+        </p:nvSpPr>
+        <p:spPr/>
+        <p:txBody>
+          <a:bodyPr/>
+          <a:lstStyle/>
+          <a:p>
+            <a:pPr marL="0" indent="0">
+              <a:buNone/>
+            </a:pPr>
+            <a:r>
+              <a:rPr lang="en-GB" dirty="0">
+                <a:cs typeface="Arial"/>
+              </a:rPr>
+              <a:t>b) </a:t>
+            </a:r>
+          </a:p>
+          <a:p>
+            <a:pPr marL="0" indent="0">
+              <a:buNone/>
+            </a:pPr>
+            <a:endParaRPr lang="en-GB" dirty="0">
+              <a:cs typeface="Arial"/>
+            </a:endParaRPr>
+          </a:p>
+          <a:p>
+            <a:pPr marL="0" indent="0">
+              <a:buNone/>
+            </a:pPr>
+            <a:endParaRPr lang="en-GB" dirty="0">
+              <a:cs typeface="Arial"/>
+            </a:endParaRPr>
+          </a:p>
+        </p:txBody>
+      </p:sp>
+      <p:pic>
+        <p:nvPicPr>
+          <p:cNvPr id="3" name="Picture 2" descr="A black background with white circles&#10;&#10;AI-generated content may be incorrect.">
+            <a:extLst>
+              <a:ext uri="{FF2B5EF4-FFF2-40B4-BE49-F238E27FC236}">
+                <a16:creationId xmlns:a16="http://schemas.microsoft.com/office/drawing/2014/main" id="{D7206A18-DF2A-8FD0-094B-28D39A8B8BDB}"/>
+              </a:ext>
+            </a:extLst>
+          </p:cNvPr>
+          <p:cNvPicPr>
+            <a:picLocks noChangeAspect="1"/>
+          </p:cNvPicPr>
+          <p:nvPr/>
+        </p:nvPicPr>
+        <p:blipFill>
+          <a:blip r:embed="rId2"/>
+          <a:stretch>
+            <a:fillRect/>
+          </a:stretch>
+        </p:blipFill>
+        <p:spPr>
+          <a:xfrm>
+            <a:off x="3521296" y="874190"/>
+            <a:ext cx="5294092" cy="5389342"/>
+          </a:xfrm>
+          <a:prstGeom prst="rect">
+            <a:avLst/>
+          </a:prstGeom>
+        </p:spPr>
+      </p:pic>
+    </p:spTree>
+    <p:extLst>
+      <p:ext uri="{BB962C8B-B14F-4D97-AF65-F5344CB8AC3E}">
+        <p14:creationId xmlns:p14="http://schemas.microsoft.com/office/powerpoint/2010/main" val="1601421726"/>
+      </p:ext>
+    </p:extLst>
+  </p:cSld>
+  <p:clrMapOvr>
+    <a:masterClrMapping/>
+  </p:clrMapOvr>
+</p:sld>
+</file>
+
+<file path=ppt/slides/slide14.xml><?xml version="1.0" encoding="utf-8"?>
+<p:sld xmlns:a="http://schemas.openxmlformats.org/drawingml/2006/main" xmlns:r="http://schemas.openxmlformats.org/officeDocument/2006/relationships" xmlns:p="http://schemas.openxmlformats.org/presentationml/2006/main">
+  <p:cSld>
+    <p:spTree>
+      <p:nvGrpSpPr>
+        <p:cNvPr id="1" name="">
+          <a:extLst>
+            <a:ext uri="{FF2B5EF4-FFF2-40B4-BE49-F238E27FC236}">
+              <a16:creationId xmlns:a16="http://schemas.microsoft.com/office/drawing/2014/main" id="{3EAEC84B-2F88-FFF8-B544-28345B3487D4}"/>
+            </a:ext>
+          </a:extLst>
+        </p:cNvPr>
+        <p:cNvGrpSpPr/>
+        <p:nvPr/>
+      </p:nvGrpSpPr>
+      <p:grpSpPr>
+        <a:xfrm>
+          <a:off x="0" y="0"/>
+          <a:ext cx="0" cy="0"/>
+          <a:chOff x="0" y="0"/>
+          <a:chExt cx="0" cy="0"/>
+        </a:xfrm>
+      </p:grpSpPr>
+      <p:sp>
+        <p:nvSpPr>
+          <p:cNvPr id="2" name="Titel 1">
+            <a:extLst>
+              <a:ext uri="{FF2B5EF4-FFF2-40B4-BE49-F238E27FC236}">
+                <a16:creationId xmlns:a16="http://schemas.microsoft.com/office/drawing/2014/main" id="{0474A6A7-28A8-85B5-3379-184F61E1951D}"/>
+              </a:ext>
+            </a:extLst>
+          </p:cNvPr>
+          <p:cNvSpPr>
+            <a:spLocks noGrp="1"/>
+          </p:cNvSpPr>
+          <p:nvPr>
+            <p:ph type="title"/>
+          </p:nvPr>
+        </p:nvSpPr>
+        <p:spPr/>
+        <p:txBody>
+          <a:bodyPr/>
+          <a:lstStyle/>
+          <a:p>
+            <a:r>
+              <a:rPr lang="de-DE" dirty="0"/>
+              <a:t>Aufgabe 4.2</a:t>
+            </a:r>
+          </a:p>
+        </p:txBody>
+      </p:sp>
+      <p:sp>
+        <p:nvSpPr>
+          <p:cNvPr id="6" name="Content Placeholder 5">
+            <a:extLst>
+              <a:ext uri="{FF2B5EF4-FFF2-40B4-BE49-F238E27FC236}">
+                <a16:creationId xmlns:a16="http://schemas.microsoft.com/office/drawing/2014/main" id="{5E683C92-8F9A-AC9D-C9C2-B2CF265C5CF8}"/>
+              </a:ext>
+            </a:extLst>
+          </p:cNvPr>
+          <p:cNvSpPr>
+            <a:spLocks noGrp="1"/>
+          </p:cNvSpPr>
+          <p:nvPr>
+            <p:ph idx="1"/>
+          </p:nvPr>
+        </p:nvSpPr>
+        <p:spPr/>
+        <p:txBody>
+          <a:bodyPr/>
+          <a:lstStyle/>
+          <a:p>
+            <a:pPr marL="0" indent="0">
+              <a:buNone/>
+            </a:pPr>
+            <a:r>
+              <a:rPr lang="en-GB" dirty="0">
+                <a:cs typeface="Arial"/>
+              </a:rPr>
+              <a:t>c) </a:t>
+            </a:r>
+          </a:p>
+          <a:p>
+            <a:pPr marL="0" indent="0">
+              <a:buNone/>
+            </a:pPr>
+            <a:endParaRPr lang="en-GB" dirty="0">
+              <a:cs typeface="Arial"/>
+            </a:endParaRPr>
+          </a:p>
+          <a:p>
+            <a:pPr marL="0" indent="0">
+              <a:buNone/>
+            </a:pPr>
+            <a:endParaRPr lang="en-GB" dirty="0">
+              <a:cs typeface="Arial"/>
+            </a:endParaRPr>
+          </a:p>
+        </p:txBody>
+      </p:sp>
+      <p:pic>
+        <p:nvPicPr>
+          <p:cNvPr id="5" name="Graphic 4">
+            <a:extLst>
+              <a:ext uri="{FF2B5EF4-FFF2-40B4-BE49-F238E27FC236}">
+                <a16:creationId xmlns:a16="http://schemas.microsoft.com/office/drawing/2014/main" id="{B4F185DE-55D1-6B84-64CF-616C64BD7748}"/>
+              </a:ext>
+            </a:extLst>
+          </p:cNvPr>
+          <p:cNvPicPr>
+            <a:picLocks noChangeAspect="1"/>
+          </p:cNvPicPr>
+          <p:nvPr/>
+        </p:nvPicPr>
+        <p:blipFill>
+          <a:blip r:embed="rId2">
+            <a:extLst>
+              <a:ext uri="{96DAC541-7B7A-43D3-8B79-37D633B846F1}">
+                <asvg:svgBlip xmlns:asvg="http://schemas.microsoft.com/office/drawing/2016/SVG/main" r:embed="rId3"/>
+              </a:ext>
+            </a:extLst>
+          </a:blip>
+          <a:stretch>
+            <a:fillRect/>
+          </a:stretch>
+        </p:blipFill>
+        <p:spPr>
+          <a:xfrm>
+            <a:off x="2469326" y="1647041"/>
+            <a:ext cx="7118309" cy="3563917"/>
+          </a:xfrm>
+          <a:prstGeom prst="rect">
+            <a:avLst/>
+          </a:prstGeom>
+        </p:spPr>
+      </p:pic>
+      <p:sp>
+        <p:nvSpPr>
+          <p:cNvPr id="7" name="Rectangle 6">
+            <a:extLst>
+              <a:ext uri="{FF2B5EF4-FFF2-40B4-BE49-F238E27FC236}">
+                <a16:creationId xmlns:a16="http://schemas.microsoft.com/office/drawing/2014/main" id="{1E72670B-9C3E-D71D-C990-1D720B0D9ECA}"/>
+              </a:ext>
+            </a:extLst>
+          </p:cNvPr>
+          <p:cNvSpPr/>
+          <p:nvPr/>
+        </p:nvSpPr>
+        <p:spPr>
+          <a:xfrm>
+            <a:off x="4770699" y="5016660"/>
+            <a:ext cx="3865943" cy="190982"/>
+          </a:xfrm>
+          <a:prstGeom prst="rect">
+            <a:avLst/>
+          </a:prstGeom>
+          <a:solidFill>
+            <a:schemeClr val="bg1"/>
+          </a:solidFill>
+          <a:ln w="12700">
+            <a:noFill/>
+          </a:ln>
+        </p:spPr>
+        <p:style>
+          <a:lnRef idx="2">
+            <a:schemeClr val="accent1">
+              <a:shade val="50000"/>
+            </a:schemeClr>
+          </a:lnRef>
+          <a:fillRef idx="1">
+            <a:schemeClr val="accent1"/>
+          </a:fillRef>
+          <a:effectRef idx="0">
+            <a:schemeClr val="accent1"/>
+          </a:effectRef>
+          <a:fontRef idx="minor">
+            <a:schemeClr val="lt1"/>
+          </a:fontRef>
+        </p:style>
+        <p:txBody>
+          <a:bodyPr rtlCol="0" anchor="ctr"/>
+          <a:lstStyle/>
+          <a:p>
+            <a:pPr algn="ctr"/>
+            <a:endParaRPr lang="en-GB"/>
+          </a:p>
+        </p:txBody>
+      </p:sp>
+    </p:spTree>
+    <p:extLst>
+      <p:ext uri="{BB962C8B-B14F-4D97-AF65-F5344CB8AC3E}">
+        <p14:creationId xmlns:p14="http://schemas.microsoft.com/office/powerpoint/2010/main" val="2529189648"/>
+      </p:ext>
+    </p:extLst>
+  </p:cSld>
+  <p:clrMapOvr>
+    <a:masterClrMapping/>
+  </p:clrMapOvr>
+</p:sld>
+</file>
+
+<file path=ppt/slides/slide15.xml><?xml version="1.0" encoding="utf-8"?>
+<p:sld xmlns:a="http://schemas.openxmlformats.org/drawingml/2006/main" xmlns:r="http://schemas.openxmlformats.org/officeDocument/2006/relationships" xmlns:p="http://schemas.openxmlformats.org/presentationml/2006/main">
+  <p:cSld>
+    <p:spTree>
+      <p:nvGrpSpPr>
+        <p:cNvPr id="1" name="">
+          <a:extLst>
+            <a:ext uri="{FF2B5EF4-FFF2-40B4-BE49-F238E27FC236}">
+              <a16:creationId xmlns:a16="http://schemas.microsoft.com/office/drawing/2014/main" id="{1C96CD1D-5743-2F49-851E-20BC8536E9AD}"/>
+            </a:ext>
+          </a:extLst>
+        </p:cNvPr>
+        <p:cNvGrpSpPr/>
+        <p:nvPr/>
+      </p:nvGrpSpPr>
+      <p:grpSpPr>
+        <a:xfrm>
+          <a:off x="0" y="0"/>
+          <a:ext cx="0" cy="0"/>
+          <a:chOff x="0" y="0"/>
+          <a:chExt cx="0" cy="0"/>
+        </a:xfrm>
+      </p:grpSpPr>
+      <p:sp>
+        <p:nvSpPr>
+          <p:cNvPr id="2" name="Titel 1">
+            <a:extLst>
+              <a:ext uri="{FF2B5EF4-FFF2-40B4-BE49-F238E27FC236}">
+                <a16:creationId xmlns:a16="http://schemas.microsoft.com/office/drawing/2014/main" id="{2C2378E7-2852-6F4B-4E59-7DAF596A613B}"/>
+              </a:ext>
+            </a:extLst>
+          </p:cNvPr>
+          <p:cNvSpPr>
+            <a:spLocks noGrp="1"/>
+          </p:cNvSpPr>
+          <p:nvPr>
+            <p:ph type="title"/>
+          </p:nvPr>
+        </p:nvSpPr>
+        <p:spPr/>
+        <p:txBody>
+          <a:bodyPr/>
+          <a:lstStyle/>
+          <a:p>
+            <a:r>
+              <a:rPr lang="de-DE" dirty="0"/>
+              <a:t>Aufgabe 4.2</a:t>
+            </a:r>
+          </a:p>
+        </p:txBody>
+      </p:sp>
+      <p:sp>
+        <p:nvSpPr>
+          <p:cNvPr id="6" name="Content Placeholder 5">
+            <a:extLst>
+              <a:ext uri="{FF2B5EF4-FFF2-40B4-BE49-F238E27FC236}">
+                <a16:creationId xmlns:a16="http://schemas.microsoft.com/office/drawing/2014/main" id="{A6F318D9-A6A2-C7B4-9E00-3326E6F318DA}"/>
+              </a:ext>
+            </a:extLst>
+          </p:cNvPr>
+          <p:cNvSpPr>
+            <a:spLocks noGrp="1"/>
+          </p:cNvSpPr>
+          <p:nvPr>
+            <p:ph idx="1"/>
+          </p:nvPr>
+        </p:nvSpPr>
+        <p:spPr/>
+        <p:txBody>
+          <a:bodyPr/>
+          <a:lstStyle/>
+          <a:p>
+            <a:pPr marL="0" indent="0">
+              <a:buNone/>
+            </a:pPr>
+            <a:r>
+              <a:rPr lang="en-GB" dirty="0">
+                <a:cs typeface="Arial"/>
+              </a:rPr>
+              <a:t>d) </a:t>
+            </a:r>
+          </a:p>
+          <a:p>
+            <a:pPr marL="0" indent="0">
+              <a:buNone/>
+            </a:pPr>
+            <a:endParaRPr lang="en-GB" dirty="0">
+              <a:cs typeface="Arial"/>
+            </a:endParaRPr>
+          </a:p>
+          <a:p>
+            <a:pPr marL="0" indent="0">
+              <a:buNone/>
+            </a:pPr>
+            <a:endParaRPr lang="en-GB" dirty="0">
+              <a:cs typeface="Arial"/>
+            </a:endParaRPr>
+          </a:p>
+        </p:txBody>
+      </p:sp>
+      <p:sp>
+        <p:nvSpPr>
+          <p:cNvPr id="7" name="Rectangle 6">
+            <a:extLst>
+              <a:ext uri="{FF2B5EF4-FFF2-40B4-BE49-F238E27FC236}">
+                <a16:creationId xmlns:a16="http://schemas.microsoft.com/office/drawing/2014/main" id="{E1D270DA-534A-18F0-6A32-7A1F004BCFF7}"/>
+              </a:ext>
+            </a:extLst>
+          </p:cNvPr>
+          <p:cNvSpPr/>
+          <p:nvPr/>
+        </p:nvSpPr>
+        <p:spPr>
+          <a:xfrm>
+            <a:off x="4770699" y="5016660"/>
+            <a:ext cx="3865943" cy="190982"/>
+          </a:xfrm>
+          <a:prstGeom prst="rect">
+            <a:avLst/>
+          </a:prstGeom>
+          <a:solidFill>
+            <a:schemeClr val="bg1"/>
+          </a:solidFill>
+          <a:ln w="12700">
+            <a:noFill/>
+          </a:ln>
+        </p:spPr>
+        <p:style>
+          <a:lnRef idx="2">
+            <a:schemeClr val="accent1">
+              <a:shade val="50000"/>
+            </a:schemeClr>
+          </a:lnRef>
+          <a:fillRef idx="1">
+            <a:schemeClr val="accent1"/>
+          </a:fillRef>
+          <a:effectRef idx="0">
+            <a:schemeClr val="accent1"/>
+          </a:effectRef>
+          <a:fontRef idx="minor">
+            <a:schemeClr val="lt1"/>
+          </a:fontRef>
+        </p:style>
+        <p:txBody>
+          <a:bodyPr rtlCol="0" anchor="ctr"/>
+          <a:lstStyle/>
+          <a:p>
+            <a:pPr algn="ctr"/>
+            <a:endParaRPr lang="en-GB"/>
+          </a:p>
+        </p:txBody>
+      </p:sp>
+      <p:pic>
+        <p:nvPicPr>
+          <p:cNvPr id="3" name="Picture 2" descr="A math equations with numbers and symbols&#10;&#10;AI-generated content may be incorrect.">
+            <a:extLst>
+              <a:ext uri="{FF2B5EF4-FFF2-40B4-BE49-F238E27FC236}">
+                <a16:creationId xmlns:a16="http://schemas.microsoft.com/office/drawing/2014/main" id="{DC2770F5-D99D-D103-198E-D3EA18146168}"/>
+              </a:ext>
+            </a:extLst>
+          </p:cNvPr>
+          <p:cNvPicPr>
+            <a:picLocks noChangeAspect="1"/>
+          </p:cNvPicPr>
+          <p:nvPr/>
+        </p:nvPicPr>
+        <p:blipFill>
+          <a:blip r:embed="rId2"/>
+          <a:srcRect t="2586" r="1042" b="1024"/>
+          <a:stretch>
+            <a:fillRect/>
+          </a:stretch>
+        </p:blipFill>
+        <p:spPr>
+          <a:xfrm>
+            <a:off x="1254466" y="1714500"/>
+            <a:ext cx="4590119" cy="2162115"/>
+          </a:xfrm>
+          <a:prstGeom prst="rect">
+            <a:avLst/>
+          </a:prstGeom>
+        </p:spPr>
+      </p:pic>
+    </p:spTree>
+    <p:extLst>
+      <p:ext uri="{BB962C8B-B14F-4D97-AF65-F5344CB8AC3E}">
+        <p14:creationId xmlns:p14="http://schemas.microsoft.com/office/powerpoint/2010/main" val="2752720947"/>
+      </p:ext>
+    </p:extLst>
+  </p:cSld>
+  <p:clrMapOvr>
+    <a:masterClrMapping/>
+  </p:clrMapOvr>
+</p:sld>
+</file>
+
+<file path=ppt/slides/slide16.xml><?xml version="1.0" encoding="utf-8"?>
+<p:sld xmlns:a="http://schemas.openxmlformats.org/drawingml/2006/main" xmlns:r="http://schemas.openxmlformats.org/officeDocument/2006/relationships" xmlns:p="http://schemas.openxmlformats.org/presentationml/2006/main">
+  <p:cSld>
+    <p:spTree>
+      <p:nvGrpSpPr>
+        <p:cNvPr id="1" name="">
+          <a:extLst>
+            <a:ext uri="{FF2B5EF4-FFF2-40B4-BE49-F238E27FC236}">
+              <a16:creationId xmlns:a16="http://schemas.microsoft.com/office/drawing/2014/main" id="{DDD47F33-5EC5-B9F7-B0D6-41508B790C12}"/>
+            </a:ext>
+          </a:extLst>
+        </p:cNvPr>
+        <p:cNvGrpSpPr/>
+        <p:nvPr/>
+      </p:nvGrpSpPr>
+      <p:grpSpPr>
+        <a:xfrm>
+          <a:off x="0" y="0"/>
+          <a:ext cx="0" cy="0"/>
+          <a:chOff x="0" y="0"/>
+          <a:chExt cx="0" cy="0"/>
+        </a:xfrm>
+      </p:grpSpPr>
+      <p:sp>
+        <p:nvSpPr>
+          <p:cNvPr id="2" name="Titel 1">
+            <a:extLst>
+              <a:ext uri="{FF2B5EF4-FFF2-40B4-BE49-F238E27FC236}">
+                <a16:creationId xmlns:a16="http://schemas.microsoft.com/office/drawing/2014/main" id="{1BCC4FAA-AFD2-C32C-3FE8-627193F1AC75}"/>
+              </a:ext>
+            </a:extLst>
+          </p:cNvPr>
+          <p:cNvSpPr>
+            <a:spLocks noGrp="1"/>
+          </p:cNvSpPr>
+          <p:nvPr>
+            <p:ph type="title"/>
+          </p:nvPr>
+        </p:nvSpPr>
+        <p:spPr/>
+        <p:txBody>
+          <a:bodyPr/>
+          <a:lstStyle/>
+          <a:p>
+            <a:r>
+              <a:rPr lang="de-DE" dirty="0"/>
+              <a:t>Aufgabe 4.2</a:t>
+            </a:r>
+          </a:p>
+        </p:txBody>
+      </p:sp>
+      <p:sp>
+        <p:nvSpPr>
+          <p:cNvPr id="6" name="Content Placeholder 5">
+            <a:extLst>
+              <a:ext uri="{FF2B5EF4-FFF2-40B4-BE49-F238E27FC236}">
+                <a16:creationId xmlns:a16="http://schemas.microsoft.com/office/drawing/2014/main" id="{E528317A-EEC7-8BD2-BF79-A50C4D90FE9B}"/>
+              </a:ext>
+            </a:extLst>
+          </p:cNvPr>
+          <p:cNvSpPr>
+            <a:spLocks noGrp="1"/>
+          </p:cNvSpPr>
+          <p:nvPr>
+            <p:ph idx="1"/>
+          </p:nvPr>
+        </p:nvSpPr>
+        <p:spPr/>
+        <p:txBody>
+          <a:bodyPr/>
+          <a:lstStyle/>
+          <a:p>
+            <a:pPr marL="0" indent="0">
+              <a:buNone/>
+            </a:pPr>
+            <a:r>
+              <a:rPr lang="en-GB" dirty="0">
+                <a:cs typeface="Arial"/>
+              </a:rPr>
+              <a:t>e) k-1 = 6-1 = 5 linear </a:t>
+            </a:r>
+            <a:r>
+              <a:rPr lang="en-GB" dirty="0" err="1">
+                <a:cs typeface="Arial"/>
+              </a:rPr>
+              <a:t>unabhängige</a:t>
+            </a:r>
+            <a:r>
+              <a:rPr lang="en-GB" dirty="0">
+                <a:cs typeface="Arial"/>
+              </a:rPr>
+              <a:t> </a:t>
+            </a:r>
+            <a:r>
+              <a:rPr lang="en-GB" dirty="0" err="1">
+                <a:cs typeface="Arial"/>
+              </a:rPr>
+              <a:t>Knotengleichungen</a:t>
+            </a:r>
+          </a:p>
+          <a:p>
+            <a:pPr marL="0" indent="0">
+              <a:buNone/>
+            </a:pPr>
+            <a:endParaRPr lang="en-GB" dirty="0">
+              <a:cs typeface="Arial"/>
+            </a:endParaRPr>
+          </a:p>
+          <a:p>
+            <a:pPr marL="0" indent="0">
+              <a:buNone/>
+            </a:pPr>
+            <a:endParaRPr lang="en-GB" dirty="0">
+              <a:cs typeface="Arial"/>
+            </a:endParaRPr>
+          </a:p>
+        </p:txBody>
+      </p:sp>
+      <p:sp>
+        <p:nvSpPr>
+          <p:cNvPr id="7" name="Rectangle 6">
+            <a:extLst>
+              <a:ext uri="{FF2B5EF4-FFF2-40B4-BE49-F238E27FC236}">
+                <a16:creationId xmlns:a16="http://schemas.microsoft.com/office/drawing/2014/main" id="{9EF66330-5259-E40E-1585-6C2EDADC4C34}"/>
+              </a:ext>
+            </a:extLst>
+          </p:cNvPr>
+          <p:cNvSpPr/>
+          <p:nvPr/>
+        </p:nvSpPr>
+        <p:spPr>
+          <a:xfrm>
+            <a:off x="4770699" y="5016660"/>
+            <a:ext cx="3865943" cy="190982"/>
+          </a:xfrm>
+          <a:prstGeom prst="rect">
+            <a:avLst/>
+          </a:prstGeom>
+          <a:solidFill>
+            <a:schemeClr val="bg1"/>
+          </a:solidFill>
+          <a:ln w="12700">
+            <a:noFill/>
+          </a:ln>
+        </p:spPr>
+        <p:style>
+          <a:lnRef idx="2">
+            <a:schemeClr val="accent1">
+              <a:shade val="50000"/>
+            </a:schemeClr>
+          </a:lnRef>
+          <a:fillRef idx="1">
+            <a:schemeClr val="accent1"/>
+          </a:fillRef>
+          <a:effectRef idx="0">
+            <a:schemeClr val="accent1"/>
+          </a:effectRef>
+          <a:fontRef idx="minor">
+            <a:schemeClr val="lt1"/>
+          </a:fontRef>
+        </p:style>
+        <p:txBody>
+          <a:bodyPr rtlCol="0" anchor="ctr"/>
+          <a:lstStyle/>
+          <a:p>
+            <a:pPr algn="ctr"/>
+            <a:endParaRPr lang="en-GB"/>
+          </a:p>
+        </p:txBody>
+      </p:sp>
+      <p:pic>
+        <p:nvPicPr>
+          <p:cNvPr id="4" name="Picture 3" descr="A math equations with black text&#10;&#10;AI-generated content may be incorrect.">
+            <a:extLst>
+              <a:ext uri="{FF2B5EF4-FFF2-40B4-BE49-F238E27FC236}">
+                <a16:creationId xmlns:a16="http://schemas.microsoft.com/office/drawing/2014/main" id="{5B826573-1DDA-DFFB-0561-49099777D3B0}"/>
+              </a:ext>
+            </a:extLst>
+          </p:cNvPr>
+          <p:cNvPicPr>
+            <a:picLocks noChangeAspect="1"/>
+          </p:cNvPicPr>
+          <p:nvPr/>
+        </p:nvPicPr>
+        <p:blipFill>
+          <a:blip r:embed="rId2"/>
+          <a:srcRect r="581" b="-347"/>
+          <a:stretch>
+            <a:fillRect/>
+          </a:stretch>
+        </p:blipFill>
+        <p:spPr>
+          <a:xfrm>
+            <a:off x="1054320" y="2325306"/>
+            <a:ext cx="6601291" cy="2795797"/>
+          </a:xfrm>
+          <a:prstGeom prst="rect">
+            <a:avLst/>
+          </a:prstGeom>
+        </p:spPr>
+      </p:pic>
+    </p:spTree>
+    <p:extLst>
+      <p:ext uri="{BB962C8B-B14F-4D97-AF65-F5344CB8AC3E}">
+        <p14:creationId xmlns:p14="http://schemas.microsoft.com/office/powerpoint/2010/main" val="2295157053"/>
       </p:ext>
     </p:extLst>
   </p:cSld>
@@ -12012,6 +13173,15 @@
 </file>
 
 <file path=customXml/item1.xml><?xml version="1.0" encoding="utf-8"?>
+<?mso-contentType ?>
+<FormTemplates xmlns="http://schemas.microsoft.com/sharepoint/v3/contenttype/forms">
+  <Display>DocumentLibraryForm</Display>
+  <Edit>DocumentLibraryForm</Edit>
+  <New>DocumentLibraryForm</New>
+</FormTemplates>
+</file>
+
+<file path=customXml/item2.xml><?xml version="1.0" encoding="utf-8"?>
 <ct:contentTypeSchema xmlns:ct="http://schemas.microsoft.com/office/2006/metadata/contentType" xmlns:ma="http://schemas.microsoft.com/office/2006/metadata/properties/metaAttributes" ct:_="" ma:_="" ma:contentTypeName="Document" ma:contentTypeID="0x0101008799F1A435591F42BCDE2557FA51CDDA" ma:contentTypeVersion="15" ma:contentTypeDescription="Create a new document." ma:contentTypeScope="" ma:versionID="baa9c65a0a545f65583643df3cf8d9f4">
   <xsd:schema xmlns:xsd="http://www.w3.org/2001/XMLSchema" xmlns:xs="http://www.w3.org/2001/XMLSchema" xmlns:p="http://schemas.microsoft.com/office/2006/metadata/properties" xmlns:ns2="f957fcc5-14ca-4ecf-9842-9f00d595875c" xmlns:ns3="e08cfc56-8307-41e5-898e-b333c51beffa" targetNamespace="http://schemas.microsoft.com/office/2006/metadata/properties" ma:root="true" ma:fieldsID="015d39312a6521742bc57e13b2dae392" ns2:_="" ns3:_="">
     <xsd:import namespace="f957fcc5-14ca-4ecf-9842-9f00d595875c"/>
@@ -12248,15 +13418,6 @@
 </ct:contentTypeSchema>
 </file>
 
-<file path=customXml/item2.xml><?xml version="1.0" encoding="utf-8"?>
-<?mso-contentType ?>
-<FormTemplates xmlns="http://schemas.microsoft.com/sharepoint/v3/contenttype/forms">
-  <Display>DocumentLibraryForm</Display>
-  <Edit>DocumentLibraryForm</Edit>
-  <New>DocumentLibraryForm</New>
-</FormTemplates>
-</file>
-
 <file path=customXml/item3.xml><?xml version="1.0" encoding="utf-8"?>
 <p:properties xmlns:p="http://schemas.microsoft.com/office/2006/metadata/properties" xmlns:xsi="http://www.w3.org/2001/XMLSchema-instance" xmlns:pc="http://schemas.microsoft.com/office/infopath/2007/PartnerControls">
   <documentManagement>
@@ -12269,6 +13430,14 @@
 </file>
 
 <file path=customXml/itemProps1.xml><?xml version="1.0" encoding="utf-8"?>
+<ds:datastoreItem xmlns:ds="http://schemas.openxmlformats.org/officeDocument/2006/customXml" ds:itemID="{AC48F4C2-72FB-464C-8474-E470A160399A}">
+  <ds:schemaRefs>
+    <ds:schemaRef ds:uri="http://schemas.microsoft.com/sharepoint/v3/contenttype/forms"/>
+  </ds:schemaRefs>
+</ds:datastoreItem>
+</file>
+
+<file path=customXml/itemProps2.xml><?xml version="1.0" encoding="utf-8"?>
 <ds:datastoreItem xmlns:ds="http://schemas.openxmlformats.org/officeDocument/2006/customXml" ds:itemID="{96F35E4A-19A6-42ED-B9B2-B9FDCAD1EAA1}">
   <ds:schemaRefs>
     <ds:schemaRef ds:uri="e08cfc56-8307-41e5-898e-b333c51beffa"/>
@@ -12283,14 +13452,6 @@
     <ds:schemaRef ds:uri="http://schemas.microsoft.com/office/infopath/2007/PartnerControls"/>
     <ds:schemaRef ds:uri="http://schemas.openxmlformats.org/package/2006/metadata/core-properties"/>
     <ds:schemaRef ds:uri="http://www.w3.org/2001/XMLSchema"/>
-  </ds:schemaRefs>
-</ds:datastoreItem>
-</file>
-
-<file path=customXml/itemProps2.xml><?xml version="1.0" encoding="utf-8"?>
-<ds:datastoreItem xmlns:ds="http://schemas.openxmlformats.org/officeDocument/2006/customXml" ds:itemID="{AC48F4C2-72FB-464C-8474-E470A160399A}">
-  <ds:schemaRefs>
-    <ds:schemaRef ds:uri="http://schemas.microsoft.com/sharepoint/v3/contenttype/forms"/>
   </ds:schemaRefs>
 </ds:datastoreItem>
 </file>

</xml_diff>

<commit_message>
Aufgabe 4.3 - hier bitte nochmal drauf schauen
</commit_message>
<xml_diff>
--- a/Probeklausur.pptx
+++ b/Probeklausur.pptx
@@ -5,10 +5,10 @@
     <p:sldMasterId id="2147483649" r:id="rId4"/>
   </p:sldMasterIdLst>
   <p:notesMasterIdLst>
-    <p:notesMasterId r:id="rId21"/>
+    <p:notesMasterId r:id="rId22"/>
   </p:notesMasterIdLst>
   <p:handoutMasterIdLst>
-    <p:handoutMasterId r:id="rId22"/>
+    <p:handoutMasterId r:id="rId23"/>
   </p:handoutMasterIdLst>
   <p:sldIdLst>
     <p:sldId id="1041" r:id="rId5"/>
@@ -27,6 +27,7 @@
     <p:sldId id="1057" r:id="rId18"/>
     <p:sldId id="1058" r:id="rId19"/>
     <p:sldId id="1059" r:id="rId20"/>
+    <p:sldId id="1060" r:id="rId21"/>
   </p:sldIdLst>
   <p:sldSz cx="12192000" cy="6858000"/>
   <p:notesSz cx="6858000" cy="9144000"/>
@@ -176,6 +177,7 @@
             <p14:sldId id="1057"/>
             <p14:sldId id="1058"/>
             <p14:sldId id="1059"/>
+            <p14:sldId id="1060"/>
           </p14:sldIdLst>
         </p14:section>
         <p14:section name="Standardabschnitt" id="{43259912-C5ED-4E84-8ACD-EEBCC30AE9A6}">
@@ -222,7 +224,7 @@
 <p1510:revInfo xmlns:a="http://schemas.openxmlformats.org/drawingml/2006/main" xmlns:r="http://schemas.openxmlformats.org/officeDocument/2006/relationships" xmlns:p1510="http://schemas.microsoft.com/office/powerpoint/2015/10/main">
   <p1510:revLst>
     <p1510:client id="{CDEA013C-0C4C-7CC9-3073-C215768A4D35}" v="422" dt="2026-02-08T21:59:01.042"/>
-    <p1510:client id="{CF275D93-1AF9-5CD7-90BA-CB7126BBAC7F}" v="405" dt="2026-02-08T23:32:48.353"/>
+    <p1510:client id="{CF275D93-1AF9-5CD7-90BA-CB7126BBAC7F}" v="444" dt="2026-02-08T23:43:25.877"/>
     <p1510:client id="{D9D7A87D-DE7C-D9BF-B02E-6FFACE30470C}" v="1" dt="2026-02-08T22:04:55.165"/>
   </p1510:revLst>
 </p1510:revInfo>
@@ -5935,6 +5937,1151 @@
   <p:clrMapOvr>
     <a:masterClrMapping/>
   </p:clrMapOvr>
+</p:sld>
+</file>
+
+<file path=ppt/slides/slide17.xml><?xml version="1.0" encoding="utf-8"?>
+<p:sld xmlns:a="http://schemas.openxmlformats.org/drawingml/2006/main" xmlns:r="http://schemas.openxmlformats.org/officeDocument/2006/relationships" xmlns:p="http://schemas.openxmlformats.org/presentationml/2006/main">
+  <p:cSld>
+    <p:spTree>
+      <p:nvGrpSpPr>
+        <p:cNvPr id="1" name="">
+          <a:extLst>
+            <a:ext uri="{FF2B5EF4-FFF2-40B4-BE49-F238E27FC236}">
+              <a16:creationId xmlns:a16="http://schemas.microsoft.com/office/drawing/2014/main" id="{66B59687-5460-4384-9550-05DF2AF0C081}"/>
+            </a:ext>
+          </a:extLst>
+        </p:cNvPr>
+        <p:cNvGrpSpPr/>
+        <p:nvPr/>
+      </p:nvGrpSpPr>
+      <p:grpSpPr>
+        <a:xfrm>
+          <a:off x="0" y="0"/>
+          <a:ext cx="0" cy="0"/>
+          <a:chOff x="0" y="0"/>
+          <a:chExt cx="0" cy="0"/>
+        </a:xfrm>
+      </p:grpSpPr>
+      <p:sp>
+        <p:nvSpPr>
+          <p:cNvPr id="2" name="Titel 1">
+            <a:extLst>
+              <a:ext uri="{FF2B5EF4-FFF2-40B4-BE49-F238E27FC236}">
+                <a16:creationId xmlns:a16="http://schemas.microsoft.com/office/drawing/2014/main" id="{8744CE10-4E39-D2F0-66FA-A29B94FD5130}"/>
+              </a:ext>
+            </a:extLst>
+          </p:cNvPr>
+          <p:cNvSpPr>
+            <a:spLocks noGrp="1"/>
+          </p:cNvSpPr>
+          <p:nvPr>
+            <p:ph type="title"/>
+          </p:nvPr>
+        </p:nvSpPr>
+        <p:spPr/>
+        <p:txBody>
+          <a:bodyPr/>
+          <a:lstStyle/>
+          <a:p>
+            <a:r>
+              <a:rPr lang="de-DE" dirty="0"/>
+              <a:t>Aufgabe 4.3</a:t>
+            </a:r>
+          </a:p>
+        </p:txBody>
+      </p:sp>
+      <p:sp>
+        <p:nvSpPr>
+          <p:cNvPr id="6" name="Content Placeholder 5">
+            <a:extLst>
+              <a:ext uri="{FF2B5EF4-FFF2-40B4-BE49-F238E27FC236}">
+                <a16:creationId xmlns:a16="http://schemas.microsoft.com/office/drawing/2014/main" id="{2DF0C196-0D08-E6B2-8213-2C56F168AF2A}"/>
+              </a:ext>
+            </a:extLst>
+          </p:cNvPr>
+          <p:cNvSpPr>
+            <a:spLocks noGrp="1"/>
+          </p:cNvSpPr>
+          <p:nvPr>
+            <p:ph idx="1"/>
+          </p:nvPr>
+        </p:nvSpPr>
+        <p:spPr/>
+        <p:txBody>
+          <a:bodyPr/>
+          <a:lstStyle/>
+          <a:p>
+            <a:pPr marL="0" indent="0">
+              <a:buNone/>
+            </a:pPr>
+            <a:endParaRPr lang="en-GB" dirty="0">
+              <a:cs typeface="Arial"/>
+            </a:endParaRPr>
+          </a:p>
+          <a:p>
+            <a:pPr marL="0" indent="0">
+              <a:buNone/>
+            </a:pPr>
+            <a:endParaRPr lang="en-GB" dirty="0">
+              <a:cs typeface="Arial"/>
+            </a:endParaRPr>
+          </a:p>
+          <a:p>
+            <a:pPr marL="0" indent="0">
+              <a:buNone/>
+            </a:pPr>
+            <a:endParaRPr lang="en-GB" dirty="0">
+              <a:cs typeface="Arial"/>
+            </a:endParaRPr>
+          </a:p>
+        </p:txBody>
+      </p:sp>
+      <p:sp>
+        <p:nvSpPr>
+          <p:cNvPr id="7" name="Rectangle 6">
+            <a:extLst>
+              <a:ext uri="{FF2B5EF4-FFF2-40B4-BE49-F238E27FC236}">
+                <a16:creationId xmlns:a16="http://schemas.microsoft.com/office/drawing/2014/main" id="{4FADCD99-1F1B-7E93-4C99-462A9DC46E54}"/>
+              </a:ext>
+            </a:extLst>
+          </p:cNvPr>
+          <p:cNvSpPr/>
+          <p:nvPr/>
+        </p:nvSpPr>
+        <p:spPr>
+          <a:xfrm>
+            <a:off x="4770699" y="5016660"/>
+            <a:ext cx="3865943" cy="190982"/>
+          </a:xfrm>
+          <a:prstGeom prst="rect">
+            <a:avLst/>
+          </a:prstGeom>
+          <a:solidFill>
+            <a:schemeClr val="bg1"/>
+          </a:solidFill>
+          <a:ln w="12700">
+            <a:noFill/>
+          </a:ln>
+        </p:spPr>
+        <p:style>
+          <a:lnRef idx="2">
+            <a:schemeClr val="accent1">
+              <a:shade val="50000"/>
+            </a:schemeClr>
+          </a:lnRef>
+          <a:fillRef idx="1">
+            <a:schemeClr val="accent1"/>
+          </a:fillRef>
+          <a:effectRef idx="0">
+            <a:schemeClr val="accent1"/>
+          </a:effectRef>
+          <a:fontRef idx="minor">
+            <a:schemeClr val="lt1"/>
+          </a:fontRef>
+        </p:style>
+        <p:txBody>
+          <a:bodyPr rtlCol="0" anchor="ctr"/>
+          <a:lstStyle/>
+          <a:p>
+            <a:pPr algn="ctr"/>
+            <a:endParaRPr lang="en-GB"/>
+          </a:p>
+        </p:txBody>
+      </p:sp>
+      <mc:AlternateContent xmlns:mc="http://schemas.openxmlformats.org/markup-compatibility/2006">
+        <mc:Choice xmlns:a14="http://schemas.microsoft.com/office/drawing/2010/main" Requires="a14">
+          <p:graphicFrame>
+            <p:nvGraphicFramePr>
+              <p:cNvPr id="5" name="Inhaltsplatzhalter 3">
+                <a:extLst>
+                  <a:ext uri="{FF2B5EF4-FFF2-40B4-BE49-F238E27FC236}">
+                    <a16:creationId xmlns:a16="http://schemas.microsoft.com/office/drawing/2014/main" id="{4065C672-6B47-4234-1C45-B8E3F418649C}"/>
+                  </a:ext>
+                </a:extLst>
+              </p:cNvPr>
+              <p:cNvGraphicFramePr>
+                <a:graphicFrameLocks/>
+              </p:cNvGraphicFramePr>
+              <p:nvPr>
+                <p:extLst>
+                  <p:ext uri="{D42A27DB-BD31-4B8C-83A1-F6EECF244321}">
+                    <p14:modId xmlns:p14="http://schemas.microsoft.com/office/powerpoint/2010/main" val="1092385781"/>
+                  </p:ext>
+                </p:extLst>
+              </p:nvPr>
+            </p:nvGraphicFramePr>
+            <p:xfrm>
+              <a:off x="2574764" y="1908276"/>
+              <a:ext cx="7053792" cy="2748280"/>
+            </p:xfrm>
+            <a:graphic>
+              <a:graphicData uri="http://schemas.openxmlformats.org/drawingml/2006/table">
+                <a:tbl>
+                  <a:tblPr firstRow="1" bandRow="1">
+                    <a:tableStyleId>{00A15C55-8517-42AA-B614-E9B94910E393}</a:tableStyleId>
+                  </a:tblPr>
+                  <a:tblGrid>
+                    <a:gridCol w="3526896">
+                      <a:extLst>
+                        <a:ext uri="{9D8B030D-6E8A-4147-A177-3AD203B41FA5}">
+                          <a16:colId xmlns:a16="http://schemas.microsoft.com/office/drawing/2014/main" val="1652158833"/>
+                        </a:ext>
+                      </a:extLst>
+                    </a:gridCol>
+                    <a:gridCol w="3526896">
+                      <a:extLst>
+                        <a:ext uri="{9D8B030D-6E8A-4147-A177-3AD203B41FA5}">
+                          <a16:colId xmlns:a16="http://schemas.microsoft.com/office/drawing/2014/main" val="4173493018"/>
+                        </a:ext>
+                      </a:extLst>
+                    </a:gridCol>
+                  </a:tblGrid>
+                  <a:tr h="370840">
+                    <a:tc>
+                      <a:txBody>
+                        <a:bodyPr/>
+                        <a:lstStyle/>
+                        <a:p>
+                          <a:r>
+                            <a:rPr lang="de-DE" dirty="0"/>
+                            <a:t>Größe</a:t>
+                          </a:r>
+                        </a:p>
+                      </a:txBody>
+                      <a:tcPr/>
+                    </a:tc>
+                    <a:tc>
+                      <a:txBody>
+                        <a:bodyPr/>
+                        <a:lstStyle/>
+                        <a:p>
+                          <a:r>
+                            <a:rPr lang="de-DE" dirty="0"/>
+                            <a:t>Verhalten A oder B</a:t>
+                          </a:r>
+                        </a:p>
+                      </a:txBody>
+                      <a:tcPr/>
+                    </a:tc>
+                    <a:extLst>
+                      <a:ext uri="{0D108BD9-81ED-4DB2-BD59-A6C34878D82A}">
+                        <a16:rowId xmlns:a16="http://schemas.microsoft.com/office/drawing/2014/main" val="1625499165"/>
+                      </a:ext>
+                    </a:extLst>
+                  </a:tr>
+                  <a:tr h="370840">
+                    <a:tc>
+                      <a:txBody>
+                        <a:bodyPr/>
+                        <a:lstStyle/>
+                        <a:p>
+                          <a:pPr lvl="0">
+                            <a:buNone/>
+                          </a:pPr>
+                          <a:r>
+                            <a:rPr lang="de-DE" sz="2000" dirty="0"/>
+                            <a:t>i</a:t>
+                          </a:r>
+                          <a14:m>
+                            <m:oMath xmlns:m="http://schemas.openxmlformats.org/officeDocument/2006/math">
+                              <m:sSub>
+                                <m:sSubPr>
+                                  <m:ctrlPr>
+                                    <a:rPr lang="de-DE" sz="2000" i="1" dirty="0" smtClean="0">
+                                      <a:latin typeface="Cambria Math" panose="02040503050406030204" pitchFamily="18" charset="0"/>
+                                    </a:rPr>
+                                  </m:ctrlPr>
+                                </m:sSubPr>
+                                <m:e>
+                                  <m:r>
+                                    <a:rPr lang="de-DE" b="0" i="1" smtClean="0">
+                                      <a:latin typeface="Cambria Math" panose="02040503050406030204" pitchFamily="18" charset="0"/>
+                                    </a:rPr>
+                                    <m:t>88</m:t>
+                                  </m:r>
+                                </m:e>
+                                <m:sub>
+                                  <m:r>
+                                    <a:rPr lang="de-DE" b="0" i="1" smtClean="0">
+                                      <a:latin typeface="Cambria Math" panose="02040503050406030204" pitchFamily="18" charset="0"/>
+                                    </a:rPr>
+                                    <m:t>10</m:t>
+                                  </m:r>
+                                </m:sub>
+                              </m:sSub>
+                            </m:oMath>
+                          </a14:m>
+                          <a:endParaRPr lang="de-DE" dirty="0"/>
+                        </a:p>
+                      </a:txBody>
+                      <a:tcPr/>
+                    </a:tc>
+                    <a:tc>
+                      <a:txBody>
+                        <a:bodyPr/>
+                        <a:lstStyle/>
+                        <a:p>
+                          <a:pPr/>
+                          <a:r>
+                            <a:rPr lang="de-DE" dirty="0"/>
+                            <a:t>A</a:t>
+                          </a:r>
+                          <a14:m>
+                            <m:oMath xmlns:m="http://schemas.openxmlformats.org/officeDocument/2006/math">
+                              <m:sSub>
+                                <m:sSubPr>
+                                  <m:ctrlPr>
+                                    <a:rPr lang="de-DE" i="1" dirty="0" smtClean="0">
+                                      <a:latin typeface="Cambria Math" panose="02040503050406030204" pitchFamily="18" charset="0"/>
+                                    </a:rPr>
+                                  </m:ctrlPr>
+                                </m:sSubPr>
+                                <m:e>
+                                  <m:r>
+                                    <a:rPr lang="de-DE" b="0" i="1" smtClean="0">
+                                      <a:latin typeface="Cambria Math" panose="02040503050406030204" pitchFamily="18" charset="0"/>
+                                    </a:rPr>
+                                    <m:t>88</m:t>
+                                  </m:r>
+                                </m:e>
+                                <m:sub>
+                                  <m:r>
+                                    <a:rPr lang="de-DE" b="0" i="1" smtClean="0">
+                                      <a:latin typeface="Cambria Math" panose="02040503050406030204" pitchFamily="18" charset="0"/>
+                                    </a:rPr>
+                                    <m:t>16</m:t>
+                                  </m:r>
+                                </m:sub>
+                              </m:sSub>
+                            </m:oMath>
+                          </a14:m>
+                          <a:endParaRPr lang="de-DE" dirty="0"/>
+                        </a:p>
+                      </a:txBody>
+                      <a:tcPr/>
+                    </a:tc>
+                    <a:extLst>
+                      <a:ext uri="{0D108BD9-81ED-4DB2-BD59-A6C34878D82A}">
+                        <a16:rowId xmlns:a16="http://schemas.microsoft.com/office/drawing/2014/main" val="476797659"/>
+                      </a:ext>
+                    </a:extLst>
+                  </a:tr>
+                  <a:tr h="370840">
+                    <a:tc>
+                      <a:txBody>
+                        <a:bodyPr/>
+                        <a:lstStyle/>
+                        <a:p>
+                          <a:pPr/>
+                          <a:r>
+                            <a:rPr lang="de-DE" sz="2000" dirty="0"/>
+                            <a:t>i</a:t>
+                          </a:r>
+                          <a:r>
+                            <a:rPr lang="de-DE" sz="1100" dirty="0"/>
+                            <a:t>1</a:t>
+                          </a:r>
+                          <a14:m>
+                            <m:oMath xmlns:m="http://schemas.openxmlformats.org/officeDocument/2006/math">
+                              <m:sSub>
+                                <m:sSubPr>
+                                  <m:ctrlPr>
+                                    <a:rPr lang="de-DE" sz="1100" i="1" dirty="0" smtClean="0">
+                                      <a:latin typeface="Cambria Math" panose="02040503050406030204" pitchFamily="18" charset="0"/>
+                                    </a:rPr>
+                                  </m:ctrlPr>
+                                </m:sSubPr>
+                                <m:e>
+                                  <m:r>
+                                    <a:rPr lang="de-DE" b="0" i="1" smtClean="0">
+                                      <a:latin typeface="Cambria Math" panose="02040503050406030204" pitchFamily="18" charset="0"/>
+                                    </a:rPr>
+                                    <m:t>76</m:t>
+                                  </m:r>
+                                </m:e>
+                                <m:sub>
+                                  <m:r>
+                                    <a:rPr lang="de-DE" b="0" i="1" smtClean="0">
+                                      <a:latin typeface="Cambria Math" panose="02040503050406030204" pitchFamily="18" charset="0"/>
+                                    </a:rPr>
+                                    <m:t>10</m:t>
+                                  </m:r>
+                                </m:sub>
+                              </m:sSub>
+                            </m:oMath>
+                          </a14:m>
+                          <a:endParaRPr lang="de-DE" dirty="0"/>
+                        </a:p>
+                      </a:txBody>
+                      <a:tcPr/>
+                    </a:tc>
+                    <a:tc>
+                      <a:txBody>
+                        <a:bodyPr/>
+                        <a:lstStyle/>
+                        <a:p>
+                          <a:pPr/>
+                          <a:r>
+                            <a:rPr lang="de-DE" dirty="0"/>
+                            <a:t>B</a:t>
+                          </a:r>
+                          <a14:m>
+                            <m:oMath xmlns:m="http://schemas.openxmlformats.org/officeDocument/2006/math">
+                              <m:sSub>
+                                <m:sSubPr>
+                                  <m:ctrlPr>
+                                    <a:rPr lang="de-DE" i="1" dirty="0" smtClean="0">
+                                      <a:latin typeface="Cambria Math" panose="02040503050406030204" pitchFamily="18" charset="0"/>
+                                    </a:rPr>
+                                  </m:ctrlPr>
+                                </m:sSubPr>
+                                <m:e>
+                                  <m:r>
+                                    <a:rPr lang="de-DE" b="0" i="1" smtClean="0">
+                                      <a:latin typeface="Cambria Math" panose="02040503050406030204" pitchFamily="18" charset="0"/>
+                                    </a:rPr>
+                                    <m:t>122</m:t>
+                                  </m:r>
+                                </m:e>
+                                <m:sub>
+                                  <m:r>
+                                    <a:rPr lang="de-DE" b="0" i="1" smtClean="0">
+                                      <a:latin typeface="Cambria Math" panose="02040503050406030204" pitchFamily="18" charset="0"/>
+                                    </a:rPr>
+                                    <m:t>8</m:t>
+                                  </m:r>
+                                </m:sub>
+                              </m:sSub>
+                            </m:oMath>
+                          </a14:m>
+                          <a:endParaRPr lang="de-DE" dirty="0"/>
+                        </a:p>
+                      </a:txBody>
+                      <a:tcPr/>
+                    </a:tc>
+                    <a:extLst>
+                      <a:ext uri="{0D108BD9-81ED-4DB2-BD59-A6C34878D82A}">
+                        <a16:rowId xmlns:a16="http://schemas.microsoft.com/office/drawing/2014/main" val="1703270876"/>
+                      </a:ext>
+                    </a:extLst>
+                  </a:tr>
+                  <a:tr h="370840">
+                    <a:tc>
+                      <a:txBody>
+                        <a:bodyPr/>
+                        <a:lstStyle/>
+                        <a:p>
+                          <a:pPr/>
+                          <a:r>
+                            <a:rPr lang="de-DE" sz="2000" dirty="0" err="1"/>
+                            <a:t>u</a:t>
+                          </a:r>
+                          <a:r>
+                            <a:rPr lang="de-DE" sz="1100" dirty="0" err="1"/>
+                            <a:t>L</a:t>
+                          </a:r>
+                          <a14:m>
+                            <m:oMath xmlns:m="http://schemas.openxmlformats.org/officeDocument/2006/math">
+                              <m:sSub>
+                                <m:sSubPr>
+                                  <m:ctrlPr>
+                                    <a:rPr lang="de-DE" sz="1100" i="1" dirty="0" err="1" smtClean="0">
+                                      <a:latin typeface="Cambria Math" panose="02040503050406030204" pitchFamily="18" charset="0"/>
+                                    </a:rPr>
+                                  </m:ctrlPr>
+                                </m:sSubPr>
+                                <m:e>
+                                  <m:r>
+                                    <a:rPr lang="de-DE" b="0" i="1" smtClean="0">
+                                      <a:latin typeface="Cambria Math" panose="02040503050406030204" pitchFamily="18" charset="0"/>
+                                    </a:rPr>
+                                    <m:t>𝐴𝐶</m:t>
+                                  </m:r>
+                                  <m:r>
+                                    <a:rPr lang="de-DE" b="0" i="1" smtClean="0">
+                                      <a:latin typeface="Cambria Math" panose="02040503050406030204" pitchFamily="18" charset="0"/>
+                                    </a:rPr>
+                                    <m:t>4</m:t>
+                                  </m:r>
+                                </m:e>
+                                <m:sub>
+                                  <m:r>
+                                    <a:rPr lang="de-DE" b="0" i="1" smtClean="0">
+                                      <a:latin typeface="Cambria Math" panose="02040503050406030204" pitchFamily="18" charset="0"/>
+                                    </a:rPr>
+                                    <m:t>16</m:t>
+                                  </m:r>
+                                </m:sub>
+                              </m:sSub>
+                            </m:oMath>
+                          </a14:m>
+                          <a:endParaRPr lang="de-DE" dirty="0"/>
+                        </a:p>
+                      </a:txBody>
+                      <a:tcPr/>
+                    </a:tc>
+                    <a:tc>
+                      <a:txBody>
+                        <a:bodyPr/>
+                        <a:lstStyle/>
+                        <a:p>
+                          <a:pPr/>
+                          <a:r>
+                            <a:rPr lang="de-DE" dirty="0"/>
+                            <a:t>B</a:t>
+                          </a:r>
+                          <a14:m>
+                            <m:oMath xmlns:m="http://schemas.openxmlformats.org/officeDocument/2006/math">
+                              <m:sSub>
+                                <m:sSubPr>
+                                  <m:ctrlPr>
+                                    <a:rPr lang="de-DE" i="1" dirty="0" smtClean="0">
+                                      <a:latin typeface="Cambria Math" panose="02040503050406030204" pitchFamily="18" charset="0"/>
+                                    </a:rPr>
+                                  </m:ctrlPr>
+                                </m:sSubPr>
+                                <m:e>
+                                  <m:r>
+                                    <a:rPr lang="de-DE" b="0" i="1" smtClean="0">
+                                      <a:latin typeface="Cambria Math" panose="02040503050406030204" pitchFamily="18" charset="0"/>
+                                    </a:rPr>
+                                    <m:t>101011000100</m:t>
+                                  </m:r>
+                                </m:e>
+                                <m:sub>
+                                  <m:r>
+                                    <a:rPr lang="de-DE" b="0" i="1" smtClean="0">
+                                      <a:latin typeface="Cambria Math" panose="02040503050406030204" pitchFamily="18" charset="0"/>
+                                    </a:rPr>
+                                    <m:t>2</m:t>
+                                  </m:r>
+                                </m:sub>
+                              </m:sSub>
+                            </m:oMath>
+                          </a14:m>
+                          <a:endParaRPr lang="de-DE" dirty="0"/>
+                        </a:p>
+                      </a:txBody>
+                      <a:tcPr/>
+                    </a:tc>
+                    <a:extLst>
+                      <a:ext uri="{0D108BD9-81ED-4DB2-BD59-A6C34878D82A}">
+                        <a16:rowId xmlns:a16="http://schemas.microsoft.com/office/drawing/2014/main" val="2818478599"/>
+                      </a:ext>
+                    </a:extLst>
+                  </a:tr>
+                  <a:tr h="370840">
+                    <a:tc>
+                      <a:txBody>
+                        <a:bodyPr/>
+                        <a:lstStyle/>
+                        <a:p>
+                          <a:pPr/>
+                          <a:r>
+                            <a:rPr lang="de-DE" sz="2000" dirty="0" err="1"/>
+                            <a:t>i</a:t>
+                          </a:r>
+                          <a:r>
+                            <a:rPr lang="de-DE" sz="1100" dirty="0" err="1"/>
+                            <a:t>L</a:t>
+                          </a:r>
+                          <a14:m>
+                            <m:oMath xmlns:m="http://schemas.openxmlformats.org/officeDocument/2006/math">
+                              <m:sSub>
+                                <m:sSubPr>
+                                  <m:ctrlPr>
+                                    <a:rPr lang="de-DE" sz="1100" i="1" dirty="0" err="1" smtClean="0">
+                                      <a:latin typeface="Cambria Math" panose="02040503050406030204" pitchFamily="18" charset="0"/>
+                                    </a:rPr>
+                                  </m:ctrlPr>
+                                </m:sSubPr>
+                                <m:e>
+                                  <m:r>
+                                    <a:rPr lang="de-DE" b="0" i="1" smtClean="0">
+                                      <a:latin typeface="Cambria Math" panose="02040503050406030204" pitchFamily="18" charset="0"/>
+                                    </a:rPr>
+                                    <m:t>66</m:t>
+                                  </m:r>
+                                </m:e>
+                                <m:sub>
+                                  <m:r>
+                                    <a:rPr lang="de-DE" b="0" i="1" smtClean="0">
+                                      <a:latin typeface="Cambria Math" panose="02040503050406030204" pitchFamily="18" charset="0"/>
+                                    </a:rPr>
+                                    <m:t>8</m:t>
+                                  </m:r>
+                                </m:sub>
+                              </m:sSub>
+                            </m:oMath>
+                          </a14:m>
+                          <a:endParaRPr lang="de-DE" dirty="0"/>
+                        </a:p>
+                      </a:txBody>
+                      <a:tcPr/>
+                    </a:tc>
+                    <a:tc>
+                      <a:txBody>
+                        <a:bodyPr/>
+                        <a:lstStyle/>
+                        <a:p>
+                          <a:pPr/>
+                          <a:r>
+                            <a:rPr lang="de-DE" dirty="0"/>
+                            <a:t>A</a:t>
+                          </a:r>
+                          <a14:m>
+                            <m:oMath xmlns:m="http://schemas.openxmlformats.org/officeDocument/2006/math">
+                              <m:sSub>
+                                <m:sSubPr>
+                                  <m:ctrlPr>
+                                    <a:rPr lang="de-DE" i="1" dirty="0" smtClean="0">
+                                      <a:latin typeface="Cambria Math" panose="02040503050406030204" pitchFamily="18" charset="0"/>
+                                    </a:rPr>
+                                  </m:ctrlPr>
+                                </m:sSubPr>
+                                <m:e>
+                                  <m:r>
+                                    <a:rPr lang="de-DE" b="0" i="1" smtClean="0">
+                                      <a:latin typeface="Cambria Math" panose="02040503050406030204" pitchFamily="18" charset="0"/>
+                                    </a:rPr>
+                                    <m:t>33</m:t>
+                                  </m:r>
+                                </m:e>
+                                <m:sub>
+                                  <m:r>
+                                    <a:rPr lang="de-DE" b="0" i="1" smtClean="0">
+                                      <a:latin typeface="Cambria Math" panose="02040503050406030204" pitchFamily="18" charset="0"/>
+                                    </a:rPr>
+                                    <m:t>16</m:t>
+                                  </m:r>
+                                </m:sub>
+                              </m:sSub>
+                            </m:oMath>
+                          </a14:m>
+                          <a:endParaRPr lang="de-DE" dirty="0"/>
+                        </a:p>
+                      </a:txBody>
+                      <a:tcPr/>
+                    </a:tc>
+                    <a:extLst>
+                      <a:ext uri="{0D108BD9-81ED-4DB2-BD59-A6C34878D82A}">
+                        <a16:rowId xmlns:a16="http://schemas.microsoft.com/office/drawing/2014/main" val="216001238"/>
+                      </a:ext>
+                    </a:extLst>
+                  </a:tr>
+                  <a:tr h="370839">
+                    <a:tc>
+                      <a:txBody>
+                        <a:bodyPr/>
+                        <a:lstStyle/>
+                        <a:p>
+                          <a:pPr lvl="0">
+                            <a:buNone/>
+                          </a:pPr>
+                          <a:r>
+                            <a:rPr lang="de-DE" sz="2000" dirty="0"/>
+                            <a:t>u</a:t>
+                          </a:r>
+                          <a:r>
+                            <a:rPr lang="de-DE" sz="1100" dirty="0"/>
+                            <a:t>1</a:t>
+                          </a:r>
+                        </a:p>
+                      </a:txBody>
+                      <a:tcPr/>
+                    </a:tc>
+                    <a:tc>
+                      <a:txBody>
+                        <a:bodyPr/>
+                        <a:lstStyle/>
+                        <a:p>
+                          <a:pPr lvl="0">
+                            <a:buNone/>
+                          </a:pPr>
+                          <a:r>
+                            <a:rPr lang="de-DE" dirty="0"/>
+                            <a:t>B</a:t>
+                          </a:r>
+                        </a:p>
+                      </a:txBody>
+                      <a:tcPr/>
+                    </a:tc>
+                    <a:extLst>
+                      <a:ext uri="{0D108BD9-81ED-4DB2-BD59-A6C34878D82A}">
+                        <a16:rowId xmlns:a16="http://schemas.microsoft.com/office/drawing/2014/main" val="4294844427"/>
+                      </a:ext>
+                    </a:extLst>
+                  </a:tr>
+                  <a:tr h="370838">
+                    <a:tc>
+                      <a:txBody>
+                        <a:bodyPr/>
+                        <a:lstStyle/>
+                        <a:p>
+                          <a:pPr lvl="0">
+                            <a:buNone/>
+                          </a:pPr>
+                          <a:r>
+                            <a:rPr lang="de-DE" sz="2000" dirty="0"/>
+                            <a:t>u</a:t>
+                          </a:r>
+                          <a:r>
+                            <a:rPr lang="de-DE" sz="1100" dirty="0"/>
+                            <a:t>2</a:t>
+                          </a:r>
+                        </a:p>
+                      </a:txBody>
+                      <a:tcPr/>
+                    </a:tc>
+                    <a:tc>
+                      <a:txBody>
+                        <a:bodyPr/>
+                        <a:lstStyle/>
+                        <a:p>
+                          <a:pPr lvl="0">
+                            <a:buNone/>
+                          </a:pPr>
+                          <a:r>
+                            <a:rPr lang="de-DE" dirty="0"/>
+                            <a:t>A</a:t>
+                          </a:r>
+                        </a:p>
+                      </a:txBody>
+                      <a:tcPr/>
+                    </a:tc>
+                    <a:extLst>
+                      <a:ext uri="{0D108BD9-81ED-4DB2-BD59-A6C34878D82A}">
+                        <a16:rowId xmlns:a16="http://schemas.microsoft.com/office/drawing/2014/main" val="2365580377"/>
+                      </a:ext>
+                    </a:extLst>
+                  </a:tr>
+                </a:tbl>
+              </a:graphicData>
+            </a:graphic>
+          </p:graphicFrame>
+        </mc:Choice>
+        <mc:Fallback>
+          <p:graphicFrame>
+            <p:nvGraphicFramePr>
+              <p:cNvPr id="5" name="Inhaltsplatzhalter 3">
+                <a:extLst>
+                  <a:ext uri="{FF2B5EF4-FFF2-40B4-BE49-F238E27FC236}">
+                    <a16:creationId xmlns:a16="http://schemas.microsoft.com/office/drawing/2014/main" id="{4065C672-6B47-4234-1C45-B8E3F418649C}"/>
+                  </a:ext>
+                </a:extLst>
+              </p:cNvPr>
+              <p:cNvGraphicFramePr>
+                <a:graphicFrameLocks/>
+              </p:cNvGraphicFramePr>
+              <p:nvPr>
+                <p:extLst>
+                  <p:ext uri="{D42A27DB-BD31-4B8C-83A1-F6EECF244321}">
+                    <p14:modId xmlns:p14="http://schemas.microsoft.com/office/powerpoint/2010/main" val="1092385781"/>
+                  </p:ext>
+                </p:extLst>
+              </p:nvPr>
+            </p:nvGraphicFramePr>
+            <p:xfrm>
+              <a:off x="2574764" y="1908276"/>
+              <a:ext cx="7053792" cy="2748280"/>
+            </p:xfrm>
+            <a:graphic>
+              <a:graphicData uri="http://schemas.openxmlformats.org/drawingml/2006/table">
+                <a:tbl>
+                  <a:tblPr firstRow="1" bandRow="1">
+                    <a:tableStyleId>{00A15C55-8517-42AA-B614-E9B94910E393}</a:tableStyleId>
+                  </a:tblPr>
+                  <a:tblGrid>
+                    <a:gridCol w="3526896">
+                      <a:extLst>
+                        <a:ext uri="{9D8B030D-6E8A-4147-A177-3AD203B41FA5}">
+                          <a16:colId xmlns:a16="http://schemas.microsoft.com/office/drawing/2014/main" val="1652158833"/>
+                        </a:ext>
+                      </a:extLst>
+                    </a:gridCol>
+                    <a:gridCol w="3526896">
+                      <a:extLst>
+                        <a:ext uri="{9D8B030D-6E8A-4147-A177-3AD203B41FA5}">
+                          <a16:colId xmlns:a16="http://schemas.microsoft.com/office/drawing/2014/main" val="4173493018"/>
+                        </a:ext>
+                      </a:extLst>
+                    </a:gridCol>
+                  </a:tblGrid>
+                  <a:tr h="370840">
+                    <a:tc>
+                      <a:txBody>
+                        <a:bodyPr/>
+                        <a:lstStyle/>
+                        <a:p>
+                          <a:r>
+                            <a:rPr lang="de-DE" dirty="0"/>
+                            <a:t>Größe</a:t>
+                          </a:r>
+                        </a:p>
+                      </a:txBody>
+                      <a:tcPr/>
+                    </a:tc>
+                    <a:tc>
+                      <a:txBody>
+                        <a:bodyPr/>
+                        <a:lstStyle/>
+                        <a:p>
+                          <a:r>
+                            <a:rPr lang="de-DE" dirty="0"/>
+                            <a:t>Verhalten A oder B</a:t>
+                          </a:r>
+                        </a:p>
+                      </a:txBody>
+                      <a:tcPr/>
+                    </a:tc>
+                    <a:extLst>
+                      <a:ext uri="{0D108BD9-81ED-4DB2-BD59-A6C34878D82A}">
+                        <a16:rowId xmlns:a16="http://schemas.microsoft.com/office/drawing/2014/main" val="1625499165"/>
+                      </a:ext>
+                    </a:extLst>
+                  </a:tr>
+                  <a:tr h="396240">
+                    <a:tc>
+                      <a:txBody>
+                        <a:bodyPr/>
+                        <a:lstStyle/>
+                        <a:p>
+                          <a:endParaRPr lang="en-US"/>
+                        </a:p>
+                      </a:txBody>
+                      <a:tcPr>
+                        <a:blipFill>
+                          <a:blip r:embed="rId2"/>
+                          <a:stretch>
+                            <a:fillRect l="-173" t="-101538" r="-100691" b="-529231"/>
+                          </a:stretch>
+                        </a:blipFill>
+                      </a:tcPr>
+                    </a:tc>
+                    <a:tc>
+                      <a:txBody>
+                        <a:bodyPr/>
+                        <a:lstStyle/>
+                        <a:p>
+                          <a:endParaRPr lang="en-US"/>
+                        </a:p>
+                      </a:txBody>
+                      <a:tcPr>
+                        <a:blipFill>
+                          <a:blip r:embed="rId2"/>
+                          <a:stretch>
+                            <a:fillRect l="-100173" t="-101538" r="-691" b="-529231"/>
+                          </a:stretch>
+                        </a:blipFill>
+                      </a:tcPr>
+                    </a:tc>
+                    <a:extLst>
+                      <a:ext uri="{0D108BD9-81ED-4DB2-BD59-A6C34878D82A}">
+                        <a16:rowId xmlns:a16="http://schemas.microsoft.com/office/drawing/2014/main" val="476797659"/>
+                      </a:ext>
+                    </a:extLst>
+                  </a:tr>
+                  <a:tr h="396240">
+                    <a:tc>
+                      <a:txBody>
+                        <a:bodyPr/>
+                        <a:lstStyle/>
+                        <a:p>
+                          <a:endParaRPr lang="en-US"/>
+                        </a:p>
+                      </a:txBody>
+                      <a:tcPr>
+                        <a:blipFill>
+                          <a:blip r:embed="rId2"/>
+                          <a:stretch>
+                            <a:fillRect l="-173" t="-201538" r="-100691" b="-429231"/>
+                          </a:stretch>
+                        </a:blipFill>
+                      </a:tcPr>
+                    </a:tc>
+                    <a:tc>
+                      <a:txBody>
+                        <a:bodyPr/>
+                        <a:lstStyle/>
+                        <a:p>
+                          <a:endParaRPr lang="en-US"/>
+                        </a:p>
+                      </a:txBody>
+                      <a:tcPr>
+                        <a:blipFill>
+                          <a:blip r:embed="rId2"/>
+                          <a:stretch>
+                            <a:fillRect l="-100173" t="-201538" r="-691" b="-429231"/>
+                          </a:stretch>
+                        </a:blipFill>
+                      </a:tcPr>
+                    </a:tc>
+                    <a:extLst>
+                      <a:ext uri="{0D108BD9-81ED-4DB2-BD59-A6C34878D82A}">
+                        <a16:rowId xmlns:a16="http://schemas.microsoft.com/office/drawing/2014/main" val="1703270876"/>
+                      </a:ext>
+                    </a:extLst>
+                  </a:tr>
+                  <a:tr h="396240">
+                    <a:tc>
+                      <a:txBody>
+                        <a:bodyPr/>
+                        <a:lstStyle/>
+                        <a:p>
+                          <a:endParaRPr lang="en-US"/>
+                        </a:p>
+                      </a:txBody>
+                      <a:tcPr>
+                        <a:blipFill>
+                          <a:blip r:embed="rId2"/>
+                          <a:stretch>
+                            <a:fillRect l="-173" t="-301538" r="-100691" b="-329231"/>
+                          </a:stretch>
+                        </a:blipFill>
+                      </a:tcPr>
+                    </a:tc>
+                    <a:tc>
+                      <a:txBody>
+                        <a:bodyPr/>
+                        <a:lstStyle/>
+                        <a:p>
+                          <a:endParaRPr lang="en-US"/>
+                        </a:p>
+                      </a:txBody>
+                      <a:tcPr>
+                        <a:blipFill>
+                          <a:blip r:embed="rId2"/>
+                          <a:stretch>
+                            <a:fillRect l="-100173" t="-301538" r="-691" b="-329231"/>
+                          </a:stretch>
+                        </a:blipFill>
+                      </a:tcPr>
+                    </a:tc>
+                    <a:extLst>
+                      <a:ext uri="{0D108BD9-81ED-4DB2-BD59-A6C34878D82A}">
+                        <a16:rowId xmlns:a16="http://schemas.microsoft.com/office/drawing/2014/main" val="2818478599"/>
+                      </a:ext>
+                    </a:extLst>
+                  </a:tr>
+                  <a:tr h="396240">
+                    <a:tc>
+                      <a:txBody>
+                        <a:bodyPr/>
+                        <a:lstStyle/>
+                        <a:p>
+                          <a:endParaRPr lang="en-US"/>
+                        </a:p>
+                      </a:txBody>
+                      <a:tcPr>
+                        <a:blipFill>
+                          <a:blip r:embed="rId2"/>
+                          <a:stretch>
+                            <a:fillRect l="-173" t="-401538" r="-100691" b="-229231"/>
+                          </a:stretch>
+                        </a:blipFill>
+                      </a:tcPr>
+                    </a:tc>
+                    <a:tc>
+                      <a:txBody>
+                        <a:bodyPr/>
+                        <a:lstStyle/>
+                        <a:p>
+                          <a:endParaRPr lang="en-US"/>
+                        </a:p>
+                      </a:txBody>
+                      <a:tcPr>
+                        <a:blipFill>
+                          <a:blip r:embed="rId2"/>
+                          <a:stretch>
+                            <a:fillRect l="-100173" t="-401538" r="-691" b="-229231"/>
+                          </a:stretch>
+                        </a:blipFill>
+                      </a:tcPr>
+                    </a:tc>
+                    <a:extLst>
+                      <a:ext uri="{0D108BD9-81ED-4DB2-BD59-A6C34878D82A}">
+                        <a16:rowId xmlns:a16="http://schemas.microsoft.com/office/drawing/2014/main" val="216001238"/>
+                      </a:ext>
+                    </a:extLst>
+                  </a:tr>
+                  <a:tr h="396240">
+                    <a:tc>
+                      <a:txBody>
+                        <a:bodyPr/>
+                        <a:lstStyle/>
+                        <a:p>
+                          <a:pPr lvl="0">
+                            <a:buNone/>
+                          </a:pPr>
+                          <a:r>
+                            <a:rPr lang="de-DE" sz="2000" dirty="0"/>
+                            <a:t>u</a:t>
+                          </a:r>
+                          <a:r>
+                            <a:rPr lang="de-DE" sz="1100" dirty="0"/>
+                            <a:t>1</a:t>
+                          </a:r>
+                        </a:p>
+                      </a:txBody>
+                      <a:tcPr/>
+                    </a:tc>
+                    <a:tc>
+                      <a:txBody>
+                        <a:bodyPr/>
+                        <a:lstStyle/>
+                        <a:p>
+                          <a:pPr lvl="0">
+                            <a:buNone/>
+                          </a:pPr>
+                          <a:r>
+                            <a:rPr lang="de-DE" dirty="0"/>
+                            <a:t>B</a:t>
+                          </a:r>
+                        </a:p>
+                      </a:txBody>
+                      <a:tcPr/>
+                    </a:tc>
+                    <a:extLst>
+                      <a:ext uri="{0D108BD9-81ED-4DB2-BD59-A6C34878D82A}">
+                        <a16:rowId xmlns:a16="http://schemas.microsoft.com/office/drawing/2014/main" val="4294844427"/>
+                      </a:ext>
+                    </a:extLst>
+                  </a:tr>
+                  <a:tr h="396240">
+                    <a:tc>
+                      <a:txBody>
+                        <a:bodyPr/>
+                        <a:lstStyle/>
+                        <a:p>
+                          <a:pPr lvl="0">
+                            <a:buNone/>
+                          </a:pPr>
+                          <a:r>
+                            <a:rPr lang="de-DE" sz="2000" dirty="0"/>
+                            <a:t>u</a:t>
+                          </a:r>
+                          <a:r>
+                            <a:rPr lang="de-DE" sz="1100" dirty="0"/>
+                            <a:t>2</a:t>
+                          </a:r>
+                        </a:p>
+                      </a:txBody>
+                      <a:tcPr/>
+                    </a:tc>
+                    <a:tc>
+                      <a:txBody>
+                        <a:bodyPr/>
+                        <a:lstStyle/>
+                        <a:p>
+                          <a:pPr lvl="0">
+                            <a:buNone/>
+                          </a:pPr>
+                          <a:r>
+                            <a:rPr lang="de-DE" dirty="0"/>
+                            <a:t>A</a:t>
+                          </a:r>
+                        </a:p>
+                      </a:txBody>
+                      <a:tcPr/>
+                    </a:tc>
+                    <a:extLst>
+                      <a:ext uri="{0D108BD9-81ED-4DB2-BD59-A6C34878D82A}">
+                        <a16:rowId xmlns:a16="http://schemas.microsoft.com/office/drawing/2014/main" val="2365580377"/>
+                      </a:ext>
+                    </a:extLst>
+                  </a:tr>
+                </a:tbl>
+              </a:graphicData>
+            </a:graphic>
+          </p:graphicFrame>
+        </mc:Fallback>
+      </mc:AlternateContent>
+    </p:spTree>
+    <p:extLst>
+      <p:ext uri="{BB962C8B-B14F-4D97-AF65-F5344CB8AC3E}">
+        <p14:creationId xmlns:p14="http://schemas.microsoft.com/office/powerpoint/2010/main" val="2666470350"/>
+      </p:ext>
+    </p:extLst>
+  </p:cSld>
+  <p:clrMapOvr>
+    <a:masterClrMapping/>
+  </p:clrMapOvr>
+  <p:timing>
+    <p:tnLst>
+      <p:par>
+        <p:cTn id="1" dur="indefinite" restart="never" nodeType="tmRoot">
+          <p:childTnLst>
+            <p:seq concurrent="1" nextAc="seek">
+              <p:cTn id="2" dur="indefinite" nodeType="mainSeq">
+                <p:childTnLst>
+                  <p:par>
+                    <p:cTn id="3" fill="hold">
+                      <p:stCondLst>
+                        <p:cond delay="indefinite"/>
+                      </p:stCondLst>
+                      <p:childTnLst>
+                        <p:par>
+                          <p:cTn id="4" fill="hold">
+                            <p:stCondLst>
+                              <p:cond delay="0"/>
+                            </p:stCondLst>
+                            <p:childTnLst>
+                              <p:par>
+                                <p:cTn id="5" presetID="1" presetClass="entr" presetSubtype="0" fill="hold" nodeType="clickEffect">
+                                  <p:stCondLst>
+                                    <p:cond delay="0"/>
+                                  </p:stCondLst>
+                                  <p:childTnLst>
+                                    <p:set>
+                                      <p:cBhvr>
+                                        <p:cTn id="6" dur="1" fill="hold">
+                                          <p:stCondLst>
+                                            <p:cond delay="0"/>
+                                          </p:stCondLst>
+                                        </p:cTn>
+                                        <p:tgtEl>
+                                          <p:spTgt spid="5"/>
+                                        </p:tgtEl>
+                                        <p:attrNameLst>
+                                          <p:attrName>style.visibility</p:attrName>
+                                        </p:attrNameLst>
+                                      </p:cBhvr>
+                                      <p:to>
+                                        <p:strVal val="visible"/>
+                                      </p:to>
+                                    </p:set>
+                                  </p:childTnLst>
+                                </p:cTn>
+                              </p:par>
+                            </p:childTnLst>
+                          </p:cTn>
+                        </p:par>
+                      </p:childTnLst>
+                    </p:cTn>
+                  </p:par>
+                </p:childTnLst>
+              </p:cTn>
+              <p:prevCondLst>
+                <p:cond evt="onPrev" delay="0">
+                  <p:tgtEl>
+                    <p:sldTgt/>
+                  </p:tgtEl>
+                </p:cond>
+              </p:prevCondLst>
+              <p:nextCondLst>
+                <p:cond evt="onNext" delay="0">
+                  <p:tgtEl>
+                    <p:sldTgt/>
+                  </p:tgtEl>
+                </p:cond>
+              </p:nextCondLst>
+            </p:seq>
+          </p:childTnLst>
+        </p:cTn>
+      </p:par>
+    </p:tnLst>
+  </p:timing>
 </p:sld>
 </file>
 

</xml_diff>

<commit_message>
Aufgabe 3.7 - keine Gewähr auf die b
</commit_message>
<xml_diff>
--- a/Probeklausur.pptx
+++ b/Probeklausur.pptx
@@ -5,10 +5,10 @@
     <p:sldMasterId id="2147483649" r:id="rId4"/>
   </p:sldMasterIdLst>
   <p:notesMasterIdLst>
-    <p:notesMasterId r:id="rId31"/>
+    <p:notesMasterId r:id="rId33"/>
   </p:notesMasterIdLst>
   <p:handoutMasterIdLst>
-    <p:handoutMasterId r:id="rId32"/>
+    <p:handoutMasterId r:id="rId34"/>
   </p:handoutMasterIdLst>
   <p:sldIdLst>
     <p:sldId id="1041" r:id="rId5"/>
@@ -30,13 +30,15 @@
     <p:sldId id="1069" r:id="rId21"/>
     <p:sldId id="1054" r:id="rId22"/>
     <p:sldId id="1055" r:id="rId23"/>
-    <p:sldId id="1056" r:id="rId24"/>
-    <p:sldId id="1057" r:id="rId25"/>
-    <p:sldId id="1058" r:id="rId26"/>
-    <p:sldId id="1059" r:id="rId27"/>
-    <p:sldId id="1060" r:id="rId28"/>
-    <p:sldId id="1061" r:id="rId29"/>
-    <p:sldId id="1062" r:id="rId30"/>
+    <p:sldId id="1071" r:id="rId24"/>
+    <p:sldId id="1070" r:id="rId25"/>
+    <p:sldId id="1056" r:id="rId26"/>
+    <p:sldId id="1057" r:id="rId27"/>
+    <p:sldId id="1058" r:id="rId28"/>
+    <p:sldId id="1059" r:id="rId29"/>
+    <p:sldId id="1060" r:id="rId30"/>
+    <p:sldId id="1061" r:id="rId31"/>
+    <p:sldId id="1062" r:id="rId32"/>
   </p:sldIdLst>
   <p:sldSz cx="12192000" cy="6858000"/>
   <p:notesSz cx="6858000" cy="9144000"/>
@@ -189,6 +191,8 @@
             <p14:sldId id="1069"/>
             <p14:sldId id="1054"/>
             <p14:sldId id="1055"/>
+            <p14:sldId id="1071"/>
+            <p14:sldId id="1070"/>
             <p14:sldId id="1056"/>
             <p14:sldId id="1057"/>
             <p14:sldId id="1058"/>
@@ -242,7 +246,7 @@
 <p1510:revInfo xmlns:a="http://schemas.openxmlformats.org/drawingml/2006/main" xmlns:r="http://schemas.openxmlformats.org/officeDocument/2006/relationships" xmlns:p1510="http://schemas.microsoft.com/office/powerpoint/2015/10/main">
   <p1510:revLst>
     <p1510:client id="{05E68480-3B10-9DDC-13A3-804E098ECB4E}" v="367" dt="2026-02-09T11:24:37.240"/>
-    <p1510:client id="{4C0DE733-53BE-F9E9-255C-E232D43849EE}" v="50" dt="2026-02-09T11:57:30.321"/>
+    <p1510:client id="{4C0DE733-53BE-F9E9-255C-E232D43849EE}" v="166" dt="2026-02-09T12:09:28.159"/>
     <p1510:client id="{CDEA013C-0C4C-7CC9-3073-C215768A4D35}" v="422" dt="2026-02-08T21:59:01.042"/>
     <p1510:client id="{CF275D93-1AF9-5CD7-90BA-CB7126BBAC7F}" v="1388" dt="2026-02-09T11:07:37.102"/>
     <p1510:client id="{D9D7A87D-DE7C-D9BF-B02E-6FFACE30470C}" v="1" dt="2026-02-08T22:04:55.165"/>
@@ -11408,7 +11412,7 @@
           <a:p>
             <a:r>
               <a:rPr lang="de-DE" dirty="0"/>
-              <a:t>Aufgabe 4.2</a:t>
+              <a:t>Aufgabe 3.7</a:t>
             </a:r>
           </a:p>
         </p:txBody>
@@ -11434,30 +11438,6 @@
           <a:bodyPr/>
           <a:lstStyle/>
           <a:p>
-            <a:pPr marL="457200" indent="-457200">
-              <a:buAutoNum type="alphaLcParenR"/>
-            </a:pPr>
-            <a:r>
-              <a:rPr lang="en-GB" dirty="0">
-                <a:cs typeface="Arial"/>
-              </a:rPr>
-              <a:t>6 Knoten und 10 </a:t>
-            </a:r>
-            <a:r>
-              <a:rPr lang="en-GB" dirty="0" err="1">
-                <a:cs typeface="Arial"/>
-              </a:rPr>
-              <a:t>Zweige</a:t>
-            </a:r>
-            <a:r>
-              <a:rPr lang="en-GB" dirty="0">
-                <a:cs typeface="Arial"/>
-              </a:rPr>
-              <a:t>: </a:t>
-            </a:r>
-            <a:endParaRPr lang="en-US" dirty="0"/>
-          </a:p>
-          <a:p>
             <a:pPr marL="0" indent="0">
               <a:buNone/>
             </a:pPr>
@@ -11465,29 +11445,8 @@
               <a:rPr lang="en-GB" dirty="0">
                 <a:cs typeface="Arial"/>
               </a:rPr>
-              <a:t>    m = z - (k-1) = 10 – 5 = 5 </a:t>
+              <a:t>a)</a:t>
             </a:r>
-            <a:r>
-              <a:rPr lang="en-GB" dirty="0" err="1">
-                <a:cs typeface="Arial"/>
-              </a:rPr>
-              <a:t>unabhängige</a:t>
-            </a:r>
-            <a:r>
-              <a:rPr lang="en-GB" dirty="0">
-                <a:cs typeface="Arial"/>
-              </a:rPr>
-              <a:t> </a:t>
-            </a:r>
-            <a:r>
-              <a:rPr lang="en-GB" dirty="0" err="1">
-                <a:cs typeface="Arial"/>
-              </a:rPr>
-              <a:t>Maschengleichungen</a:t>
-            </a:r>
-            <a:endParaRPr lang="en-GB" dirty="0">
-              <a:cs typeface="Arial"/>
-            </a:endParaRPr>
           </a:p>
           <a:p>
             <a:pPr marL="0" indent="0">
@@ -11509,10 +11468,10 @@
       </p:sp>
       <p:pic>
         <p:nvPicPr>
-          <p:cNvPr id="3" name="Picture 2" descr="A diagram of a diagram&#10;&#10;AI-generated content may be incorrect.">
+          <p:cNvPr id="4" name="Picture 3" descr="A diagram of a grid&#10;&#10;AI-generated content may be incorrect.">
             <a:extLst>
               <a:ext uri="{FF2B5EF4-FFF2-40B4-BE49-F238E27FC236}">
-                <a16:creationId xmlns:a16="http://schemas.microsoft.com/office/drawing/2014/main" id="{56576E2D-12A0-6B28-41FB-1D1AE4A72E7C}"/>
+                <a16:creationId xmlns:a16="http://schemas.microsoft.com/office/drawing/2014/main" id="{01F95633-012E-99E4-A9E6-C7407ACBBDD8}"/>
               </a:ext>
             </a:extLst>
           </p:cNvPr>
@@ -11529,14 +11488,390 @@
         </p:blipFill>
         <p:spPr>
           <a:xfrm>
-            <a:off x="2303517" y="2426313"/>
-            <a:ext cx="7593725" cy="3835926"/>
+            <a:off x="2699078" y="1776796"/>
+            <a:ext cx="4972050" cy="4057650"/>
           </a:xfrm>
           <a:prstGeom prst="rect">
             <a:avLst/>
           </a:prstGeom>
         </p:spPr>
       </p:pic>
+      <p:sp>
+        <p:nvSpPr>
+          <p:cNvPr id="5" name="Rectangle 4">
+            <a:extLst>
+              <a:ext uri="{FF2B5EF4-FFF2-40B4-BE49-F238E27FC236}">
+                <a16:creationId xmlns:a16="http://schemas.microsoft.com/office/drawing/2014/main" id="{2553FE32-D25C-80D2-5009-8889EA74E663}"/>
+              </a:ext>
+            </a:extLst>
+          </p:cNvPr>
+          <p:cNvSpPr/>
+          <p:nvPr/>
+        </p:nvSpPr>
+        <p:spPr>
+          <a:xfrm>
+            <a:off x="5332248" y="3050627"/>
+            <a:ext cx="625366" cy="607849"/>
+          </a:xfrm>
+          <a:prstGeom prst="rect">
+            <a:avLst/>
+          </a:prstGeom>
+          <a:ln w="12700"/>
+        </p:spPr>
+        <p:style>
+          <a:lnRef idx="2">
+            <a:schemeClr val="accent1">
+              <a:shade val="50000"/>
+            </a:schemeClr>
+          </a:lnRef>
+          <a:fillRef idx="1">
+            <a:schemeClr val="accent1"/>
+          </a:fillRef>
+          <a:effectRef idx="0">
+            <a:schemeClr val="accent1"/>
+          </a:effectRef>
+          <a:fontRef idx="minor">
+            <a:schemeClr val="lt1"/>
+          </a:fontRef>
+        </p:style>
+        <p:txBody>
+          <a:bodyPr rtlCol="0" anchor="ctr"/>
+          <a:lstStyle/>
+          <a:p>
+            <a:pPr algn="ctr"/>
+            <a:endParaRPr lang="en-GB"/>
+          </a:p>
+        </p:txBody>
+      </p:sp>
+      <p:sp>
+        <p:nvSpPr>
+          <p:cNvPr id="7" name="Rectangle 6">
+            <a:extLst>
+              <a:ext uri="{FF2B5EF4-FFF2-40B4-BE49-F238E27FC236}">
+                <a16:creationId xmlns:a16="http://schemas.microsoft.com/office/drawing/2014/main" id="{A7DA4AFC-6670-6454-B897-47E79E7EAD3E}"/>
+              </a:ext>
+            </a:extLst>
+          </p:cNvPr>
+          <p:cNvSpPr/>
+          <p:nvPr/>
+        </p:nvSpPr>
+        <p:spPr>
+          <a:xfrm>
+            <a:off x="5954109" y="3050626"/>
+            <a:ext cx="625366" cy="607849"/>
+          </a:xfrm>
+          <a:prstGeom prst="rect">
+            <a:avLst/>
+          </a:prstGeom>
+          <a:ln w="12700"/>
+        </p:spPr>
+        <p:style>
+          <a:lnRef idx="2">
+            <a:schemeClr val="accent1">
+              <a:shade val="50000"/>
+            </a:schemeClr>
+          </a:lnRef>
+          <a:fillRef idx="1">
+            <a:schemeClr val="accent1"/>
+          </a:fillRef>
+          <a:effectRef idx="0">
+            <a:schemeClr val="accent1"/>
+          </a:effectRef>
+          <a:fontRef idx="minor">
+            <a:schemeClr val="lt1"/>
+          </a:fontRef>
+        </p:style>
+        <p:txBody>
+          <a:bodyPr rtlCol="0" anchor="ctr"/>
+          <a:lstStyle/>
+          <a:p>
+            <a:pPr algn="ctr"/>
+            <a:endParaRPr lang="en-GB"/>
+          </a:p>
+        </p:txBody>
+      </p:sp>
+      <p:sp>
+        <p:nvSpPr>
+          <p:cNvPr id="8" name="Rectangle 7">
+            <a:extLst>
+              <a:ext uri="{FF2B5EF4-FFF2-40B4-BE49-F238E27FC236}">
+                <a16:creationId xmlns:a16="http://schemas.microsoft.com/office/drawing/2014/main" id="{9317D7CC-1CBC-BC41-8283-AA123DCF9E38}"/>
+              </a:ext>
+            </a:extLst>
+          </p:cNvPr>
+          <p:cNvSpPr/>
+          <p:nvPr/>
+        </p:nvSpPr>
+        <p:spPr>
+          <a:xfrm>
+            <a:off x="6575970" y="3672487"/>
+            <a:ext cx="625366" cy="607849"/>
+          </a:xfrm>
+          <a:prstGeom prst="rect">
+            <a:avLst/>
+          </a:prstGeom>
+          <a:ln w="12700"/>
+        </p:spPr>
+        <p:style>
+          <a:lnRef idx="2">
+            <a:schemeClr val="accent1">
+              <a:shade val="50000"/>
+            </a:schemeClr>
+          </a:lnRef>
+          <a:fillRef idx="1">
+            <a:schemeClr val="accent1"/>
+          </a:fillRef>
+          <a:effectRef idx="0">
+            <a:schemeClr val="accent1"/>
+          </a:effectRef>
+          <a:fontRef idx="minor">
+            <a:schemeClr val="lt1"/>
+          </a:fontRef>
+        </p:style>
+        <p:txBody>
+          <a:bodyPr rtlCol="0" anchor="ctr"/>
+          <a:lstStyle/>
+          <a:p>
+            <a:pPr algn="ctr"/>
+            <a:endParaRPr lang="en-GB"/>
+          </a:p>
+        </p:txBody>
+      </p:sp>
+      <p:sp>
+        <p:nvSpPr>
+          <p:cNvPr id="9" name="Rectangle 8">
+            <a:extLst>
+              <a:ext uri="{FF2B5EF4-FFF2-40B4-BE49-F238E27FC236}">
+                <a16:creationId xmlns:a16="http://schemas.microsoft.com/office/drawing/2014/main" id="{525AF5D9-8DC3-D00A-3C72-DF29993894D7}"/>
+              </a:ext>
+            </a:extLst>
+          </p:cNvPr>
+          <p:cNvSpPr/>
+          <p:nvPr/>
+        </p:nvSpPr>
+        <p:spPr>
+          <a:xfrm>
+            <a:off x="6575969" y="4294348"/>
+            <a:ext cx="625366" cy="607849"/>
+          </a:xfrm>
+          <a:prstGeom prst="rect">
+            <a:avLst/>
+          </a:prstGeom>
+          <a:ln w="12700"/>
+        </p:spPr>
+        <p:style>
+          <a:lnRef idx="2">
+            <a:schemeClr val="accent1">
+              <a:shade val="50000"/>
+            </a:schemeClr>
+          </a:lnRef>
+          <a:fillRef idx="1">
+            <a:schemeClr val="accent1"/>
+          </a:fillRef>
+          <a:effectRef idx="0">
+            <a:schemeClr val="accent1"/>
+          </a:effectRef>
+          <a:fontRef idx="minor">
+            <a:schemeClr val="lt1"/>
+          </a:fontRef>
+        </p:style>
+        <p:txBody>
+          <a:bodyPr rtlCol="0" anchor="ctr"/>
+          <a:lstStyle/>
+          <a:p>
+            <a:pPr algn="ctr"/>
+            <a:endParaRPr lang="en-GB"/>
+          </a:p>
+        </p:txBody>
+      </p:sp>
+      <p:sp>
+        <p:nvSpPr>
+          <p:cNvPr id="10" name="Rectangle 9">
+            <a:extLst>
+              <a:ext uri="{FF2B5EF4-FFF2-40B4-BE49-F238E27FC236}">
+                <a16:creationId xmlns:a16="http://schemas.microsoft.com/office/drawing/2014/main" id="{9BF61AFC-8174-01FC-D31D-A34960AF5F00}"/>
+              </a:ext>
+            </a:extLst>
+          </p:cNvPr>
+          <p:cNvSpPr/>
+          <p:nvPr/>
+        </p:nvSpPr>
+        <p:spPr>
+          <a:xfrm>
+            <a:off x="5332245" y="4924968"/>
+            <a:ext cx="625366" cy="607849"/>
+          </a:xfrm>
+          <a:prstGeom prst="rect">
+            <a:avLst/>
+          </a:prstGeom>
+          <a:ln w="12700"/>
+        </p:spPr>
+        <p:style>
+          <a:lnRef idx="2">
+            <a:schemeClr val="accent1">
+              <a:shade val="50000"/>
+            </a:schemeClr>
+          </a:lnRef>
+          <a:fillRef idx="1">
+            <a:schemeClr val="accent1"/>
+          </a:fillRef>
+          <a:effectRef idx="0">
+            <a:schemeClr val="accent1"/>
+          </a:effectRef>
+          <a:fontRef idx="minor">
+            <a:schemeClr val="lt1"/>
+          </a:fontRef>
+        </p:style>
+        <p:txBody>
+          <a:bodyPr rtlCol="0" anchor="ctr"/>
+          <a:lstStyle/>
+          <a:p>
+            <a:pPr algn="ctr"/>
+            <a:endParaRPr lang="en-GB"/>
+          </a:p>
+        </p:txBody>
+      </p:sp>
+      <p:sp>
+        <p:nvSpPr>
+          <p:cNvPr id="11" name="Rectangle 10">
+            <a:extLst>
+              <a:ext uri="{FF2B5EF4-FFF2-40B4-BE49-F238E27FC236}">
+                <a16:creationId xmlns:a16="http://schemas.microsoft.com/office/drawing/2014/main" id="{73A9399B-7124-48BB-C7F7-0447B50B36EA}"/>
+              </a:ext>
+            </a:extLst>
+          </p:cNvPr>
+          <p:cNvSpPr/>
+          <p:nvPr/>
+        </p:nvSpPr>
+        <p:spPr>
+          <a:xfrm>
+            <a:off x="5954106" y="4916209"/>
+            <a:ext cx="625366" cy="607849"/>
+          </a:xfrm>
+          <a:prstGeom prst="rect">
+            <a:avLst/>
+          </a:prstGeom>
+          <a:ln w="12700"/>
+        </p:spPr>
+        <p:style>
+          <a:lnRef idx="2">
+            <a:schemeClr val="accent1">
+              <a:shade val="50000"/>
+            </a:schemeClr>
+          </a:lnRef>
+          <a:fillRef idx="1">
+            <a:schemeClr val="accent1"/>
+          </a:fillRef>
+          <a:effectRef idx="0">
+            <a:schemeClr val="accent1"/>
+          </a:effectRef>
+          <a:fontRef idx="minor">
+            <a:schemeClr val="lt1"/>
+          </a:fontRef>
+        </p:style>
+        <p:txBody>
+          <a:bodyPr rtlCol="0" anchor="ctr"/>
+          <a:lstStyle/>
+          <a:p>
+            <a:pPr algn="ctr"/>
+            <a:endParaRPr lang="en-GB"/>
+          </a:p>
+        </p:txBody>
+      </p:sp>
+      <p:sp>
+        <p:nvSpPr>
+          <p:cNvPr id="12" name="Rectangle 11">
+            <a:extLst>
+              <a:ext uri="{FF2B5EF4-FFF2-40B4-BE49-F238E27FC236}">
+                <a16:creationId xmlns:a16="http://schemas.microsoft.com/office/drawing/2014/main" id="{89ACC5A9-E19F-374D-EA4B-B436121AA008}"/>
+              </a:ext>
+            </a:extLst>
+          </p:cNvPr>
+          <p:cNvSpPr/>
+          <p:nvPr/>
+        </p:nvSpPr>
+        <p:spPr>
+          <a:xfrm>
+            <a:off x="4710382" y="3672484"/>
+            <a:ext cx="625366" cy="607849"/>
+          </a:xfrm>
+          <a:prstGeom prst="rect">
+            <a:avLst/>
+          </a:prstGeom>
+          <a:ln w="12700"/>
+        </p:spPr>
+        <p:style>
+          <a:lnRef idx="2">
+            <a:schemeClr val="accent1">
+              <a:shade val="50000"/>
+            </a:schemeClr>
+          </a:lnRef>
+          <a:fillRef idx="1">
+            <a:schemeClr val="accent1"/>
+          </a:fillRef>
+          <a:effectRef idx="0">
+            <a:schemeClr val="accent1"/>
+          </a:effectRef>
+          <a:fontRef idx="minor">
+            <a:schemeClr val="lt1"/>
+          </a:fontRef>
+        </p:style>
+        <p:txBody>
+          <a:bodyPr rtlCol="0" anchor="ctr"/>
+          <a:lstStyle/>
+          <a:p>
+            <a:pPr algn="ctr"/>
+            <a:endParaRPr lang="en-GB"/>
+          </a:p>
+        </p:txBody>
+      </p:sp>
+      <p:sp>
+        <p:nvSpPr>
+          <p:cNvPr id="13" name="Rectangle 12">
+            <a:extLst>
+              <a:ext uri="{FF2B5EF4-FFF2-40B4-BE49-F238E27FC236}">
+                <a16:creationId xmlns:a16="http://schemas.microsoft.com/office/drawing/2014/main" id="{41C511BB-DA7A-5446-526E-D4F01DE9D95C}"/>
+              </a:ext>
+            </a:extLst>
+          </p:cNvPr>
+          <p:cNvSpPr/>
+          <p:nvPr/>
+        </p:nvSpPr>
+        <p:spPr>
+          <a:xfrm>
+            <a:off x="4710381" y="4294346"/>
+            <a:ext cx="625366" cy="607849"/>
+          </a:xfrm>
+          <a:prstGeom prst="rect">
+            <a:avLst/>
+          </a:prstGeom>
+          <a:ln w="12700"/>
+        </p:spPr>
+        <p:style>
+          <a:lnRef idx="2">
+            <a:schemeClr val="accent1">
+              <a:shade val="50000"/>
+            </a:schemeClr>
+          </a:lnRef>
+          <a:fillRef idx="1">
+            <a:schemeClr val="accent1"/>
+          </a:fillRef>
+          <a:effectRef idx="0">
+            <a:schemeClr val="accent1"/>
+          </a:effectRef>
+          <a:fontRef idx="minor">
+            <a:schemeClr val="lt1"/>
+          </a:fontRef>
+        </p:style>
+        <p:txBody>
+          <a:bodyPr rtlCol="0" anchor="ctr"/>
+          <a:lstStyle/>
+          <a:p>
+            <a:pPr algn="ctr"/>
+            <a:endParaRPr lang="en-GB"/>
+          </a:p>
+        </p:txBody>
+      </p:sp>
     </p:spTree>
     <p:extLst>
       <p:ext uri="{BB962C8B-B14F-4D97-AF65-F5344CB8AC3E}">
@@ -12257,6 +12592,706 @@
         <p:cNvPr id="1" name="">
           <a:extLst>
             <a:ext uri="{FF2B5EF4-FFF2-40B4-BE49-F238E27FC236}">
+              <a16:creationId xmlns:a16="http://schemas.microsoft.com/office/drawing/2014/main" id="{0FB9D3CC-2816-9E0B-FCD9-13464E2555FB}"/>
+            </a:ext>
+          </a:extLst>
+        </p:cNvPr>
+        <p:cNvGrpSpPr/>
+        <p:nvPr/>
+      </p:nvGrpSpPr>
+      <p:grpSpPr>
+        <a:xfrm>
+          <a:off x="0" y="0"/>
+          <a:ext cx="0" cy="0"/>
+          <a:chOff x="0" y="0"/>
+          <a:chExt cx="0" cy="0"/>
+        </a:xfrm>
+      </p:grpSpPr>
+      <p:sp>
+        <p:nvSpPr>
+          <p:cNvPr id="2" name="Titel 1">
+            <a:extLst>
+              <a:ext uri="{FF2B5EF4-FFF2-40B4-BE49-F238E27FC236}">
+                <a16:creationId xmlns:a16="http://schemas.microsoft.com/office/drawing/2014/main" id="{3C0705A3-AB8C-DE02-3D93-D0D2B659198E}"/>
+              </a:ext>
+            </a:extLst>
+          </p:cNvPr>
+          <p:cNvSpPr>
+            <a:spLocks noGrp="1"/>
+          </p:cNvSpPr>
+          <p:nvPr>
+            <p:ph type="title"/>
+          </p:nvPr>
+        </p:nvSpPr>
+        <p:spPr/>
+        <p:txBody>
+          <a:bodyPr/>
+          <a:lstStyle/>
+          <a:p>
+            <a:r>
+              <a:rPr lang="de-DE" dirty="0"/>
+              <a:t>Aufgabe 3.7</a:t>
+            </a:r>
+          </a:p>
+        </p:txBody>
+      </p:sp>
+      <p:sp>
+        <p:nvSpPr>
+          <p:cNvPr id="6" name="Content Placeholder 5">
+            <a:extLst>
+              <a:ext uri="{FF2B5EF4-FFF2-40B4-BE49-F238E27FC236}">
+                <a16:creationId xmlns:a16="http://schemas.microsoft.com/office/drawing/2014/main" id="{4CB9FE27-A2D3-0528-14C1-92B7960713ED}"/>
+              </a:ext>
+            </a:extLst>
+          </p:cNvPr>
+          <p:cNvSpPr>
+            <a:spLocks noGrp="1"/>
+          </p:cNvSpPr>
+          <p:nvPr>
+            <p:ph idx="1"/>
+          </p:nvPr>
+        </p:nvSpPr>
+        <p:spPr/>
+        <p:txBody>
+          <a:bodyPr/>
+          <a:lstStyle/>
+          <a:p>
+            <a:pPr marL="0" indent="0">
+              <a:buNone/>
+            </a:pPr>
+            <a:r>
+              <a:rPr lang="en-GB" dirty="0">
+                <a:cs typeface="Arial"/>
+              </a:rPr>
+              <a:t>b)</a:t>
+            </a:r>
+          </a:p>
+          <a:p>
+            <a:pPr marL="0" indent="0">
+              <a:buNone/>
+            </a:pPr>
+            <a:endParaRPr lang="en-GB" dirty="0">
+              <a:cs typeface="Arial"/>
+            </a:endParaRPr>
+          </a:p>
+          <a:p>
+            <a:pPr marL="0" indent="0">
+              <a:buNone/>
+            </a:pPr>
+            <a:endParaRPr lang="en-GB" dirty="0">
+              <a:cs typeface="Arial"/>
+            </a:endParaRPr>
+          </a:p>
+        </p:txBody>
+      </p:sp>
+      <p:pic>
+        <p:nvPicPr>
+          <p:cNvPr id="15" name="Picture 14" descr="A white rectangular object with black text&#10;&#10;AI-generated content may be incorrect.">
+            <a:extLst>
+              <a:ext uri="{FF2B5EF4-FFF2-40B4-BE49-F238E27FC236}">
+                <a16:creationId xmlns:a16="http://schemas.microsoft.com/office/drawing/2014/main" id="{2CE87F01-6937-0C21-D3DD-8C0FA667E9EE}"/>
+              </a:ext>
+            </a:extLst>
+          </p:cNvPr>
+          <p:cNvPicPr>
+            <a:picLocks noChangeAspect="1"/>
+          </p:cNvPicPr>
+          <p:nvPr/>
+        </p:nvPicPr>
+        <p:blipFill>
+          <a:blip r:embed="rId2"/>
+          <a:srcRect t="88" b="1647"/>
+          <a:stretch>
+            <a:fillRect/>
+          </a:stretch>
+        </p:blipFill>
+        <p:spPr>
+          <a:xfrm>
+            <a:off x="1043828" y="1859705"/>
+            <a:ext cx="10668000" cy="3803649"/>
+          </a:xfrm>
+          <a:prstGeom prst="rect">
+            <a:avLst/>
+          </a:prstGeom>
+        </p:spPr>
+      </p:pic>
+      <p:sp>
+        <p:nvSpPr>
+          <p:cNvPr id="17" name="TextBox 16">
+            <a:extLst>
+              <a:ext uri="{FF2B5EF4-FFF2-40B4-BE49-F238E27FC236}">
+                <a16:creationId xmlns:a16="http://schemas.microsoft.com/office/drawing/2014/main" id="{6D05524C-1A62-8431-AB7E-AE594531D225}"/>
+              </a:ext>
+            </a:extLst>
+          </p:cNvPr>
+          <p:cNvSpPr txBox="1"/>
+          <p:nvPr/>
+        </p:nvSpPr>
+        <p:spPr>
+          <a:xfrm>
+            <a:off x="4147594" y="3173392"/>
+            <a:ext cx="511215" cy="707886"/>
+          </a:xfrm>
+          <a:prstGeom prst="rect">
+            <a:avLst/>
+          </a:prstGeom>
+          <a:noFill/>
+        </p:spPr>
+        <p:txBody>
+          <a:bodyPr rot="0" spcFirstLastPara="0" vertOverflow="overflow" horzOverflow="overflow" vert="horz" wrap="square" lIns="91440" tIns="45720" rIns="91440" bIns="45720" numCol="1" spcCol="0" rtlCol="0" fromWordArt="0" anchor="t" anchorCtr="0" forceAA="0" compatLnSpc="1">
+            <a:prstTxWarp prst="textNoShape">
+              <a:avLst/>
+            </a:prstTxWarp>
+            <a:spAutoFit/>
+          </a:bodyPr>
+          <a:lstStyle/>
+          <a:p>
+            <a:pPr algn="l"/>
+            <a:r>
+              <a:rPr lang="en-GB" sz="4000" dirty="0">
+                <a:latin typeface="Arial"/>
+                <a:cs typeface="Arial"/>
+              </a:rPr>
+              <a:t>X</a:t>
+            </a:r>
+            <a:endParaRPr lang="en-GB" sz="4400" dirty="0">
+              <a:latin typeface="Arial"/>
+              <a:cs typeface="Arial"/>
+            </a:endParaRPr>
+          </a:p>
+        </p:txBody>
+      </p:sp>
+      <p:sp>
+        <p:nvSpPr>
+          <p:cNvPr id="18" name="TextBox 17">
+            <a:extLst>
+              <a:ext uri="{FF2B5EF4-FFF2-40B4-BE49-F238E27FC236}">
+                <a16:creationId xmlns:a16="http://schemas.microsoft.com/office/drawing/2014/main" id="{02F7A1D5-16DC-B37C-C635-7C82D37D665C}"/>
+              </a:ext>
+            </a:extLst>
+          </p:cNvPr>
+          <p:cNvSpPr txBox="1"/>
+          <p:nvPr/>
+        </p:nvSpPr>
+        <p:spPr>
+          <a:xfrm>
+            <a:off x="8931796" y="3173391"/>
+            <a:ext cx="511215" cy="707886"/>
+          </a:xfrm>
+          <a:prstGeom prst="rect">
+            <a:avLst/>
+          </a:prstGeom>
+          <a:noFill/>
+        </p:spPr>
+        <p:txBody>
+          <a:bodyPr rot="0" spcFirstLastPara="0" vertOverflow="overflow" horzOverflow="overflow" vert="horz" wrap="square" lIns="91440" tIns="45720" rIns="91440" bIns="45720" numCol="1" spcCol="0" rtlCol="0" fromWordArt="0" anchor="t" anchorCtr="0" forceAA="0" compatLnSpc="1">
+            <a:prstTxWarp prst="textNoShape">
+              <a:avLst/>
+            </a:prstTxWarp>
+            <a:spAutoFit/>
+          </a:bodyPr>
+          <a:lstStyle/>
+          <a:p>
+            <a:pPr algn="l"/>
+            <a:r>
+              <a:rPr lang="en-GB" sz="4000" dirty="0">
+                <a:latin typeface="Arial"/>
+                <a:cs typeface="Arial"/>
+              </a:rPr>
+              <a:t>X</a:t>
+            </a:r>
+            <a:endParaRPr lang="en-GB" sz="4400" dirty="0">
+              <a:latin typeface="Arial"/>
+              <a:cs typeface="Arial"/>
+            </a:endParaRPr>
+          </a:p>
+        </p:txBody>
+      </p:sp>
+      <p:sp>
+        <p:nvSpPr>
+          <p:cNvPr id="20" name="TextBox 19">
+            <a:extLst>
+              <a:ext uri="{FF2B5EF4-FFF2-40B4-BE49-F238E27FC236}">
+                <a16:creationId xmlns:a16="http://schemas.microsoft.com/office/drawing/2014/main" id="{7EDE88BE-38A8-CB65-F954-E576AA464FE0}"/>
+              </a:ext>
+            </a:extLst>
+          </p:cNvPr>
+          <p:cNvSpPr txBox="1"/>
+          <p:nvPr/>
+        </p:nvSpPr>
+        <p:spPr>
+          <a:xfrm>
+            <a:off x="10012099" y="3173390"/>
+            <a:ext cx="511215" cy="707886"/>
+          </a:xfrm>
+          <a:prstGeom prst="rect">
+            <a:avLst/>
+          </a:prstGeom>
+          <a:noFill/>
+        </p:spPr>
+        <p:txBody>
+          <a:bodyPr rot="0" spcFirstLastPara="0" vertOverflow="overflow" horzOverflow="overflow" vert="horz" wrap="square" lIns="91440" tIns="45720" rIns="91440" bIns="45720" numCol="1" spcCol="0" rtlCol="0" fromWordArt="0" anchor="t" anchorCtr="0" forceAA="0" compatLnSpc="1">
+            <a:prstTxWarp prst="textNoShape">
+              <a:avLst/>
+            </a:prstTxWarp>
+            <a:spAutoFit/>
+          </a:bodyPr>
+          <a:lstStyle/>
+          <a:p>
+            <a:pPr algn="l"/>
+            <a:r>
+              <a:rPr lang="en-GB" sz="4000" dirty="0">
+                <a:latin typeface="Arial"/>
+                <a:cs typeface="Arial"/>
+              </a:rPr>
+              <a:t>X</a:t>
+            </a:r>
+            <a:endParaRPr lang="en-GB" sz="4400" dirty="0">
+              <a:latin typeface="Arial"/>
+              <a:cs typeface="Arial"/>
+            </a:endParaRPr>
+          </a:p>
+        </p:txBody>
+      </p:sp>
+      <p:sp>
+        <p:nvSpPr>
+          <p:cNvPr id="21" name="TextBox 20">
+            <a:extLst>
+              <a:ext uri="{FF2B5EF4-FFF2-40B4-BE49-F238E27FC236}">
+                <a16:creationId xmlns:a16="http://schemas.microsoft.com/office/drawing/2014/main" id="{92091E4F-EC43-08E3-6828-C6A45FBBCFFF}"/>
+              </a:ext>
+            </a:extLst>
+          </p:cNvPr>
+          <p:cNvSpPr txBox="1"/>
+          <p:nvPr/>
+        </p:nvSpPr>
+        <p:spPr>
+          <a:xfrm>
+            <a:off x="10880200" y="4764909"/>
+            <a:ext cx="511215" cy="707886"/>
+          </a:xfrm>
+          <a:prstGeom prst="rect">
+            <a:avLst/>
+          </a:prstGeom>
+          <a:noFill/>
+        </p:spPr>
+        <p:txBody>
+          <a:bodyPr rot="0" spcFirstLastPara="0" vertOverflow="overflow" horzOverflow="overflow" vert="horz" wrap="square" lIns="91440" tIns="45720" rIns="91440" bIns="45720" numCol="1" spcCol="0" rtlCol="0" fromWordArt="0" anchor="t" anchorCtr="0" forceAA="0" compatLnSpc="1">
+            <a:prstTxWarp prst="textNoShape">
+              <a:avLst/>
+            </a:prstTxWarp>
+            <a:spAutoFit/>
+          </a:bodyPr>
+          <a:lstStyle/>
+          <a:p>
+            <a:pPr algn="l"/>
+            <a:r>
+              <a:rPr lang="en-GB" sz="4000" dirty="0">
+                <a:latin typeface="Arial"/>
+                <a:cs typeface="Arial"/>
+              </a:rPr>
+              <a:t>X</a:t>
+            </a:r>
+            <a:endParaRPr lang="en-GB" sz="4400" dirty="0">
+              <a:latin typeface="Arial"/>
+              <a:cs typeface="Arial"/>
+            </a:endParaRPr>
+          </a:p>
+        </p:txBody>
+      </p:sp>
+      <p:sp>
+        <p:nvSpPr>
+          <p:cNvPr id="22" name="TextBox 21">
+            <a:extLst>
+              <a:ext uri="{FF2B5EF4-FFF2-40B4-BE49-F238E27FC236}">
+                <a16:creationId xmlns:a16="http://schemas.microsoft.com/office/drawing/2014/main" id="{06983CBF-02FE-1936-B604-59FC5A24ECFF}"/>
+              </a:ext>
+            </a:extLst>
+          </p:cNvPr>
+          <p:cNvSpPr txBox="1"/>
+          <p:nvPr/>
+        </p:nvSpPr>
+        <p:spPr>
+          <a:xfrm>
+            <a:off x="4147592" y="3945035"/>
+            <a:ext cx="511215" cy="707886"/>
+          </a:xfrm>
+          <a:prstGeom prst="rect">
+            <a:avLst/>
+          </a:prstGeom>
+          <a:noFill/>
+        </p:spPr>
+        <p:txBody>
+          <a:bodyPr rot="0" spcFirstLastPara="0" vertOverflow="overflow" horzOverflow="overflow" vert="horz" wrap="square" lIns="91440" tIns="45720" rIns="91440" bIns="45720" numCol="1" spcCol="0" rtlCol="0" fromWordArt="0" anchor="t" anchorCtr="0" forceAA="0" compatLnSpc="1">
+            <a:prstTxWarp prst="textNoShape">
+              <a:avLst/>
+            </a:prstTxWarp>
+            <a:spAutoFit/>
+          </a:bodyPr>
+          <a:lstStyle/>
+          <a:p>
+            <a:pPr algn="l"/>
+            <a:r>
+              <a:rPr lang="en-GB" sz="4000" dirty="0">
+                <a:latin typeface="Arial"/>
+                <a:cs typeface="Arial"/>
+              </a:rPr>
+              <a:t>X</a:t>
+            </a:r>
+            <a:endParaRPr lang="en-GB" sz="4400" dirty="0">
+              <a:latin typeface="Arial"/>
+              <a:cs typeface="Arial"/>
+            </a:endParaRPr>
+          </a:p>
+        </p:txBody>
+      </p:sp>
+      <p:sp>
+        <p:nvSpPr>
+          <p:cNvPr id="23" name="TextBox 22">
+            <a:extLst>
+              <a:ext uri="{FF2B5EF4-FFF2-40B4-BE49-F238E27FC236}">
+                <a16:creationId xmlns:a16="http://schemas.microsoft.com/office/drawing/2014/main" id="{0E9AA9DA-ED4D-94F3-AC40-D0FBD476C025}"/>
+              </a:ext>
+            </a:extLst>
+          </p:cNvPr>
+          <p:cNvSpPr txBox="1"/>
+          <p:nvPr/>
+        </p:nvSpPr>
+        <p:spPr>
+          <a:xfrm>
+            <a:off x="7890073" y="3945035"/>
+            <a:ext cx="511215" cy="707886"/>
+          </a:xfrm>
+          <a:prstGeom prst="rect">
+            <a:avLst/>
+          </a:prstGeom>
+          <a:noFill/>
+        </p:spPr>
+        <p:txBody>
+          <a:bodyPr rot="0" spcFirstLastPara="0" vertOverflow="overflow" horzOverflow="overflow" vert="horz" wrap="square" lIns="91440" tIns="45720" rIns="91440" bIns="45720" numCol="1" spcCol="0" rtlCol="0" fromWordArt="0" anchor="t" anchorCtr="0" forceAA="0" compatLnSpc="1">
+            <a:prstTxWarp prst="textNoShape">
+              <a:avLst/>
+            </a:prstTxWarp>
+            <a:spAutoFit/>
+          </a:bodyPr>
+          <a:lstStyle/>
+          <a:p>
+            <a:pPr algn="l"/>
+            <a:r>
+              <a:rPr lang="en-GB" sz="4000" dirty="0">
+                <a:latin typeface="Arial"/>
+                <a:cs typeface="Arial"/>
+              </a:rPr>
+              <a:t>X</a:t>
+            </a:r>
+            <a:endParaRPr lang="en-GB" sz="4400" dirty="0">
+              <a:latin typeface="Arial"/>
+              <a:cs typeface="Arial"/>
+            </a:endParaRPr>
+          </a:p>
+        </p:txBody>
+      </p:sp>
+      <p:sp>
+        <p:nvSpPr>
+          <p:cNvPr id="24" name="TextBox 23">
+            <a:extLst>
+              <a:ext uri="{FF2B5EF4-FFF2-40B4-BE49-F238E27FC236}">
+                <a16:creationId xmlns:a16="http://schemas.microsoft.com/office/drawing/2014/main" id="{6FEBD727-531B-A642-5EE3-DB9BEFA66D4C}"/>
+              </a:ext>
+            </a:extLst>
+          </p:cNvPr>
+          <p:cNvSpPr txBox="1"/>
+          <p:nvPr/>
+        </p:nvSpPr>
+        <p:spPr>
+          <a:xfrm>
+            <a:off x="10880199" y="3945035"/>
+            <a:ext cx="511215" cy="707886"/>
+          </a:xfrm>
+          <a:prstGeom prst="rect">
+            <a:avLst/>
+          </a:prstGeom>
+          <a:noFill/>
+        </p:spPr>
+        <p:txBody>
+          <a:bodyPr rot="0" spcFirstLastPara="0" vertOverflow="overflow" horzOverflow="overflow" vert="horz" wrap="square" lIns="91440" tIns="45720" rIns="91440" bIns="45720" numCol="1" spcCol="0" rtlCol="0" fromWordArt="0" anchor="t" anchorCtr="0" forceAA="0" compatLnSpc="1">
+            <a:prstTxWarp prst="textNoShape">
+              <a:avLst/>
+            </a:prstTxWarp>
+            <a:spAutoFit/>
+          </a:bodyPr>
+          <a:lstStyle/>
+          <a:p>
+            <a:pPr algn="l"/>
+            <a:r>
+              <a:rPr lang="en-GB" sz="4000" dirty="0">
+                <a:latin typeface="Arial"/>
+                <a:cs typeface="Arial"/>
+              </a:rPr>
+              <a:t>X</a:t>
+            </a:r>
+            <a:endParaRPr lang="en-GB" sz="4400" dirty="0">
+              <a:latin typeface="Arial"/>
+              <a:cs typeface="Arial"/>
+            </a:endParaRPr>
+          </a:p>
+        </p:txBody>
+      </p:sp>
+      <p:sp>
+        <p:nvSpPr>
+          <p:cNvPr id="25" name="TextBox 24">
+            <a:extLst>
+              <a:ext uri="{FF2B5EF4-FFF2-40B4-BE49-F238E27FC236}">
+                <a16:creationId xmlns:a16="http://schemas.microsoft.com/office/drawing/2014/main" id="{F95C9599-A282-1268-36BB-4F413CB96FF3}"/>
+              </a:ext>
+            </a:extLst>
+          </p:cNvPr>
+          <p:cNvSpPr txBox="1"/>
+          <p:nvPr/>
+        </p:nvSpPr>
+        <p:spPr>
+          <a:xfrm>
+            <a:off x="3202326" y="4764908"/>
+            <a:ext cx="511215" cy="707886"/>
+          </a:xfrm>
+          <a:prstGeom prst="rect">
+            <a:avLst/>
+          </a:prstGeom>
+          <a:noFill/>
+        </p:spPr>
+        <p:txBody>
+          <a:bodyPr rot="0" spcFirstLastPara="0" vertOverflow="overflow" horzOverflow="overflow" vert="horz" wrap="square" lIns="91440" tIns="45720" rIns="91440" bIns="45720" numCol="1" spcCol="0" rtlCol="0" fromWordArt="0" anchor="t" anchorCtr="0" forceAA="0" compatLnSpc="1">
+            <a:prstTxWarp prst="textNoShape">
+              <a:avLst/>
+            </a:prstTxWarp>
+            <a:spAutoFit/>
+          </a:bodyPr>
+          <a:lstStyle/>
+          <a:p>
+            <a:pPr algn="l"/>
+            <a:r>
+              <a:rPr lang="en-GB" sz="4000" dirty="0">
+                <a:latin typeface="Arial"/>
+                <a:cs typeface="Arial"/>
+              </a:rPr>
+              <a:t>X</a:t>
+            </a:r>
+            <a:endParaRPr lang="en-GB" sz="4400" dirty="0">
+              <a:latin typeface="Arial"/>
+              <a:cs typeface="Arial"/>
+            </a:endParaRPr>
+          </a:p>
+        </p:txBody>
+      </p:sp>
+    </p:spTree>
+    <p:extLst>
+      <p:ext uri="{BB962C8B-B14F-4D97-AF65-F5344CB8AC3E}">
+        <p14:creationId xmlns:p14="http://schemas.microsoft.com/office/powerpoint/2010/main" val="3277961374"/>
+      </p:ext>
+    </p:extLst>
+  </p:cSld>
+  <p:clrMapOvr>
+    <a:masterClrMapping/>
+  </p:clrMapOvr>
+</p:sld>
+</file>
+
+<file path=ppt/slides/slide21.xml><?xml version="1.0" encoding="utf-8"?>
+<p:sld xmlns:a="http://schemas.openxmlformats.org/drawingml/2006/main" xmlns:r="http://schemas.openxmlformats.org/officeDocument/2006/relationships" xmlns:p="http://schemas.openxmlformats.org/presentationml/2006/main">
+  <p:cSld>
+    <p:spTree>
+      <p:nvGrpSpPr>
+        <p:cNvPr id="1" name="">
+          <a:extLst>
+            <a:ext uri="{FF2B5EF4-FFF2-40B4-BE49-F238E27FC236}">
+              <a16:creationId xmlns:a16="http://schemas.microsoft.com/office/drawing/2014/main" id="{C327467C-543D-1233-B796-516A6E5B9003}"/>
+            </a:ext>
+          </a:extLst>
+        </p:cNvPr>
+        <p:cNvGrpSpPr/>
+        <p:nvPr/>
+      </p:nvGrpSpPr>
+      <p:grpSpPr>
+        <a:xfrm>
+          <a:off x="0" y="0"/>
+          <a:ext cx="0" cy="0"/>
+          <a:chOff x="0" y="0"/>
+          <a:chExt cx="0" cy="0"/>
+        </a:xfrm>
+      </p:grpSpPr>
+      <p:sp>
+        <p:nvSpPr>
+          <p:cNvPr id="2" name="Titel 1">
+            <a:extLst>
+              <a:ext uri="{FF2B5EF4-FFF2-40B4-BE49-F238E27FC236}">
+                <a16:creationId xmlns:a16="http://schemas.microsoft.com/office/drawing/2014/main" id="{BA02FA69-4E4F-C9F4-D744-DC9720498A48}"/>
+              </a:ext>
+            </a:extLst>
+          </p:cNvPr>
+          <p:cNvSpPr>
+            <a:spLocks noGrp="1"/>
+          </p:cNvSpPr>
+          <p:nvPr>
+            <p:ph type="title"/>
+          </p:nvPr>
+        </p:nvSpPr>
+        <p:spPr/>
+        <p:txBody>
+          <a:bodyPr/>
+          <a:lstStyle/>
+          <a:p>
+            <a:r>
+              <a:rPr lang="de-DE" dirty="0"/>
+              <a:t>Aufgabe 4.2</a:t>
+            </a:r>
+          </a:p>
+        </p:txBody>
+      </p:sp>
+      <p:sp>
+        <p:nvSpPr>
+          <p:cNvPr id="6" name="Content Placeholder 5">
+            <a:extLst>
+              <a:ext uri="{FF2B5EF4-FFF2-40B4-BE49-F238E27FC236}">
+                <a16:creationId xmlns:a16="http://schemas.microsoft.com/office/drawing/2014/main" id="{1BF0A2E6-2043-3F44-4FAF-454862755CDC}"/>
+              </a:ext>
+            </a:extLst>
+          </p:cNvPr>
+          <p:cNvSpPr>
+            <a:spLocks noGrp="1"/>
+          </p:cNvSpPr>
+          <p:nvPr>
+            <p:ph idx="1"/>
+          </p:nvPr>
+        </p:nvSpPr>
+        <p:spPr/>
+        <p:txBody>
+          <a:bodyPr/>
+          <a:lstStyle/>
+          <a:p>
+            <a:pPr marL="457200" indent="-457200">
+              <a:buAutoNum type="alphaLcParenR"/>
+            </a:pPr>
+            <a:r>
+              <a:rPr lang="en-GB" dirty="0">
+                <a:cs typeface="Arial"/>
+              </a:rPr>
+              <a:t>6 Knoten und 10 </a:t>
+            </a:r>
+            <a:r>
+              <a:rPr lang="en-GB" dirty="0" err="1">
+                <a:cs typeface="Arial"/>
+              </a:rPr>
+              <a:t>Zweige</a:t>
+            </a:r>
+            <a:r>
+              <a:rPr lang="en-GB" dirty="0">
+                <a:cs typeface="Arial"/>
+              </a:rPr>
+              <a:t>: </a:t>
+            </a:r>
+            <a:endParaRPr lang="en-US" dirty="0"/>
+          </a:p>
+          <a:p>
+            <a:pPr marL="0" indent="0">
+              <a:buNone/>
+            </a:pPr>
+            <a:r>
+              <a:rPr lang="en-GB" dirty="0">
+                <a:cs typeface="Arial"/>
+              </a:rPr>
+              <a:t>    m = z - (k-1) = 10 – 5 = 5 </a:t>
+            </a:r>
+            <a:r>
+              <a:rPr lang="en-GB" dirty="0" err="1">
+                <a:cs typeface="Arial"/>
+              </a:rPr>
+              <a:t>unabhängige</a:t>
+            </a:r>
+            <a:r>
+              <a:rPr lang="en-GB" dirty="0">
+                <a:cs typeface="Arial"/>
+              </a:rPr>
+              <a:t> </a:t>
+            </a:r>
+            <a:r>
+              <a:rPr lang="en-GB" dirty="0" err="1">
+                <a:cs typeface="Arial"/>
+              </a:rPr>
+              <a:t>Maschengleichungen</a:t>
+            </a:r>
+            <a:endParaRPr lang="en-GB" dirty="0">
+              <a:cs typeface="Arial"/>
+            </a:endParaRPr>
+          </a:p>
+          <a:p>
+            <a:pPr marL="0" indent="0">
+              <a:buNone/>
+            </a:pPr>
+            <a:endParaRPr lang="en-GB" dirty="0">
+              <a:cs typeface="Arial"/>
+            </a:endParaRPr>
+          </a:p>
+          <a:p>
+            <a:pPr marL="0" indent="0">
+              <a:buNone/>
+            </a:pPr>
+            <a:endParaRPr lang="en-GB" dirty="0">
+              <a:cs typeface="Arial"/>
+            </a:endParaRPr>
+          </a:p>
+        </p:txBody>
+      </p:sp>
+      <p:pic>
+        <p:nvPicPr>
+          <p:cNvPr id="3" name="Picture 2" descr="A diagram of a diagram&#10;&#10;AI-generated content may be incorrect.">
+            <a:extLst>
+              <a:ext uri="{FF2B5EF4-FFF2-40B4-BE49-F238E27FC236}">
+                <a16:creationId xmlns:a16="http://schemas.microsoft.com/office/drawing/2014/main" id="{0CA1B3B7-9633-10E4-4B65-E50F4E22C4E9}"/>
+              </a:ext>
+            </a:extLst>
+          </p:cNvPr>
+          <p:cNvPicPr>
+            <a:picLocks noChangeAspect="1"/>
+          </p:cNvPicPr>
+          <p:nvPr/>
+        </p:nvPicPr>
+        <p:blipFill>
+          <a:blip r:embed="rId2"/>
+          <a:stretch>
+            <a:fillRect/>
+          </a:stretch>
+        </p:blipFill>
+        <p:spPr>
+          <a:xfrm>
+            <a:off x="2303517" y="2426313"/>
+            <a:ext cx="7593725" cy="3835926"/>
+          </a:xfrm>
+          <a:prstGeom prst="rect">
+            <a:avLst/>
+          </a:prstGeom>
+        </p:spPr>
+      </p:pic>
+    </p:spTree>
+    <p:extLst>
+      <p:ext uri="{BB962C8B-B14F-4D97-AF65-F5344CB8AC3E}">
+        <p14:creationId xmlns:p14="http://schemas.microsoft.com/office/powerpoint/2010/main" val="4002621329"/>
+      </p:ext>
+    </p:extLst>
+  </p:cSld>
+  <p:clrMapOvr>
+    <a:masterClrMapping/>
+  </p:clrMapOvr>
+</p:sld>
+</file>
+
+<file path=ppt/slides/slide22.xml><?xml version="1.0" encoding="utf-8"?>
+<p:sld xmlns:a="http://schemas.openxmlformats.org/drawingml/2006/main" xmlns:r="http://schemas.openxmlformats.org/officeDocument/2006/relationships" xmlns:p="http://schemas.openxmlformats.org/presentationml/2006/main">
+  <p:cSld>
+    <p:spTree>
+      <p:nvGrpSpPr>
+        <p:cNvPr id="1" name="">
+          <a:extLst>
+            <a:ext uri="{FF2B5EF4-FFF2-40B4-BE49-F238E27FC236}">
               <a16:creationId xmlns:a16="http://schemas.microsoft.com/office/drawing/2014/main" id="{7B50669D-181B-5457-72E4-733900FCAE6C}"/>
             </a:ext>
           </a:extLst>
@@ -12392,7 +13427,7 @@
 </p:sld>
 </file>
 
-<file path=ppt/slides/slide21.xml><?xml version="1.0" encoding="utf-8"?>
+<file path=ppt/slides/slide23.xml><?xml version="1.0" encoding="utf-8"?>
 <p:sld xmlns:a="http://schemas.openxmlformats.org/drawingml/2006/main" xmlns:r="http://schemas.openxmlformats.org/officeDocument/2006/relationships" xmlns:p="http://schemas.openxmlformats.org/presentationml/2006/main">
   <p:cSld>
     <p:spTree>
@@ -12593,7 +13628,7 @@
 </p:sld>
 </file>
 
-<file path=ppt/slides/slide22.xml><?xml version="1.0" encoding="utf-8"?>
+<file path=ppt/slides/slide24.xml><?xml version="1.0" encoding="utf-8"?>
 <p:sld xmlns:a="http://schemas.openxmlformats.org/drawingml/2006/main" xmlns:r="http://schemas.openxmlformats.org/officeDocument/2006/relationships" xmlns:p="http://schemas.openxmlformats.org/presentationml/2006/main">
   <p:cSld>
     <p:spTree>
@@ -12789,7 +13824,7 @@
 </p:sld>
 </file>
 
-<file path=ppt/slides/slide23.xml><?xml version="1.0" encoding="utf-8"?>
+<file path=ppt/slides/slide25.xml><?xml version="1.0" encoding="utf-8"?>
 <p:sld xmlns:a="http://schemas.openxmlformats.org/drawingml/2006/main" xmlns:r="http://schemas.openxmlformats.org/officeDocument/2006/relationships" xmlns:p="http://schemas.openxmlformats.org/presentationml/2006/main">
   <p:cSld>
     <p:spTree>
@@ -13003,7 +14038,7 @@
 </p:sld>
 </file>
 
-<file path=ppt/slides/slide24.xml><?xml version="1.0" encoding="utf-8"?>
+<file path=ppt/slides/slide26.xml><?xml version="1.0" encoding="utf-8"?>
 <p:sld xmlns:a="http://schemas.openxmlformats.org/drawingml/2006/main" xmlns:r="http://schemas.openxmlformats.org/officeDocument/2006/relationships" xmlns:p="http://schemas.openxmlformats.org/presentationml/2006/main">
   <p:cSld>
     <p:spTree>
@@ -13560,7 +14595,7 @@
 </p:sld>
 </file>
 
-<file path=ppt/slides/slide25.xml><?xml version="1.0" encoding="utf-8"?>
+<file path=ppt/slides/slide27.xml><?xml version="1.0" encoding="utf-8"?>
 <p:sld xmlns:a="http://schemas.openxmlformats.org/drawingml/2006/main" xmlns:r="http://schemas.openxmlformats.org/officeDocument/2006/relationships" xmlns:p="http://schemas.openxmlformats.org/presentationml/2006/main">
   <p:cSld>
     <p:spTree>
@@ -14480,7 +15515,7 @@
 </p:sld>
 </file>
 
-<file path=ppt/slides/slide26.xml><?xml version="1.0" encoding="utf-8"?>
+<file path=ppt/slides/slide28.xml><?xml version="1.0" encoding="utf-8"?>
 <p:sld xmlns:a="http://schemas.openxmlformats.org/drawingml/2006/main" xmlns:r="http://schemas.openxmlformats.org/officeDocument/2006/relationships" xmlns:p="http://schemas.openxmlformats.org/presentationml/2006/main">
   <p:cSld>
     <p:spTree>

</xml_diff>

<commit_message>
5.2. und letzte Korrekturen
3.7. angeschaut, alles fertig
</commit_message>
<xml_diff>
--- a/Probeklausur.pptx
+++ b/Probeklausur.pptx
@@ -5,10 +5,10 @@
     <p:sldMasterId id="2147483649" r:id="rId4"/>
   </p:sldMasterIdLst>
   <p:notesMasterIdLst>
-    <p:notesMasterId r:id="rId33"/>
+    <p:notesMasterId r:id="rId34"/>
   </p:notesMasterIdLst>
   <p:handoutMasterIdLst>
-    <p:handoutMasterId r:id="rId34"/>
+    <p:handoutMasterId r:id="rId35"/>
   </p:handoutMasterIdLst>
   <p:sldIdLst>
     <p:sldId id="1041" r:id="rId5"/>
@@ -28,9 +28,9 @@
     <p:sldId id="1067" r:id="rId19"/>
     <p:sldId id="1068" r:id="rId20"/>
     <p:sldId id="1069" r:id="rId21"/>
-    <p:sldId id="1054" r:id="rId22"/>
-    <p:sldId id="1055" r:id="rId23"/>
-    <p:sldId id="1071" r:id="rId24"/>
+    <p:sldId id="1055" r:id="rId22"/>
+    <p:sldId id="1071" r:id="rId23"/>
+    <p:sldId id="1054" r:id="rId24"/>
     <p:sldId id="1070" r:id="rId25"/>
     <p:sldId id="1056" r:id="rId26"/>
     <p:sldId id="1057" r:id="rId27"/>
@@ -39,6 +39,7 @@
     <p:sldId id="1060" r:id="rId30"/>
     <p:sldId id="1061" r:id="rId31"/>
     <p:sldId id="1062" r:id="rId32"/>
+    <p:sldId id="1072" r:id="rId33"/>
   </p:sldIdLst>
   <p:sldSz cx="12192000" cy="6858000"/>
   <p:notesSz cx="6858000" cy="9144000"/>
@@ -189,9 +190,9 @@
             <p14:sldId id="1067"/>
             <p14:sldId id="1068"/>
             <p14:sldId id="1069"/>
-            <p14:sldId id="1054"/>
             <p14:sldId id="1055"/>
             <p14:sldId id="1071"/>
+            <p14:sldId id="1054"/>
             <p14:sldId id="1070"/>
             <p14:sldId id="1056"/>
             <p14:sldId id="1057"/>
@@ -200,6 +201,7 @@
             <p14:sldId id="1060"/>
             <p14:sldId id="1061"/>
             <p14:sldId id="1062"/>
+            <p14:sldId id="1072"/>
           </p14:sldIdLst>
         </p14:section>
         <p14:section name="Standardabschnitt" id="{43259912-C5ED-4E84-8ACD-EEBCC30AE9A6}">
@@ -7048,6 +7050,55 @@
                                         </p:cTn>
                                         <p:tgtEl>
                                           <p:spTgt spid="4"/>
+                                        </p:tgtEl>
+                                        <p:attrNameLst>
+                                          <p:attrName>style.visibility</p:attrName>
+                                        </p:attrNameLst>
+                                      </p:cBhvr>
+                                      <p:to>
+                                        <p:strVal val="visible"/>
+                                      </p:to>
+                                    </p:set>
+                                  </p:childTnLst>
+                                </p:cTn>
+                              </p:par>
+                            </p:childTnLst>
+                          </p:cTn>
+                        </p:par>
+                      </p:childTnLst>
+                    </p:cTn>
+                  </p:par>
+                  <p:par>
+                    <p:cTn id="7" fill="hold">
+                      <p:stCondLst>
+                        <p:cond delay="indefinite"/>
+                      </p:stCondLst>
+                      <p:childTnLst>
+                        <p:par>
+                          <p:cTn id="8" fill="hold">
+                            <p:stCondLst>
+                              <p:cond delay="0"/>
+                            </p:stCondLst>
+                            <p:childTnLst>
+                              <p:par>
+                                <p:cTn id="9" presetID="1" presetClass="entr" presetSubtype="0" fill="hold" nodeType="clickEffect">
+                                  <p:stCondLst>
+                                    <p:cond delay="0"/>
+                                  </p:stCondLst>
+                                  <p:childTnLst>
+                                    <p:set>
+                                      <p:cBhvr>
+                                        <p:cTn id="10" dur="1" fill="hold">
+                                          <p:stCondLst>
+                                            <p:cond delay="0"/>
+                                          </p:stCondLst>
+                                        </p:cTn>
+                                        <p:tgtEl>
+                                          <p:spTgt spid="6">
+                                            <p:txEl>
+                                              <p:pRg st="7" end="7"/>
+                                            </p:txEl>
+                                          </p:spTgt>
                                         </p:tgtEl>
                                         <p:attrNameLst>
                                           <p:attrName>style.visibility</p:attrName>
@@ -10251,6 +10302,55 @@
                       </p:childTnLst>
                     </p:cTn>
                   </p:par>
+                  <p:par>
+                    <p:cTn id="7" fill="hold">
+                      <p:stCondLst>
+                        <p:cond delay="indefinite"/>
+                      </p:stCondLst>
+                      <p:childTnLst>
+                        <p:par>
+                          <p:cTn id="8" fill="hold">
+                            <p:stCondLst>
+                              <p:cond delay="0"/>
+                            </p:stCondLst>
+                            <p:childTnLst>
+                              <p:par>
+                                <p:cTn id="9" presetID="1" presetClass="entr" presetSubtype="0" fill="hold" nodeType="clickEffect">
+                                  <p:stCondLst>
+                                    <p:cond delay="0"/>
+                                  </p:stCondLst>
+                                  <p:childTnLst>
+                                    <p:set>
+                                      <p:cBhvr>
+                                        <p:cTn id="10" dur="1" fill="hold">
+                                          <p:stCondLst>
+                                            <p:cond delay="0"/>
+                                          </p:stCondLst>
+                                        </p:cTn>
+                                        <p:tgtEl>
+                                          <p:spTgt spid="6">
+                                            <p:txEl>
+                                              <p:pRg st="10" end="10"/>
+                                            </p:txEl>
+                                          </p:spTgt>
+                                        </p:tgtEl>
+                                        <p:attrNameLst>
+                                          <p:attrName>style.visibility</p:attrName>
+                                        </p:attrNameLst>
+                                      </p:cBhvr>
+                                      <p:to>
+                                        <p:strVal val="visible"/>
+                                      </p:to>
+                                    </p:set>
+                                  </p:childTnLst>
+                                </p:cTn>
+                              </p:par>
+                            </p:childTnLst>
+                          </p:cTn>
+                        </p:par>
+                      </p:childTnLst>
+                    </p:cTn>
+                  </p:par>
                 </p:childTnLst>
               </p:cTn>
               <p:prevCondLst>
@@ -11157,216 +11257,134 @@
   <p:clrMapOvr>
     <a:masterClrMapping/>
   </p:clrMapOvr>
+  <p:timing>
+    <p:tnLst>
+      <p:par>
+        <p:cTn id="1" dur="indefinite" restart="never" nodeType="tmRoot">
+          <p:childTnLst>
+            <p:seq concurrent="1" nextAc="seek">
+              <p:cTn id="2" dur="indefinite" nodeType="mainSeq">
+                <p:childTnLst>
+                  <p:par>
+                    <p:cTn id="3" fill="hold">
+                      <p:stCondLst>
+                        <p:cond delay="indefinite"/>
+                      </p:stCondLst>
+                      <p:childTnLst>
+                        <p:par>
+                          <p:cTn id="4" fill="hold">
+                            <p:stCondLst>
+                              <p:cond delay="0"/>
+                            </p:stCondLst>
+                            <p:childTnLst>
+                              <p:par>
+                                <p:cTn id="5" presetID="1" presetClass="entr" presetSubtype="0" fill="hold" nodeType="clickEffect">
+                                  <p:stCondLst>
+                                    <p:cond delay="0"/>
+                                  </p:stCondLst>
+                                  <p:childTnLst>
+                                    <p:set>
+                                      <p:cBhvr>
+                                        <p:cTn id="6" dur="1" fill="hold">
+                                          <p:stCondLst>
+                                            <p:cond delay="0"/>
+                                          </p:stCondLst>
+                                        </p:cTn>
+                                        <p:tgtEl>
+                                          <p:spTgt spid="7"/>
+                                        </p:tgtEl>
+                                        <p:attrNameLst>
+                                          <p:attrName>style.visibility</p:attrName>
+                                        </p:attrNameLst>
+                                      </p:cBhvr>
+                                      <p:to>
+                                        <p:strVal val="visible"/>
+                                      </p:to>
+                                    </p:set>
+                                  </p:childTnLst>
+                                </p:cTn>
+                              </p:par>
+                            </p:childTnLst>
+                          </p:cTn>
+                        </p:par>
+                      </p:childTnLst>
+                    </p:cTn>
+                  </p:par>
+                  <p:par>
+                    <p:cTn id="7" fill="hold">
+                      <p:stCondLst>
+                        <p:cond delay="indefinite"/>
+                      </p:stCondLst>
+                      <p:childTnLst>
+                        <p:par>
+                          <p:cTn id="8" fill="hold">
+                            <p:stCondLst>
+                              <p:cond delay="0"/>
+                            </p:stCondLst>
+                            <p:childTnLst>
+                              <p:par>
+                                <p:cTn id="9" presetID="1" presetClass="entr" presetSubtype="0" fill="hold" nodeType="clickEffect">
+                                  <p:stCondLst>
+                                    <p:cond delay="0"/>
+                                  </p:stCondLst>
+                                  <p:childTnLst>
+                                    <p:set>
+                                      <p:cBhvr>
+                                        <p:cTn id="10" dur="1" fill="hold">
+                                          <p:stCondLst>
+                                            <p:cond delay="0"/>
+                                          </p:stCondLst>
+                                        </p:cTn>
+                                        <p:tgtEl>
+                                          <p:spTgt spid="6">
+                                            <p:txEl>
+                                              <p:pRg st="10" end="10"/>
+                                            </p:txEl>
+                                          </p:spTgt>
+                                        </p:tgtEl>
+                                        <p:attrNameLst>
+                                          <p:attrName>style.visibility</p:attrName>
+                                        </p:attrNameLst>
+                                      </p:cBhvr>
+                                      <p:to>
+                                        <p:strVal val="visible"/>
+                                      </p:to>
+                                    </p:set>
+                                  </p:childTnLst>
+                                </p:cTn>
+                              </p:par>
+                            </p:childTnLst>
+                          </p:cTn>
+                        </p:par>
+                      </p:childTnLst>
+                    </p:cTn>
+                  </p:par>
+                </p:childTnLst>
+              </p:cTn>
+              <p:prevCondLst>
+                <p:cond evt="onPrev" delay="0">
+                  <p:tgtEl>
+                    <p:sldTgt/>
+                  </p:tgtEl>
+                </p:cond>
+              </p:prevCondLst>
+              <p:nextCondLst>
+                <p:cond evt="onNext" delay="0">
+                  <p:tgtEl>
+                    <p:sldTgt/>
+                  </p:tgtEl>
+                </p:cond>
+              </p:nextCondLst>
+            </p:seq>
+          </p:childTnLst>
+        </p:cTn>
+      </p:par>
+    </p:tnLst>
+  </p:timing>
 </p:sld>
 </file>
 
 <file path=ppt/slides/slide18.xml><?xml version="1.0" encoding="utf-8"?>
-<p:sld xmlns:a="http://schemas.openxmlformats.org/drawingml/2006/main" xmlns:r="http://schemas.openxmlformats.org/officeDocument/2006/relationships" xmlns:p="http://schemas.openxmlformats.org/presentationml/2006/main">
-  <p:cSld>
-    <p:spTree>
-      <p:nvGrpSpPr>
-        <p:cNvPr id="1" name="">
-          <a:extLst>
-            <a:ext uri="{FF2B5EF4-FFF2-40B4-BE49-F238E27FC236}">
-              <a16:creationId xmlns:a16="http://schemas.microsoft.com/office/drawing/2014/main" id="{040F9FFB-6560-8F1E-6F4C-64511D3A3568}"/>
-            </a:ext>
-          </a:extLst>
-        </p:cNvPr>
-        <p:cNvGrpSpPr/>
-        <p:nvPr/>
-      </p:nvGrpSpPr>
-      <p:grpSpPr>
-        <a:xfrm>
-          <a:off x="0" y="0"/>
-          <a:ext cx="0" cy="0"/>
-          <a:chOff x="0" y="0"/>
-          <a:chExt cx="0" cy="0"/>
-        </a:xfrm>
-      </p:grpSpPr>
-      <p:sp>
-        <p:nvSpPr>
-          <p:cNvPr id="2" name="Titel 1">
-            <a:extLst>
-              <a:ext uri="{FF2B5EF4-FFF2-40B4-BE49-F238E27FC236}">
-                <a16:creationId xmlns:a16="http://schemas.microsoft.com/office/drawing/2014/main" id="{51F37715-0D59-D06B-AB2C-486BD68DCC6C}"/>
-              </a:ext>
-            </a:extLst>
-          </p:cNvPr>
-          <p:cNvSpPr>
-            <a:spLocks noGrp="1"/>
-          </p:cNvSpPr>
-          <p:nvPr>
-            <p:ph type="title"/>
-          </p:nvPr>
-        </p:nvSpPr>
-        <p:spPr/>
-        <p:txBody>
-          <a:bodyPr/>
-          <a:lstStyle/>
-          <a:p>
-            <a:r>
-              <a:rPr lang="de-DE" dirty="0"/>
-              <a:t>Aufgabe 4.1</a:t>
-            </a:r>
-          </a:p>
-        </p:txBody>
-      </p:sp>
-      <p:sp>
-        <p:nvSpPr>
-          <p:cNvPr id="6" name="Content Placeholder 5">
-            <a:extLst>
-              <a:ext uri="{FF2B5EF4-FFF2-40B4-BE49-F238E27FC236}">
-                <a16:creationId xmlns:a16="http://schemas.microsoft.com/office/drawing/2014/main" id="{2D5A77A4-8F6D-081F-9391-029226F59D56}"/>
-              </a:ext>
-            </a:extLst>
-          </p:cNvPr>
-          <p:cNvSpPr>
-            <a:spLocks noGrp="1"/>
-          </p:cNvSpPr>
-          <p:nvPr>
-            <p:ph idx="1"/>
-          </p:nvPr>
-        </p:nvSpPr>
-        <p:spPr/>
-        <p:txBody>
-          <a:bodyPr/>
-          <a:lstStyle/>
-          <a:p>
-            <a:pPr marL="0" indent="0">
-              <a:buNone/>
-            </a:pPr>
-            <a:r>
-              <a:rPr lang="en-GB" dirty="0">
-                <a:cs typeface="Arial"/>
-              </a:rPr>
-              <a:t>a)</a:t>
-            </a:r>
-          </a:p>
-          <a:p>
-            <a:pPr marL="0" indent="0">
-              <a:buNone/>
-            </a:pPr>
-            <a:endParaRPr lang="en-GB" dirty="0">
-              <a:cs typeface="Arial"/>
-            </a:endParaRPr>
-          </a:p>
-          <a:p>
-            <a:pPr marL="0" indent="0">
-              <a:buNone/>
-            </a:pPr>
-            <a:r>
-              <a:rPr lang="en-GB" dirty="0">
-                <a:cs typeface="Arial"/>
-              </a:rPr>
-              <a:t>b)</a:t>
-            </a:r>
-          </a:p>
-        </p:txBody>
-      </p:sp>
-      <p:pic>
-        <p:nvPicPr>
-          <p:cNvPr id="7" name="Picture 6">
-            <a:extLst>
-              <a:ext uri="{FF2B5EF4-FFF2-40B4-BE49-F238E27FC236}">
-                <a16:creationId xmlns:a16="http://schemas.microsoft.com/office/drawing/2014/main" id="{93AA5F5E-AA0F-BC6B-91AD-E52B0DB9A771}"/>
-              </a:ext>
-            </a:extLst>
-          </p:cNvPr>
-          <p:cNvPicPr>
-            <a:picLocks noChangeAspect="1"/>
-          </p:cNvPicPr>
-          <p:nvPr/>
-        </p:nvPicPr>
-        <p:blipFill>
-          <a:blip r:embed="rId2"/>
-          <a:stretch>
-            <a:fillRect/>
-          </a:stretch>
-        </p:blipFill>
-        <p:spPr>
-          <a:xfrm>
-            <a:off x="1173655" y="1716963"/>
-            <a:ext cx="6779172" cy="481176"/>
-          </a:xfrm>
-          <a:prstGeom prst="rect">
-            <a:avLst/>
-          </a:prstGeom>
-        </p:spPr>
-      </p:pic>
-      <p:pic>
-        <p:nvPicPr>
-          <p:cNvPr id="8" name="Picture 7" descr="A math equations with numbers and symbols&#10;&#10;AI-generated content may be incorrect.">
-            <a:extLst>
-              <a:ext uri="{FF2B5EF4-FFF2-40B4-BE49-F238E27FC236}">
-                <a16:creationId xmlns:a16="http://schemas.microsoft.com/office/drawing/2014/main" id="{B5197F23-D08C-F676-62EA-8F638688223F}"/>
-              </a:ext>
-            </a:extLst>
-          </p:cNvPr>
-          <p:cNvPicPr>
-            <a:picLocks noChangeAspect="1"/>
-          </p:cNvPicPr>
-          <p:nvPr/>
-        </p:nvPicPr>
-        <p:blipFill>
-          <a:blip r:embed="rId3"/>
-          <a:stretch>
-            <a:fillRect/>
-          </a:stretch>
-        </p:blipFill>
-        <p:spPr>
-          <a:xfrm>
-            <a:off x="1176064" y="2387271"/>
-            <a:ext cx="2815458" cy="2626491"/>
-          </a:xfrm>
-          <a:prstGeom prst="rect">
-            <a:avLst/>
-          </a:prstGeom>
-        </p:spPr>
-      </p:pic>
-      <p:pic>
-        <p:nvPicPr>
-          <p:cNvPr id="10" name="Picture 9">
-            <a:extLst>
-              <a:ext uri="{FF2B5EF4-FFF2-40B4-BE49-F238E27FC236}">
-                <a16:creationId xmlns:a16="http://schemas.microsoft.com/office/drawing/2014/main" id="{3F24FBF2-AFBB-CDCD-D989-844E3645298C}"/>
-              </a:ext>
-            </a:extLst>
-          </p:cNvPr>
-          <p:cNvPicPr>
-            <a:picLocks noChangeAspect="1"/>
-          </p:cNvPicPr>
-          <p:nvPr/>
-        </p:nvPicPr>
-        <p:blipFill>
-          <a:blip r:embed="rId4"/>
-          <a:stretch>
-            <a:fillRect/>
-          </a:stretch>
-        </p:blipFill>
-        <p:spPr>
-          <a:xfrm>
-            <a:off x="1166813" y="5102171"/>
-            <a:ext cx="3762375" cy="1190625"/>
-          </a:xfrm>
-          <a:prstGeom prst="rect">
-            <a:avLst/>
-          </a:prstGeom>
-        </p:spPr>
-      </p:pic>
-    </p:spTree>
-    <p:extLst>
-      <p:ext uri="{BB962C8B-B14F-4D97-AF65-F5344CB8AC3E}">
-        <p14:creationId xmlns:p14="http://schemas.microsoft.com/office/powerpoint/2010/main" val="3021401086"/>
-      </p:ext>
-    </p:extLst>
-  </p:cSld>
-  <p:clrMapOvr>
-    <a:masterClrMapping/>
-  </p:clrMapOvr>
-</p:sld>
-</file>
-
-<file path=ppt/slides/slide19.xml><?xml version="1.0" encoding="utf-8"?>
 <p:sld xmlns:a="http://schemas.openxmlformats.org/drawingml/2006/main" xmlns:r="http://schemas.openxmlformats.org/officeDocument/2006/relationships" xmlns:p="http://schemas.openxmlformats.org/presentationml/2006/main">
   <p:cSld>
     <p:spTree>
@@ -11876,6 +11894,518 @@
     <p:extLst>
       <p:ext uri="{BB962C8B-B14F-4D97-AF65-F5344CB8AC3E}">
         <p14:creationId xmlns:p14="http://schemas.microsoft.com/office/powerpoint/2010/main" val="2904793170"/>
+      </p:ext>
+    </p:extLst>
+  </p:cSld>
+  <p:clrMapOvr>
+    <a:masterClrMapping/>
+  </p:clrMapOvr>
+</p:sld>
+</file>
+
+<file path=ppt/slides/slide19.xml><?xml version="1.0" encoding="utf-8"?>
+<p:sld xmlns:a="http://schemas.openxmlformats.org/drawingml/2006/main" xmlns:r="http://schemas.openxmlformats.org/officeDocument/2006/relationships" xmlns:p="http://schemas.openxmlformats.org/presentationml/2006/main">
+  <p:cSld>
+    <p:spTree>
+      <p:nvGrpSpPr>
+        <p:cNvPr id="1" name="">
+          <a:extLst>
+            <a:ext uri="{FF2B5EF4-FFF2-40B4-BE49-F238E27FC236}">
+              <a16:creationId xmlns:a16="http://schemas.microsoft.com/office/drawing/2014/main" id="{0FB9D3CC-2816-9E0B-FCD9-13464E2555FB}"/>
+            </a:ext>
+          </a:extLst>
+        </p:cNvPr>
+        <p:cNvGrpSpPr/>
+        <p:nvPr/>
+      </p:nvGrpSpPr>
+      <p:grpSpPr>
+        <a:xfrm>
+          <a:off x="0" y="0"/>
+          <a:ext cx="0" cy="0"/>
+          <a:chOff x="0" y="0"/>
+          <a:chExt cx="0" cy="0"/>
+        </a:xfrm>
+      </p:grpSpPr>
+      <p:sp>
+        <p:nvSpPr>
+          <p:cNvPr id="2" name="Titel 1">
+            <a:extLst>
+              <a:ext uri="{FF2B5EF4-FFF2-40B4-BE49-F238E27FC236}">
+                <a16:creationId xmlns:a16="http://schemas.microsoft.com/office/drawing/2014/main" id="{3C0705A3-AB8C-DE02-3D93-D0D2B659198E}"/>
+              </a:ext>
+            </a:extLst>
+          </p:cNvPr>
+          <p:cNvSpPr>
+            <a:spLocks noGrp="1"/>
+          </p:cNvSpPr>
+          <p:nvPr>
+            <p:ph type="title"/>
+          </p:nvPr>
+        </p:nvSpPr>
+        <p:spPr/>
+        <p:txBody>
+          <a:bodyPr/>
+          <a:lstStyle/>
+          <a:p>
+            <a:r>
+              <a:rPr lang="de-DE" dirty="0"/>
+              <a:t>Aufgabe 3.7</a:t>
+            </a:r>
+          </a:p>
+        </p:txBody>
+      </p:sp>
+      <p:sp>
+        <p:nvSpPr>
+          <p:cNvPr id="6" name="Content Placeholder 5">
+            <a:extLst>
+              <a:ext uri="{FF2B5EF4-FFF2-40B4-BE49-F238E27FC236}">
+                <a16:creationId xmlns:a16="http://schemas.microsoft.com/office/drawing/2014/main" id="{4CB9FE27-A2D3-0528-14C1-92B7960713ED}"/>
+              </a:ext>
+            </a:extLst>
+          </p:cNvPr>
+          <p:cNvSpPr>
+            <a:spLocks noGrp="1"/>
+          </p:cNvSpPr>
+          <p:nvPr>
+            <p:ph idx="1"/>
+          </p:nvPr>
+        </p:nvSpPr>
+        <p:spPr/>
+        <p:txBody>
+          <a:bodyPr/>
+          <a:lstStyle/>
+          <a:p>
+            <a:pPr marL="0" indent="0">
+              <a:buNone/>
+            </a:pPr>
+            <a:r>
+              <a:rPr lang="en-GB" dirty="0">
+                <a:cs typeface="Arial"/>
+              </a:rPr>
+              <a:t>b)</a:t>
+            </a:r>
+          </a:p>
+          <a:p>
+            <a:pPr marL="0" indent="0">
+              <a:buNone/>
+            </a:pPr>
+            <a:endParaRPr lang="en-GB" dirty="0">
+              <a:cs typeface="Arial"/>
+            </a:endParaRPr>
+          </a:p>
+          <a:p>
+            <a:pPr marL="0" indent="0">
+              <a:buNone/>
+            </a:pPr>
+            <a:endParaRPr lang="en-GB" dirty="0">
+              <a:cs typeface="Arial"/>
+            </a:endParaRPr>
+          </a:p>
+        </p:txBody>
+      </p:sp>
+      <p:pic>
+        <p:nvPicPr>
+          <p:cNvPr id="15" name="Picture 14" descr="A white rectangular object with black text&#10;&#10;AI-generated content may be incorrect.">
+            <a:extLst>
+              <a:ext uri="{FF2B5EF4-FFF2-40B4-BE49-F238E27FC236}">
+                <a16:creationId xmlns:a16="http://schemas.microsoft.com/office/drawing/2014/main" id="{2CE87F01-6937-0C21-D3DD-8C0FA667E9EE}"/>
+              </a:ext>
+            </a:extLst>
+          </p:cNvPr>
+          <p:cNvPicPr>
+            <a:picLocks noChangeAspect="1"/>
+          </p:cNvPicPr>
+          <p:nvPr/>
+        </p:nvPicPr>
+        <p:blipFill>
+          <a:blip r:embed="rId2"/>
+          <a:srcRect t="88" b="1647"/>
+          <a:stretch>
+            <a:fillRect/>
+          </a:stretch>
+        </p:blipFill>
+        <p:spPr>
+          <a:xfrm>
+            <a:off x="1043828" y="1859705"/>
+            <a:ext cx="10668000" cy="3803649"/>
+          </a:xfrm>
+          <a:prstGeom prst="rect">
+            <a:avLst/>
+          </a:prstGeom>
+        </p:spPr>
+      </p:pic>
+      <p:sp>
+        <p:nvSpPr>
+          <p:cNvPr id="17" name="TextBox 16">
+            <a:extLst>
+              <a:ext uri="{FF2B5EF4-FFF2-40B4-BE49-F238E27FC236}">
+                <a16:creationId xmlns:a16="http://schemas.microsoft.com/office/drawing/2014/main" id="{6D05524C-1A62-8431-AB7E-AE594531D225}"/>
+              </a:ext>
+            </a:extLst>
+          </p:cNvPr>
+          <p:cNvSpPr txBox="1"/>
+          <p:nvPr/>
+        </p:nvSpPr>
+        <p:spPr>
+          <a:xfrm>
+            <a:off x="4147594" y="3173392"/>
+            <a:ext cx="511215" cy="707886"/>
+          </a:xfrm>
+          <a:prstGeom prst="rect">
+            <a:avLst/>
+          </a:prstGeom>
+          <a:noFill/>
+        </p:spPr>
+        <p:txBody>
+          <a:bodyPr rot="0" spcFirstLastPara="0" vertOverflow="overflow" horzOverflow="overflow" vert="horz" wrap="square" lIns="91440" tIns="45720" rIns="91440" bIns="45720" numCol="1" spcCol="0" rtlCol="0" fromWordArt="0" anchor="t" anchorCtr="0" forceAA="0" compatLnSpc="1">
+            <a:prstTxWarp prst="textNoShape">
+              <a:avLst/>
+            </a:prstTxWarp>
+            <a:spAutoFit/>
+          </a:bodyPr>
+          <a:lstStyle/>
+          <a:p>
+            <a:pPr algn="l"/>
+            <a:r>
+              <a:rPr lang="en-GB" sz="4000" dirty="0">
+                <a:latin typeface="Arial"/>
+                <a:cs typeface="Arial"/>
+              </a:rPr>
+              <a:t>X</a:t>
+            </a:r>
+            <a:endParaRPr lang="en-GB" sz="4400" dirty="0">
+              <a:latin typeface="Arial"/>
+              <a:cs typeface="Arial"/>
+            </a:endParaRPr>
+          </a:p>
+        </p:txBody>
+      </p:sp>
+      <p:sp>
+        <p:nvSpPr>
+          <p:cNvPr id="18" name="TextBox 17">
+            <a:extLst>
+              <a:ext uri="{FF2B5EF4-FFF2-40B4-BE49-F238E27FC236}">
+                <a16:creationId xmlns:a16="http://schemas.microsoft.com/office/drawing/2014/main" id="{02F7A1D5-16DC-B37C-C635-7C82D37D665C}"/>
+              </a:ext>
+            </a:extLst>
+          </p:cNvPr>
+          <p:cNvSpPr txBox="1"/>
+          <p:nvPr/>
+        </p:nvSpPr>
+        <p:spPr>
+          <a:xfrm>
+            <a:off x="8931796" y="3173391"/>
+            <a:ext cx="511215" cy="707886"/>
+          </a:xfrm>
+          <a:prstGeom prst="rect">
+            <a:avLst/>
+          </a:prstGeom>
+          <a:noFill/>
+        </p:spPr>
+        <p:txBody>
+          <a:bodyPr rot="0" spcFirstLastPara="0" vertOverflow="overflow" horzOverflow="overflow" vert="horz" wrap="square" lIns="91440" tIns="45720" rIns="91440" bIns="45720" numCol="1" spcCol="0" rtlCol="0" fromWordArt="0" anchor="t" anchorCtr="0" forceAA="0" compatLnSpc="1">
+            <a:prstTxWarp prst="textNoShape">
+              <a:avLst/>
+            </a:prstTxWarp>
+            <a:spAutoFit/>
+          </a:bodyPr>
+          <a:lstStyle/>
+          <a:p>
+            <a:pPr algn="l"/>
+            <a:r>
+              <a:rPr lang="en-GB" sz="4000" dirty="0">
+                <a:latin typeface="Arial"/>
+                <a:cs typeface="Arial"/>
+              </a:rPr>
+              <a:t>X</a:t>
+            </a:r>
+            <a:endParaRPr lang="en-GB" sz="4400" dirty="0">
+              <a:latin typeface="Arial"/>
+              <a:cs typeface="Arial"/>
+            </a:endParaRPr>
+          </a:p>
+        </p:txBody>
+      </p:sp>
+      <p:sp>
+        <p:nvSpPr>
+          <p:cNvPr id="20" name="TextBox 19">
+            <a:extLst>
+              <a:ext uri="{FF2B5EF4-FFF2-40B4-BE49-F238E27FC236}">
+                <a16:creationId xmlns:a16="http://schemas.microsoft.com/office/drawing/2014/main" id="{7EDE88BE-38A8-CB65-F954-E576AA464FE0}"/>
+              </a:ext>
+            </a:extLst>
+          </p:cNvPr>
+          <p:cNvSpPr txBox="1"/>
+          <p:nvPr/>
+        </p:nvSpPr>
+        <p:spPr>
+          <a:xfrm>
+            <a:off x="10012099" y="3173390"/>
+            <a:ext cx="511215" cy="707886"/>
+          </a:xfrm>
+          <a:prstGeom prst="rect">
+            <a:avLst/>
+          </a:prstGeom>
+          <a:noFill/>
+        </p:spPr>
+        <p:txBody>
+          <a:bodyPr rot="0" spcFirstLastPara="0" vertOverflow="overflow" horzOverflow="overflow" vert="horz" wrap="square" lIns="91440" tIns="45720" rIns="91440" bIns="45720" numCol="1" spcCol="0" rtlCol="0" fromWordArt="0" anchor="t" anchorCtr="0" forceAA="0" compatLnSpc="1">
+            <a:prstTxWarp prst="textNoShape">
+              <a:avLst/>
+            </a:prstTxWarp>
+            <a:spAutoFit/>
+          </a:bodyPr>
+          <a:lstStyle/>
+          <a:p>
+            <a:pPr algn="l"/>
+            <a:r>
+              <a:rPr lang="en-GB" sz="4000" dirty="0">
+                <a:latin typeface="Arial"/>
+                <a:cs typeface="Arial"/>
+              </a:rPr>
+              <a:t>X</a:t>
+            </a:r>
+            <a:endParaRPr lang="en-GB" sz="4400" dirty="0">
+              <a:latin typeface="Arial"/>
+              <a:cs typeface="Arial"/>
+            </a:endParaRPr>
+          </a:p>
+        </p:txBody>
+      </p:sp>
+      <p:sp>
+        <p:nvSpPr>
+          <p:cNvPr id="21" name="TextBox 20">
+            <a:extLst>
+              <a:ext uri="{FF2B5EF4-FFF2-40B4-BE49-F238E27FC236}">
+                <a16:creationId xmlns:a16="http://schemas.microsoft.com/office/drawing/2014/main" id="{92091E4F-EC43-08E3-6828-C6A45FBBCFFF}"/>
+              </a:ext>
+            </a:extLst>
+          </p:cNvPr>
+          <p:cNvSpPr txBox="1"/>
+          <p:nvPr/>
+        </p:nvSpPr>
+        <p:spPr>
+          <a:xfrm>
+            <a:off x="10880200" y="4764909"/>
+            <a:ext cx="511215" cy="707886"/>
+          </a:xfrm>
+          <a:prstGeom prst="rect">
+            <a:avLst/>
+          </a:prstGeom>
+          <a:noFill/>
+        </p:spPr>
+        <p:txBody>
+          <a:bodyPr rot="0" spcFirstLastPara="0" vertOverflow="overflow" horzOverflow="overflow" vert="horz" wrap="square" lIns="91440" tIns="45720" rIns="91440" bIns="45720" numCol="1" spcCol="0" rtlCol="0" fromWordArt="0" anchor="t" anchorCtr="0" forceAA="0" compatLnSpc="1">
+            <a:prstTxWarp prst="textNoShape">
+              <a:avLst/>
+            </a:prstTxWarp>
+            <a:spAutoFit/>
+          </a:bodyPr>
+          <a:lstStyle/>
+          <a:p>
+            <a:pPr algn="l"/>
+            <a:r>
+              <a:rPr lang="en-GB" sz="4000" dirty="0">
+                <a:latin typeface="Arial"/>
+                <a:cs typeface="Arial"/>
+              </a:rPr>
+              <a:t>X</a:t>
+            </a:r>
+            <a:endParaRPr lang="en-GB" sz="4400" dirty="0">
+              <a:latin typeface="Arial"/>
+              <a:cs typeface="Arial"/>
+            </a:endParaRPr>
+          </a:p>
+        </p:txBody>
+      </p:sp>
+      <p:sp>
+        <p:nvSpPr>
+          <p:cNvPr id="22" name="TextBox 21">
+            <a:extLst>
+              <a:ext uri="{FF2B5EF4-FFF2-40B4-BE49-F238E27FC236}">
+                <a16:creationId xmlns:a16="http://schemas.microsoft.com/office/drawing/2014/main" id="{06983CBF-02FE-1936-B604-59FC5A24ECFF}"/>
+              </a:ext>
+            </a:extLst>
+          </p:cNvPr>
+          <p:cNvSpPr txBox="1"/>
+          <p:nvPr/>
+        </p:nvSpPr>
+        <p:spPr>
+          <a:xfrm>
+            <a:off x="4147592" y="3945035"/>
+            <a:ext cx="511215" cy="707886"/>
+          </a:xfrm>
+          <a:prstGeom prst="rect">
+            <a:avLst/>
+          </a:prstGeom>
+          <a:noFill/>
+        </p:spPr>
+        <p:txBody>
+          <a:bodyPr rot="0" spcFirstLastPara="0" vertOverflow="overflow" horzOverflow="overflow" vert="horz" wrap="square" lIns="91440" tIns="45720" rIns="91440" bIns="45720" numCol="1" spcCol="0" rtlCol="0" fromWordArt="0" anchor="t" anchorCtr="0" forceAA="0" compatLnSpc="1">
+            <a:prstTxWarp prst="textNoShape">
+              <a:avLst/>
+            </a:prstTxWarp>
+            <a:spAutoFit/>
+          </a:bodyPr>
+          <a:lstStyle/>
+          <a:p>
+            <a:pPr algn="l"/>
+            <a:r>
+              <a:rPr lang="en-GB" sz="4000" dirty="0">
+                <a:latin typeface="Arial"/>
+                <a:cs typeface="Arial"/>
+              </a:rPr>
+              <a:t>X</a:t>
+            </a:r>
+            <a:endParaRPr lang="en-GB" sz="4400" dirty="0">
+              <a:latin typeface="Arial"/>
+              <a:cs typeface="Arial"/>
+            </a:endParaRPr>
+          </a:p>
+        </p:txBody>
+      </p:sp>
+      <p:sp>
+        <p:nvSpPr>
+          <p:cNvPr id="23" name="TextBox 22">
+            <a:extLst>
+              <a:ext uri="{FF2B5EF4-FFF2-40B4-BE49-F238E27FC236}">
+                <a16:creationId xmlns:a16="http://schemas.microsoft.com/office/drawing/2014/main" id="{0E9AA9DA-ED4D-94F3-AC40-D0FBD476C025}"/>
+              </a:ext>
+            </a:extLst>
+          </p:cNvPr>
+          <p:cNvSpPr txBox="1"/>
+          <p:nvPr/>
+        </p:nvSpPr>
+        <p:spPr>
+          <a:xfrm>
+            <a:off x="7890073" y="3945035"/>
+            <a:ext cx="511215" cy="707886"/>
+          </a:xfrm>
+          <a:prstGeom prst="rect">
+            <a:avLst/>
+          </a:prstGeom>
+          <a:noFill/>
+        </p:spPr>
+        <p:txBody>
+          <a:bodyPr rot="0" spcFirstLastPara="0" vertOverflow="overflow" horzOverflow="overflow" vert="horz" wrap="square" lIns="91440" tIns="45720" rIns="91440" bIns="45720" numCol="1" spcCol="0" rtlCol="0" fromWordArt="0" anchor="t" anchorCtr="0" forceAA="0" compatLnSpc="1">
+            <a:prstTxWarp prst="textNoShape">
+              <a:avLst/>
+            </a:prstTxWarp>
+            <a:spAutoFit/>
+          </a:bodyPr>
+          <a:lstStyle/>
+          <a:p>
+            <a:pPr algn="l"/>
+            <a:r>
+              <a:rPr lang="en-GB" sz="4000" dirty="0">
+                <a:latin typeface="Arial"/>
+                <a:cs typeface="Arial"/>
+              </a:rPr>
+              <a:t>X</a:t>
+            </a:r>
+            <a:endParaRPr lang="en-GB" sz="4400" dirty="0">
+              <a:latin typeface="Arial"/>
+              <a:cs typeface="Arial"/>
+            </a:endParaRPr>
+          </a:p>
+        </p:txBody>
+      </p:sp>
+      <p:sp>
+        <p:nvSpPr>
+          <p:cNvPr id="24" name="TextBox 23">
+            <a:extLst>
+              <a:ext uri="{FF2B5EF4-FFF2-40B4-BE49-F238E27FC236}">
+                <a16:creationId xmlns:a16="http://schemas.microsoft.com/office/drawing/2014/main" id="{6FEBD727-531B-A642-5EE3-DB9BEFA66D4C}"/>
+              </a:ext>
+            </a:extLst>
+          </p:cNvPr>
+          <p:cNvSpPr txBox="1"/>
+          <p:nvPr/>
+        </p:nvSpPr>
+        <p:spPr>
+          <a:xfrm>
+            <a:off x="10880199" y="3945035"/>
+            <a:ext cx="511215" cy="707886"/>
+          </a:xfrm>
+          <a:prstGeom prst="rect">
+            <a:avLst/>
+          </a:prstGeom>
+          <a:noFill/>
+        </p:spPr>
+        <p:txBody>
+          <a:bodyPr rot="0" spcFirstLastPara="0" vertOverflow="overflow" horzOverflow="overflow" vert="horz" wrap="square" lIns="91440" tIns="45720" rIns="91440" bIns="45720" numCol="1" spcCol="0" rtlCol="0" fromWordArt="0" anchor="t" anchorCtr="0" forceAA="0" compatLnSpc="1">
+            <a:prstTxWarp prst="textNoShape">
+              <a:avLst/>
+            </a:prstTxWarp>
+            <a:spAutoFit/>
+          </a:bodyPr>
+          <a:lstStyle/>
+          <a:p>
+            <a:pPr algn="l"/>
+            <a:r>
+              <a:rPr lang="en-GB" sz="4000" dirty="0">
+                <a:latin typeface="Arial"/>
+                <a:cs typeface="Arial"/>
+              </a:rPr>
+              <a:t>X</a:t>
+            </a:r>
+            <a:endParaRPr lang="en-GB" sz="4400" dirty="0">
+              <a:latin typeface="Arial"/>
+              <a:cs typeface="Arial"/>
+            </a:endParaRPr>
+          </a:p>
+        </p:txBody>
+      </p:sp>
+      <p:sp>
+        <p:nvSpPr>
+          <p:cNvPr id="25" name="TextBox 24">
+            <a:extLst>
+              <a:ext uri="{FF2B5EF4-FFF2-40B4-BE49-F238E27FC236}">
+                <a16:creationId xmlns:a16="http://schemas.microsoft.com/office/drawing/2014/main" id="{F95C9599-A282-1268-36BB-4F413CB96FF3}"/>
+              </a:ext>
+            </a:extLst>
+          </p:cNvPr>
+          <p:cNvSpPr txBox="1"/>
+          <p:nvPr/>
+        </p:nvSpPr>
+        <p:spPr>
+          <a:xfrm>
+            <a:off x="3202326" y="4764908"/>
+            <a:ext cx="511215" cy="707886"/>
+          </a:xfrm>
+          <a:prstGeom prst="rect">
+            <a:avLst/>
+          </a:prstGeom>
+          <a:noFill/>
+        </p:spPr>
+        <p:txBody>
+          <a:bodyPr rot="0" spcFirstLastPara="0" vertOverflow="overflow" horzOverflow="overflow" vert="horz" wrap="square" lIns="91440" tIns="45720" rIns="91440" bIns="45720" numCol="1" spcCol="0" rtlCol="0" fromWordArt="0" anchor="t" anchorCtr="0" forceAA="0" compatLnSpc="1">
+            <a:prstTxWarp prst="textNoShape">
+              <a:avLst/>
+            </a:prstTxWarp>
+            <a:spAutoFit/>
+          </a:bodyPr>
+          <a:lstStyle/>
+          <a:p>
+            <a:pPr algn="l"/>
+            <a:r>
+              <a:rPr lang="en-GB" sz="4000" dirty="0">
+                <a:latin typeface="Arial"/>
+                <a:cs typeface="Arial"/>
+              </a:rPr>
+              <a:t>X</a:t>
+            </a:r>
+            <a:endParaRPr lang="en-GB" sz="4400" dirty="0">
+              <a:latin typeface="Arial"/>
+              <a:cs typeface="Arial"/>
+            </a:endParaRPr>
+          </a:p>
+        </p:txBody>
+      </p:sp>
+    </p:spTree>
+    <p:extLst>
+      <p:ext uri="{BB962C8B-B14F-4D97-AF65-F5344CB8AC3E}">
+        <p14:creationId xmlns:p14="http://schemas.microsoft.com/office/powerpoint/2010/main" val="3277961374"/>
       </p:ext>
     </p:extLst>
   </p:cSld>
@@ -12592,7 +13122,7 @@
         <p:cNvPr id="1" name="">
           <a:extLst>
             <a:ext uri="{FF2B5EF4-FFF2-40B4-BE49-F238E27FC236}">
-              <a16:creationId xmlns:a16="http://schemas.microsoft.com/office/drawing/2014/main" id="{0FB9D3CC-2816-9E0B-FCD9-13464E2555FB}"/>
+              <a16:creationId xmlns:a16="http://schemas.microsoft.com/office/drawing/2014/main" id="{040F9FFB-6560-8F1E-6F4C-64511D3A3568}"/>
             </a:ext>
           </a:extLst>
         </p:cNvPr>
@@ -12612,7 +13142,7 @@
           <p:cNvPr id="2" name="Titel 1">
             <a:extLst>
               <a:ext uri="{FF2B5EF4-FFF2-40B4-BE49-F238E27FC236}">
-                <a16:creationId xmlns:a16="http://schemas.microsoft.com/office/drawing/2014/main" id="{3C0705A3-AB8C-DE02-3D93-D0D2B659198E}"/>
+                <a16:creationId xmlns:a16="http://schemas.microsoft.com/office/drawing/2014/main" id="{51F37715-0D59-D06B-AB2C-486BD68DCC6C}"/>
               </a:ext>
             </a:extLst>
           </p:cNvPr>
@@ -12630,7 +13160,7 @@
           <a:p>
             <a:r>
               <a:rPr lang="de-DE" dirty="0"/>
-              <a:t>Aufgabe 3.7</a:t>
+              <a:t>Aufgabe 4.1</a:t>
             </a:r>
           </a:p>
         </p:txBody>
@@ -12640,7 +13170,7 @@
           <p:cNvPr id="6" name="Content Placeholder 5">
             <a:extLst>
               <a:ext uri="{FF2B5EF4-FFF2-40B4-BE49-F238E27FC236}">
-                <a16:creationId xmlns:a16="http://schemas.microsoft.com/office/drawing/2014/main" id="{4CB9FE27-A2D3-0528-14C1-92B7960713ED}"/>
+                <a16:creationId xmlns:a16="http://schemas.microsoft.com/office/drawing/2014/main" id="{2D5A77A4-8F6D-081F-9391-029226F59D56}"/>
               </a:ext>
             </a:extLst>
           </p:cNvPr>
@@ -12663,7 +13193,7 @@
               <a:rPr lang="en-GB" dirty="0">
                 <a:cs typeface="Arial"/>
               </a:rPr>
-              <a:t>b)</a:t>
+              <a:t>a)</a:t>
             </a:r>
           </a:p>
           <a:p>
@@ -12678,18 +13208,21 @@
             <a:pPr marL="0" indent="0">
               <a:buNone/>
             </a:pPr>
-            <a:endParaRPr lang="en-GB" dirty="0">
-              <a:cs typeface="Arial"/>
-            </a:endParaRPr>
+            <a:r>
+              <a:rPr lang="en-GB" dirty="0">
+                <a:cs typeface="Arial"/>
+              </a:rPr>
+              <a:t>b)</a:t>
+            </a:r>
           </a:p>
         </p:txBody>
       </p:sp>
       <p:pic>
         <p:nvPicPr>
-          <p:cNvPr id="15" name="Picture 14" descr="A white rectangular object with black text&#10;&#10;AI-generated content may be incorrect.">
+          <p:cNvPr id="7" name="Picture 6">
             <a:extLst>
               <a:ext uri="{FF2B5EF4-FFF2-40B4-BE49-F238E27FC236}">
-                <a16:creationId xmlns:a16="http://schemas.microsoft.com/office/drawing/2014/main" id="{2CE87F01-6937-0C21-D3DD-8C0FA667E9EE}"/>
+                <a16:creationId xmlns:a16="http://schemas.microsoft.com/office/drawing/2014/main" id="{93AA5F5E-AA0F-BC6B-91AD-E52B0DB9A771}"/>
               </a:ext>
             </a:extLst>
           </p:cNvPr>
@@ -12700,393 +13233,84 @@
         </p:nvPicPr>
         <p:blipFill>
           <a:blip r:embed="rId2"/>
-          <a:srcRect t="88" b="1647"/>
           <a:stretch>
             <a:fillRect/>
           </a:stretch>
         </p:blipFill>
         <p:spPr>
           <a:xfrm>
-            <a:off x="1043828" y="1859705"/>
-            <a:ext cx="10668000" cy="3803649"/>
+            <a:off x="1173655" y="1716963"/>
+            <a:ext cx="6779172" cy="481176"/>
           </a:xfrm>
           <a:prstGeom prst="rect">
             <a:avLst/>
           </a:prstGeom>
         </p:spPr>
       </p:pic>
-      <p:sp>
-        <p:nvSpPr>
-          <p:cNvPr id="17" name="TextBox 16">
+      <p:pic>
+        <p:nvPicPr>
+          <p:cNvPr id="8" name="Picture 7" descr="A math equations with numbers and symbols&#10;&#10;AI-generated content may be incorrect.">
             <a:extLst>
               <a:ext uri="{FF2B5EF4-FFF2-40B4-BE49-F238E27FC236}">
-                <a16:creationId xmlns:a16="http://schemas.microsoft.com/office/drawing/2014/main" id="{6D05524C-1A62-8431-AB7E-AE594531D225}"/>
+                <a16:creationId xmlns:a16="http://schemas.microsoft.com/office/drawing/2014/main" id="{B5197F23-D08C-F676-62EA-8F638688223F}"/>
               </a:ext>
             </a:extLst>
           </p:cNvPr>
-          <p:cNvSpPr txBox="1"/>
+          <p:cNvPicPr>
+            <a:picLocks noChangeAspect="1"/>
+          </p:cNvPicPr>
           <p:nvPr/>
-        </p:nvSpPr>
+        </p:nvPicPr>
+        <p:blipFill>
+          <a:blip r:embed="rId3"/>
+          <a:stretch>
+            <a:fillRect/>
+          </a:stretch>
+        </p:blipFill>
         <p:spPr>
           <a:xfrm>
-            <a:off x="4147594" y="3173392"/>
-            <a:ext cx="511215" cy="707886"/>
+            <a:off x="1176064" y="2387271"/>
+            <a:ext cx="2815458" cy="2626491"/>
           </a:xfrm>
           <a:prstGeom prst="rect">
             <a:avLst/>
           </a:prstGeom>
-          <a:noFill/>
         </p:spPr>
-        <p:txBody>
-          <a:bodyPr rot="0" spcFirstLastPara="0" vertOverflow="overflow" horzOverflow="overflow" vert="horz" wrap="square" lIns="91440" tIns="45720" rIns="91440" bIns="45720" numCol="1" spcCol="0" rtlCol="0" fromWordArt="0" anchor="t" anchorCtr="0" forceAA="0" compatLnSpc="1">
-            <a:prstTxWarp prst="textNoShape">
-              <a:avLst/>
-            </a:prstTxWarp>
-            <a:spAutoFit/>
-          </a:bodyPr>
-          <a:lstStyle/>
-          <a:p>
-            <a:pPr algn="l"/>
-            <a:r>
-              <a:rPr lang="en-GB" sz="4000" dirty="0">
-                <a:latin typeface="Arial"/>
-                <a:cs typeface="Arial"/>
-              </a:rPr>
-              <a:t>X</a:t>
-            </a:r>
-            <a:endParaRPr lang="en-GB" sz="4400" dirty="0">
-              <a:latin typeface="Arial"/>
-              <a:cs typeface="Arial"/>
-            </a:endParaRPr>
-          </a:p>
-        </p:txBody>
-      </p:sp>
-      <p:sp>
-        <p:nvSpPr>
-          <p:cNvPr id="18" name="TextBox 17">
+      </p:pic>
+      <p:pic>
+        <p:nvPicPr>
+          <p:cNvPr id="10" name="Picture 9">
             <a:extLst>
               <a:ext uri="{FF2B5EF4-FFF2-40B4-BE49-F238E27FC236}">
-                <a16:creationId xmlns:a16="http://schemas.microsoft.com/office/drawing/2014/main" id="{02F7A1D5-16DC-B37C-C635-7C82D37D665C}"/>
+                <a16:creationId xmlns:a16="http://schemas.microsoft.com/office/drawing/2014/main" id="{3F24FBF2-AFBB-CDCD-D989-844E3645298C}"/>
               </a:ext>
             </a:extLst>
           </p:cNvPr>
-          <p:cNvSpPr txBox="1"/>
+          <p:cNvPicPr>
+            <a:picLocks noChangeAspect="1"/>
+          </p:cNvPicPr>
           <p:nvPr/>
-        </p:nvSpPr>
+        </p:nvPicPr>
+        <p:blipFill>
+          <a:blip r:embed="rId4"/>
+          <a:stretch>
+            <a:fillRect/>
+          </a:stretch>
+        </p:blipFill>
         <p:spPr>
           <a:xfrm>
-            <a:off x="8931796" y="3173391"/>
-            <a:ext cx="511215" cy="707886"/>
+            <a:off x="1166813" y="5102171"/>
+            <a:ext cx="3762375" cy="1190625"/>
           </a:xfrm>
           <a:prstGeom prst="rect">
             <a:avLst/>
           </a:prstGeom>
-          <a:noFill/>
         </p:spPr>
-        <p:txBody>
-          <a:bodyPr rot="0" spcFirstLastPara="0" vertOverflow="overflow" horzOverflow="overflow" vert="horz" wrap="square" lIns="91440" tIns="45720" rIns="91440" bIns="45720" numCol="1" spcCol="0" rtlCol="0" fromWordArt="0" anchor="t" anchorCtr="0" forceAA="0" compatLnSpc="1">
-            <a:prstTxWarp prst="textNoShape">
-              <a:avLst/>
-            </a:prstTxWarp>
-            <a:spAutoFit/>
-          </a:bodyPr>
-          <a:lstStyle/>
-          <a:p>
-            <a:pPr algn="l"/>
-            <a:r>
-              <a:rPr lang="en-GB" sz="4000" dirty="0">
-                <a:latin typeface="Arial"/>
-                <a:cs typeface="Arial"/>
-              </a:rPr>
-              <a:t>X</a:t>
-            </a:r>
-            <a:endParaRPr lang="en-GB" sz="4400" dirty="0">
-              <a:latin typeface="Arial"/>
-              <a:cs typeface="Arial"/>
-            </a:endParaRPr>
-          </a:p>
-        </p:txBody>
-      </p:sp>
-      <p:sp>
-        <p:nvSpPr>
-          <p:cNvPr id="20" name="TextBox 19">
-            <a:extLst>
-              <a:ext uri="{FF2B5EF4-FFF2-40B4-BE49-F238E27FC236}">
-                <a16:creationId xmlns:a16="http://schemas.microsoft.com/office/drawing/2014/main" id="{7EDE88BE-38A8-CB65-F954-E576AA464FE0}"/>
-              </a:ext>
-            </a:extLst>
-          </p:cNvPr>
-          <p:cNvSpPr txBox="1"/>
-          <p:nvPr/>
-        </p:nvSpPr>
-        <p:spPr>
-          <a:xfrm>
-            <a:off x="10012099" y="3173390"/>
-            <a:ext cx="511215" cy="707886"/>
-          </a:xfrm>
-          <a:prstGeom prst="rect">
-            <a:avLst/>
-          </a:prstGeom>
-          <a:noFill/>
-        </p:spPr>
-        <p:txBody>
-          <a:bodyPr rot="0" spcFirstLastPara="0" vertOverflow="overflow" horzOverflow="overflow" vert="horz" wrap="square" lIns="91440" tIns="45720" rIns="91440" bIns="45720" numCol="1" spcCol="0" rtlCol="0" fromWordArt="0" anchor="t" anchorCtr="0" forceAA="0" compatLnSpc="1">
-            <a:prstTxWarp prst="textNoShape">
-              <a:avLst/>
-            </a:prstTxWarp>
-            <a:spAutoFit/>
-          </a:bodyPr>
-          <a:lstStyle/>
-          <a:p>
-            <a:pPr algn="l"/>
-            <a:r>
-              <a:rPr lang="en-GB" sz="4000" dirty="0">
-                <a:latin typeface="Arial"/>
-                <a:cs typeface="Arial"/>
-              </a:rPr>
-              <a:t>X</a:t>
-            </a:r>
-            <a:endParaRPr lang="en-GB" sz="4400" dirty="0">
-              <a:latin typeface="Arial"/>
-              <a:cs typeface="Arial"/>
-            </a:endParaRPr>
-          </a:p>
-        </p:txBody>
-      </p:sp>
-      <p:sp>
-        <p:nvSpPr>
-          <p:cNvPr id="21" name="TextBox 20">
-            <a:extLst>
-              <a:ext uri="{FF2B5EF4-FFF2-40B4-BE49-F238E27FC236}">
-                <a16:creationId xmlns:a16="http://schemas.microsoft.com/office/drawing/2014/main" id="{92091E4F-EC43-08E3-6828-C6A45FBBCFFF}"/>
-              </a:ext>
-            </a:extLst>
-          </p:cNvPr>
-          <p:cNvSpPr txBox="1"/>
-          <p:nvPr/>
-        </p:nvSpPr>
-        <p:spPr>
-          <a:xfrm>
-            <a:off x="10880200" y="4764909"/>
-            <a:ext cx="511215" cy="707886"/>
-          </a:xfrm>
-          <a:prstGeom prst="rect">
-            <a:avLst/>
-          </a:prstGeom>
-          <a:noFill/>
-        </p:spPr>
-        <p:txBody>
-          <a:bodyPr rot="0" spcFirstLastPara="0" vertOverflow="overflow" horzOverflow="overflow" vert="horz" wrap="square" lIns="91440" tIns="45720" rIns="91440" bIns="45720" numCol="1" spcCol="0" rtlCol="0" fromWordArt="0" anchor="t" anchorCtr="0" forceAA="0" compatLnSpc="1">
-            <a:prstTxWarp prst="textNoShape">
-              <a:avLst/>
-            </a:prstTxWarp>
-            <a:spAutoFit/>
-          </a:bodyPr>
-          <a:lstStyle/>
-          <a:p>
-            <a:pPr algn="l"/>
-            <a:r>
-              <a:rPr lang="en-GB" sz="4000" dirty="0">
-                <a:latin typeface="Arial"/>
-                <a:cs typeface="Arial"/>
-              </a:rPr>
-              <a:t>X</a:t>
-            </a:r>
-            <a:endParaRPr lang="en-GB" sz="4400" dirty="0">
-              <a:latin typeface="Arial"/>
-              <a:cs typeface="Arial"/>
-            </a:endParaRPr>
-          </a:p>
-        </p:txBody>
-      </p:sp>
-      <p:sp>
-        <p:nvSpPr>
-          <p:cNvPr id="22" name="TextBox 21">
-            <a:extLst>
-              <a:ext uri="{FF2B5EF4-FFF2-40B4-BE49-F238E27FC236}">
-                <a16:creationId xmlns:a16="http://schemas.microsoft.com/office/drawing/2014/main" id="{06983CBF-02FE-1936-B604-59FC5A24ECFF}"/>
-              </a:ext>
-            </a:extLst>
-          </p:cNvPr>
-          <p:cNvSpPr txBox="1"/>
-          <p:nvPr/>
-        </p:nvSpPr>
-        <p:spPr>
-          <a:xfrm>
-            <a:off x="4147592" y="3945035"/>
-            <a:ext cx="511215" cy="707886"/>
-          </a:xfrm>
-          <a:prstGeom prst="rect">
-            <a:avLst/>
-          </a:prstGeom>
-          <a:noFill/>
-        </p:spPr>
-        <p:txBody>
-          <a:bodyPr rot="0" spcFirstLastPara="0" vertOverflow="overflow" horzOverflow="overflow" vert="horz" wrap="square" lIns="91440" tIns="45720" rIns="91440" bIns="45720" numCol="1" spcCol="0" rtlCol="0" fromWordArt="0" anchor="t" anchorCtr="0" forceAA="0" compatLnSpc="1">
-            <a:prstTxWarp prst="textNoShape">
-              <a:avLst/>
-            </a:prstTxWarp>
-            <a:spAutoFit/>
-          </a:bodyPr>
-          <a:lstStyle/>
-          <a:p>
-            <a:pPr algn="l"/>
-            <a:r>
-              <a:rPr lang="en-GB" sz="4000" dirty="0">
-                <a:latin typeface="Arial"/>
-                <a:cs typeface="Arial"/>
-              </a:rPr>
-              <a:t>X</a:t>
-            </a:r>
-            <a:endParaRPr lang="en-GB" sz="4400" dirty="0">
-              <a:latin typeface="Arial"/>
-              <a:cs typeface="Arial"/>
-            </a:endParaRPr>
-          </a:p>
-        </p:txBody>
-      </p:sp>
-      <p:sp>
-        <p:nvSpPr>
-          <p:cNvPr id="23" name="TextBox 22">
-            <a:extLst>
-              <a:ext uri="{FF2B5EF4-FFF2-40B4-BE49-F238E27FC236}">
-                <a16:creationId xmlns:a16="http://schemas.microsoft.com/office/drawing/2014/main" id="{0E9AA9DA-ED4D-94F3-AC40-D0FBD476C025}"/>
-              </a:ext>
-            </a:extLst>
-          </p:cNvPr>
-          <p:cNvSpPr txBox="1"/>
-          <p:nvPr/>
-        </p:nvSpPr>
-        <p:spPr>
-          <a:xfrm>
-            <a:off x="7890073" y="3945035"/>
-            <a:ext cx="511215" cy="707886"/>
-          </a:xfrm>
-          <a:prstGeom prst="rect">
-            <a:avLst/>
-          </a:prstGeom>
-          <a:noFill/>
-        </p:spPr>
-        <p:txBody>
-          <a:bodyPr rot="0" spcFirstLastPara="0" vertOverflow="overflow" horzOverflow="overflow" vert="horz" wrap="square" lIns="91440" tIns="45720" rIns="91440" bIns="45720" numCol="1" spcCol="0" rtlCol="0" fromWordArt="0" anchor="t" anchorCtr="0" forceAA="0" compatLnSpc="1">
-            <a:prstTxWarp prst="textNoShape">
-              <a:avLst/>
-            </a:prstTxWarp>
-            <a:spAutoFit/>
-          </a:bodyPr>
-          <a:lstStyle/>
-          <a:p>
-            <a:pPr algn="l"/>
-            <a:r>
-              <a:rPr lang="en-GB" sz="4000" dirty="0">
-                <a:latin typeface="Arial"/>
-                <a:cs typeface="Arial"/>
-              </a:rPr>
-              <a:t>X</a:t>
-            </a:r>
-            <a:endParaRPr lang="en-GB" sz="4400" dirty="0">
-              <a:latin typeface="Arial"/>
-              <a:cs typeface="Arial"/>
-            </a:endParaRPr>
-          </a:p>
-        </p:txBody>
-      </p:sp>
-      <p:sp>
-        <p:nvSpPr>
-          <p:cNvPr id="24" name="TextBox 23">
-            <a:extLst>
-              <a:ext uri="{FF2B5EF4-FFF2-40B4-BE49-F238E27FC236}">
-                <a16:creationId xmlns:a16="http://schemas.microsoft.com/office/drawing/2014/main" id="{6FEBD727-531B-A642-5EE3-DB9BEFA66D4C}"/>
-              </a:ext>
-            </a:extLst>
-          </p:cNvPr>
-          <p:cNvSpPr txBox="1"/>
-          <p:nvPr/>
-        </p:nvSpPr>
-        <p:spPr>
-          <a:xfrm>
-            <a:off x="10880199" y="3945035"/>
-            <a:ext cx="511215" cy="707886"/>
-          </a:xfrm>
-          <a:prstGeom prst="rect">
-            <a:avLst/>
-          </a:prstGeom>
-          <a:noFill/>
-        </p:spPr>
-        <p:txBody>
-          <a:bodyPr rot="0" spcFirstLastPara="0" vertOverflow="overflow" horzOverflow="overflow" vert="horz" wrap="square" lIns="91440" tIns="45720" rIns="91440" bIns="45720" numCol="1" spcCol="0" rtlCol="0" fromWordArt="0" anchor="t" anchorCtr="0" forceAA="0" compatLnSpc="1">
-            <a:prstTxWarp prst="textNoShape">
-              <a:avLst/>
-            </a:prstTxWarp>
-            <a:spAutoFit/>
-          </a:bodyPr>
-          <a:lstStyle/>
-          <a:p>
-            <a:pPr algn="l"/>
-            <a:r>
-              <a:rPr lang="en-GB" sz="4000" dirty="0">
-                <a:latin typeface="Arial"/>
-                <a:cs typeface="Arial"/>
-              </a:rPr>
-              <a:t>X</a:t>
-            </a:r>
-            <a:endParaRPr lang="en-GB" sz="4400" dirty="0">
-              <a:latin typeface="Arial"/>
-              <a:cs typeface="Arial"/>
-            </a:endParaRPr>
-          </a:p>
-        </p:txBody>
-      </p:sp>
-      <p:sp>
-        <p:nvSpPr>
-          <p:cNvPr id="25" name="TextBox 24">
-            <a:extLst>
-              <a:ext uri="{FF2B5EF4-FFF2-40B4-BE49-F238E27FC236}">
-                <a16:creationId xmlns:a16="http://schemas.microsoft.com/office/drawing/2014/main" id="{F95C9599-A282-1268-36BB-4F413CB96FF3}"/>
-              </a:ext>
-            </a:extLst>
-          </p:cNvPr>
-          <p:cNvSpPr txBox="1"/>
-          <p:nvPr/>
-        </p:nvSpPr>
-        <p:spPr>
-          <a:xfrm>
-            <a:off x="3202326" y="4764908"/>
-            <a:ext cx="511215" cy="707886"/>
-          </a:xfrm>
-          <a:prstGeom prst="rect">
-            <a:avLst/>
-          </a:prstGeom>
-          <a:noFill/>
-        </p:spPr>
-        <p:txBody>
-          <a:bodyPr rot="0" spcFirstLastPara="0" vertOverflow="overflow" horzOverflow="overflow" vert="horz" wrap="square" lIns="91440" tIns="45720" rIns="91440" bIns="45720" numCol="1" spcCol="0" rtlCol="0" fromWordArt="0" anchor="t" anchorCtr="0" forceAA="0" compatLnSpc="1">
-            <a:prstTxWarp prst="textNoShape">
-              <a:avLst/>
-            </a:prstTxWarp>
-            <a:spAutoFit/>
-          </a:bodyPr>
-          <a:lstStyle/>
-          <a:p>
-            <a:pPr algn="l"/>
-            <a:r>
-              <a:rPr lang="en-GB" sz="4000" dirty="0">
-                <a:latin typeface="Arial"/>
-                <a:cs typeface="Arial"/>
-              </a:rPr>
-              <a:t>X</a:t>
-            </a:r>
-            <a:endParaRPr lang="en-GB" sz="4400" dirty="0">
-              <a:latin typeface="Arial"/>
-              <a:cs typeface="Arial"/>
-            </a:endParaRPr>
-          </a:p>
-        </p:txBody>
-      </p:sp>
+      </p:pic>
     </p:spTree>
     <p:extLst>
       <p:ext uri="{BB962C8B-B14F-4D97-AF65-F5344CB8AC3E}">
-        <p14:creationId xmlns:p14="http://schemas.microsoft.com/office/powerpoint/2010/main" val="3277961374"/>
+        <p14:creationId xmlns:p14="http://schemas.microsoft.com/office/powerpoint/2010/main" val="3021401086"/>
       </p:ext>
     </p:extLst>
   </p:cSld>
@@ -16076,6 +16300,110 @@
     <p:extLst>
       <p:ext uri="{BB962C8B-B14F-4D97-AF65-F5344CB8AC3E}">
         <p14:creationId xmlns:p14="http://schemas.microsoft.com/office/powerpoint/2010/main" val="2217916623"/>
+      </p:ext>
+    </p:extLst>
+  </p:cSld>
+  <p:clrMapOvr>
+    <a:masterClrMapping/>
+  </p:clrMapOvr>
+</p:sld>
+</file>
+
+<file path=ppt/slides/slide29.xml><?xml version="1.0" encoding="utf-8"?>
+<p:sld xmlns:a="http://schemas.openxmlformats.org/drawingml/2006/main" xmlns:r="http://schemas.openxmlformats.org/officeDocument/2006/relationships" xmlns:p="http://schemas.openxmlformats.org/presentationml/2006/main">
+  <p:cSld>
+    <p:spTree>
+      <p:nvGrpSpPr>
+        <p:cNvPr id="1" name=""/>
+        <p:cNvGrpSpPr/>
+        <p:nvPr/>
+      </p:nvGrpSpPr>
+      <p:grpSpPr>
+        <a:xfrm>
+          <a:off x="0" y="0"/>
+          <a:ext cx="0" cy="0"/>
+          <a:chOff x="0" y="0"/>
+          <a:chExt cx="0" cy="0"/>
+        </a:xfrm>
+      </p:grpSpPr>
+      <p:sp>
+        <p:nvSpPr>
+          <p:cNvPr id="2" name="Title 1">
+            <a:extLst>
+              <a:ext uri="{FF2B5EF4-FFF2-40B4-BE49-F238E27FC236}">
+                <a16:creationId xmlns:a16="http://schemas.microsoft.com/office/drawing/2014/main" id="{F2ADB7D5-EEEC-0537-4BCE-CF7AA846CB18}"/>
+              </a:ext>
+            </a:extLst>
+          </p:cNvPr>
+          <p:cNvSpPr>
+            <a:spLocks noGrp="1"/>
+          </p:cNvSpPr>
+          <p:nvPr>
+            <p:ph type="title"/>
+          </p:nvPr>
+        </p:nvSpPr>
+        <p:spPr/>
+        <p:txBody>
+          <a:bodyPr/>
+          <a:lstStyle/>
+          <a:p>
+            <a:r>
+              <a:rPr lang="de-DE" dirty="0"/>
+              <a:t>Aufgabe 5.2</a:t>
+            </a:r>
+          </a:p>
+        </p:txBody>
+      </p:sp>
+      <p:pic>
+        <p:nvPicPr>
+          <p:cNvPr id="11" name="Content Placeholder 10">
+            <a:extLst>
+              <a:ext uri="{FF2B5EF4-FFF2-40B4-BE49-F238E27FC236}">
+                <a16:creationId xmlns:a16="http://schemas.microsoft.com/office/drawing/2014/main" id="{6CC7C3B0-DA10-04E8-5188-1F4AAEEB9C26}"/>
+              </a:ext>
+            </a:extLst>
+          </p:cNvPr>
+          <p:cNvPicPr>
+            <a:picLocks noGrp="1" noChangeAspect="1"/>
+          </p:cNvPicPr>
+          <p:nvPr>
+            <p:ph idx="1"/>
+          </p:nvPr>
+        </p:nvPicPr>
+        <p:blipFill>
+          <a:blip r:embed="rId2">
+            <a:extLst>
+              <a:ext uri="{28A0092B-C50C-407E-A947-70E740481C1C}">
+                <a14:useLocalDpi xmlns:a14="http://schemas.microsoft.com/office/drawing/2010/main" val="0"/>
+              </a:ext>
+            </a:extLst>
+          </a:blip>
+          <a:stretch>
+            <a:fillRect/>
+          </a:stretch>
+        </p:blipFill>
+        <p:spPr bwMode="auto">
+          <a:xfrm>
+            <a:off x="2386515" y="1780738"/>
+            <a:ext cx="7426907" cy="4337924"/>
+          </a:xfrm>
+          <a:prstGeom prst="rect">
+            <a:avLst/>
+          </a:prstGeom>
+          <a:noFill/>
+          <a:ln w="9525">
+            <a:noFill/>
+            <a:miter lim="800000"/>
+            <a:headEnd/>
+            <a:tailEnd/>
+          </a:ln>
+          <a:effectLst/>
+        </p:spPr>
+      </p:pic>
+    </p:spTree>
+    <p:extLst>
+      <p:ext uri="{BB962C8B-B14F-4D97-AF65-F5344CB8AC3E}">
+        <p14:creationId xmlns:p14="http://schemas.microsoft.com/office/powerpoint/2010/main" val="509427068"/>
       </p:ext>
     </p:extLst>
   </p:cSld>
@@ -24566,6 +24894,15 @@
 </file>
 
 <file path=customXml/item1.xml><?xml version="1.0" encoding="utf-8"?>
+<?mso-contentType ?>
+<FormTemplates xmlns="http://schemas.microsoft.com/sharepoint/v3/contenttype/forms">
+  <Display>DocumentLibraryForm</Display>
+  <Edit>DocumentLibraryForm</Edit>
+  <New>DocumentLibraryForm</New>
+</FormTemplates>
+</file>
+
+<file path=customXml/item2.xml><?xml version="1.0" encoding="utf-8"?>
 <ct:contentTypeSchema xmlns:ct="http://schemas.microsoft.com/office/2006/metadata/contentType" xmlns:ma="http://schemas.microsoft.com/office/2006/metadata/properties/metaAttributes" ct:_="" ma:_="" ma:contentTypeName="Document" ma:contentTypeID="0x0101008799F1A435591F42BCDE2557FA51CDDA" ma:contentTypeVersion="15" ma:contentTypeDescription="Create a new document." ma:contentTypeScope="" ma:versionID="baa9c65a0a545f65583643df3cf8d9f4">
   <xsd:schema xmlns:xsd="http://www.w3.org/2001/XMLSchema" xmlns:xs="http://www.w3.org/2001/XMLSchema" xmlns:p="http://schemas.microsoft.com/office/2006/metadata/properties" xmlns:ns2="f957fcc5-14ca-4ecf-9842-9f00d595875c" xmlns:ns3="e08cfc56-8307-41e5-898e-b333c51beffa" targetNamespace="http://schemas.microsoft.com/office/2006/metadata/properties" ma:root="true" ma:fieldsID="015d39312a6521742bc57e13b2dae392" ns2:_="" ns3:_="">
     <xsd:import namespace="f957fcc5-14ca-4ecf-9842-9f00d595875c"/>
@@ -24802,15 +25139,6 @@
 </ct:contentTypeSchema>
 </file>
 
-<file path=customXml/item2.xml><?xml version="1.0" encoding="utf-8"?>
-<?mso-contentType ?>
-<FormTemplates xmlns="http://schemas.microsoft.com/sharepoint/v3/contenttype/forms">
-  <Display>DocumentLibraryForm</Display>
-  <Edit>DocumentLibraryForm</Edit>
-  <New>DocumentLibraryForm</New>
-</FormTemplates>
-</file>
-
 <file path=customXml/item3.xml><?xml version="1.0" encoding="utf-8"?>
 <p:properties xmlns:p="http://schemas.microsoft.com/office/2006/metadata/properties" xmlns:xsi="http://www.w3.org/2001/XMLSchema-instance" xmlns:pc="http://schemas.microsoft.com/office/infopath/2007/PartnerControls">
   <documentManagement>
@@ -24823,6 +25151,14 @@
 </file>
 
 <file path=customXml/itemProps1.xml><?xml version="1.0" encoding="utf-8"?>
+<ds:datastoreItem xmlns:ds="http://schemas.openxmlformats.org/officeDocument/2006/customXml" ds:itemID="{AC48F4C2-72FB-464C-8474-E470A160399A}">
+  <ds:schemaRefs>
+    <ds:schemaRef ds:uri="http://schemas.microsoft.com/sharepoint/v3/contenttype/forms"/>
+  </ds:schemaRefs>
+</ds:datastoreItem>
+</file>
+
+<file path=customXml/itemProps2.xml><?xml version="1.0" encoding="utf-8"?>
 <ds:datastoreItem xmlns:ds="http://schemas.openxmlformats.org/officeDocument/2006/customXml" ds:itemID="{96F35E4A-19A6-42ED-B9B2-B9FDCAD1EAA1}">
   <ds:schemaRefs>
     <ds:schemaRef ds:uri="e08cfc56-8307-41e5-898e-b333c51beffa"/>
@@ -24837,14 +25173,6 @@
     <ds:schemaRef ds:uri="http://schemas.microsoft.com/office/infopath/2007/PartnerControls"/>
     <ds:schemaRef ds:uri="http://schemas.openxmlformats.org/package/2006/metadata/core-properties"/>
     <ds:schemaRef ds:uri="http://www.w3.org/2001/XMLSchema"/>
-  </ds:schemaRefs>
-</ds:datastoreItem>
-</file>
-
-<file path=customXml/itemProps2.xml><?xml version="1.0" encoding="utf-8"?>
-<ds:datastoreItem xmlns:ds="http://schemas.openxmlformats.org/officeDocument/2006/customXml" ds:itemID="{AC48F4C2-72FB-464C-8474-E470A160399A}">
-  <ds:schemaRefs>
-    <ds:schemaRef ds:uri="http://schemas.microsoft.com/sharepoint/v3/contenttype/forms"/>
   </ds:schemaRefs>
 </ds:datastoreItem>
 </file>

</xml_diff>